<commit_message>
Improvements to Powerpoint, completed Practical 1
</commit_message>
<xml_diff>
--- a/ML_Tools.pptx
+++ b/ML_Tools.pptx
@@ -5,7 +5,7 @@
     <p:sldMasterId id="2147483648" r:id="rId1"/>
   </p:sldMasterIdLst>
   <p:notesMasterIdLst>
-    <p:notesMasterId r:id="rId12"/>
+    <p:notesMasterId r:id="rId15"/>
   </p:notesMasterIdLst>
   <p:sldIdLst>
     <p:sldId id="256" r:id="rId2"/>
@@ -15,9 +15,12 @@
     <p:sldId id="260" r:id="rId6"/>
     <p:sldId id="261" r:id="rId7"/>
     <p:sldId id="262" r:id="rId8"/>
-    <p:sldId id="263" r:id="rId9"/>
-    <p:sldId id="265" r:id="rId10"/>
-    <p:sldId id="257" r:id="rId11"/>
+    <p:sldId id="266" r:id="rId9"/>
+    <p:sldId id="263" r:id="rId10"/>
+    <p:sldId id="265" r:id="rId11"/>
+    <p:sldId id="267" r:id="rId12"/>
+    <p:sldId id="268" r:id="rId13"/>
+    <p:sldId id="257" r:id="rId14"/>
   </p:sldIdLst>
   <p:sldSz cx="12192000" cy="6858000"/>
   <p:notesSz cx="6858000" cy="9144000"/>
@@ -116,6 +119,11 @@
       </a:defRPr>
     </a:lvl9pPr>
   </p:defaultTextStyle>
+  <p:extLst>
+    <p:ext uri="{EFAFB233-063F-42B5-8137-9DF3F51BA10A}">
+      <p15:sldGuideLst xmlns:p15="http://schemas.microsoft.com/office/powerpoint/2012/main"/>
+    </p:ext>
+  </p:extLst>
 </p:presentation>
 </file>
 
@@ -201,7 +209,7 @@
           <a:p>
             <a:fld id="{D265C7B7-13AD-CF49-B14D-49C2D2133516}" type="datetimeFigureOut">
               <a:rPr lang="en-US" smtClean="0"/>
-              <a:t>3/6/17</a:t>
+              <a:t>3/21/17</a:t>
             </a:fld>
             <a:endParaRPr lang="en-US"/>
           </a:p>
@@ -972,7 +980,7 @@
             <a:fld id="{B61BEF0D-F0BB-DE4B-95CE-6DB70DBA9567}" type="datetimeFigureOut">
               <a:rPr lang="en-US" dirty="0"/>
               <a:pPr/>
-              <a:t>3/6/17</a:t>
+              <a:t>3/21/17</a:t>
             </a:fld>
             <a:endParaRPr lang="en-US" dirty="0"/>
           </a:p>
@@ -1265,7 +1273,7 @@
             <a:fld id="{B61BEF0D-F0BB-DE4B-95CE-6DB70DBA9567}" type="datetimeFigureOut">
               <a:rPr lang="en-US" dirty="0"/>
               <a:pPr/>
-              <a:t>3/6/17</a:t>
+              <a:t>3/21/17</a:t>
             </a:fld>
             <a:endParaRPr lang="en-US" dirty="0"/>
           </a:p>
@@ -1510,7 +1518,7 @@
             <a:fld id="{B61BEF0D-F0BB-DE4B-95CE-6DB70DBA9567}" type="datetimeFigureOut">
               <a:rPr lang="en-US" dirty="0"/>
               <a:pPr/>
-              <a:t>3/6/17</a:t>
+              <a:t>3/21/17</a:t>
             </a:fld>
             <a:endParaRPr lang="en-US" dirty="0"/>
           </a:p>
@@ -2047,7 +2055,7 @@
             <a:fld id="{B61BEF0D-F0BB-DE4B-95CE-6DB70DBA9567}" type="datetimeFigureOut">
               <a:rPr lang="en-US" dirty="0"/>
               <a:pPr/>
-              <a:t>3/6/17</a:t>
+              <a:t>3/21/17</a:t>
             </a:fld>
             <a:endParaRPr lang="en-US" dirty="0"/>
           </a:p>
@@ -2292,7 +2300,7 @@
             <a:fld id="{B61BEF0D-F0BB-DE4B-95CE-6DB70DBA9567}" type="datetimeFigureOut">
               <a:rPr lang="en-US" dirty="0"/>
               <a:pPr/>
-              <a:t>3/6/17</a:t>
+              <a:t>3/21/17</a:t>
             </a:fld>
             <a:endParaRPr lang="en-US" dirty="0"/>
           </a:p>
@@ -2821,7 +2829,7 @@
             <a:fld id="{B61BEF0D-F0BB-DE4B-95CE-6DB70DBA9567}" type="datetimeFigureOut">
               <a:rPr lang="en-US" dirty="0"/>
               <a:pPr/>
-              <a:t>3/6/17</a:t>
+              <a:t>3/21/17</a:t>
             </a:fld>
             <a:endParaRPr lang="en-US" dirty="0"/>
           </a:p>
@@ -3115,7 +3123,7 @@
             <a:fld id="{B61BEF0D-F0BB-DE4B-95CE-6DB70DBA9567}" type="datetimeFigureOut">
               <a:rPr lang="en-US" dirty="0"/>
               <a:pPr/>
-              <a:t>3/6/17</a:t>
+              <a:t>3/21/17</a:t>
             </a:fld>
             <a:endParaRPr lang="en-US" dirty="0"/>
           </a:p>
@@ -3286,7 +3294,7 @@
             <a:fld id="{B61BEF0D-F0BB-DE4B-95CE-6DB70DBA9567}" type="datetimeFigureOut">
               <a:rPr lang="en-US" dirty="0"/>
               <a:pPr/>
-              <a:t>3/6/17</a:t>
+              <a:t>3/21/17</a:t>
             </a:fld>
             <a:endParaRPr lang="en-US" dirty="0"/>
           </a:p>
@@ -3463,7 +3471,7 @@
             <a:fld id="{B61BEF0D-F0BB-DE4B-95CE-6DB70DBA9567}" type="datetimeFigureOut">
               <a:rPr lang="en-US" dirty="0"/>
               <a:pPr/>
-              <a:t>3/6/17</a:t>
+              <a:t>3/21/17</a:t>
             </a:fld>
             <a:endParaRPr lang="en-US" dirty="0"/>
           </a:p>
@@ -3630,7 +3638,7 @@
             <a:fld id="{B61BEF0D-F0BB-DE4B-95CE-6DB70DBA9567}" type="datetimeFigureOut">
               <a:rPr lang="en-US" dirty="0"/>
               <a:pPr/>
-              <a:t>3/6/17</a:t>
+              <a:t>3/21/17</a:t>
             </a:fld>
             <a:endParaRPr lang="en-US" dirty="0"/>
           </a:p>
@@ -3878,7 +3886,7 @@
             <a:fld id="{B61BEF0D-F0BB-DE4B-95CE-6DB70DBA9567}" type="datetimeFigureOut">
               <a:rPr lang="en-US" dirty="0"/>
               <a:pPr/>
-              <a:t>3/6/17</a:t>
+              <a:t>3/21/17</a:t>
             </a:fld>
             <a:endParaRPr lang="en-US" dirty="0"/>
           </a:p>
@@ -4172,7 +4180,7 @@
             <a:fld id="{B61BEF0D-F0BB-DE4B-95CE-6DB70DBA9567}" type="datetimeFigureOut">
               <a:rPr lang="en-US" dirty="0"/>
               <a:pPr/>
-              <a:t>3/6/17</a:t>
+              <a:t>3/21/17</a:t>
             </a:fld>
             <a:endParaRPr lang="en-US" dirty="0"/>
           </a:p>
@@ -4611,7 +4619,7 @@
             <a:fld id="{B61BEF0D-F0BB-DE4B-95CE-6DB70DBA9567}" type="datetimeFigureOut">
               <a:rPr lang="en-US" dirty="0"/>
               <a:pPr/>
-              <a:t>3/6/17</a:t>
+              <a:t>3/21/17</a:t>
             </a:fld>
             <a:endParaRPr lang="en-US" dirty="0"/>
           </a:p>
@@ -4726,7 +4734,7 @@
             <a:fld id="{B61BEF0D-F0BB-DE4B-95CE-6DB70DBA9567}" type="datetimeFigureOut">
               <a:rPr lang="en-US" dirty="0"/>
               <a:pPr/>
-              <a:t>3/6/17</a:t>
+              <a:t>3/21/17</a:t>
             </a:fld>
             <a:endParaRPr lang="en-US" dirty="0"/>
           </a:p>
@@ -4818,7 +4826,7 @@
             <a:fld id="{B61BEF0D-F0BB-DE4B-95CE-6DB70DBA9567}" type="datetimeFigureOut">
               <a:rPr lang="en-US" dirty="0"/>
               <a:pPr/>
-              <a:t>3/6/17</a:t>
+              <a:t>3/21/17</a:t>
             </a:fld>
             <a:endParaRPr lang="en-US" dirty="0"/>
           </a:p>
@@ -5098,7 +5106,7 @@
             <a:fld id="{B61BEF0D-F0BB-DE4B-95CE-6DB70DBA9567}" type="datetimeFigureOut">
               <a:rPr lang="en-US" dirty="0"/>
               <a:pPr/>
-              <a:t>3/6/17</a:t>
+              <a:t>3/21/17</a:t>
             </a:fld>
             <a:endParaRPr lang="en-US" dirty="0"/>
           </a:p>
@@ -5386,7 +5394,7 @@
             <a:fld id="{B61BEF0D-F0BB-DE4B-95CE-6DB70DBA9567}" type="datetimeFigureOut">
               <a:rPr lang="en-US" dirty="0"/>
               <a:pPr/>
-              <a:t>3/6/17</a:t>
+              <a:t>3/21/17</a:t>
             </a:fld>
             <a:endParaRPr lang="en-US" dirty="0"/>
           </a:p>
@@ -5913,7 +5921,7 @@
             <a:fld id="{B61BEF0D-F0BB-DE4B-95CE-6DB70DBA9567}" type="datetimeFigureOut">
               <a:rPr lang="en-US" dirty="0"/>
               <a:pPr/>
-              <a:t>3/6/17</a:t>
+              <a:t>3/21/17</a:t>
             </a:fld>
             <a:endParaRPr lang="en-US" dirty="0"/>
           </a:p>
@@ -6563,27 +6571,472 @@
             <p:ph type="title"/>
           </p:nvPr>
         </p:nvSpPr>
-        <p:spPr/>
+        <p:spPr>
+          <a:xfrm>
+            <a:off x="1484311" y="655571"/>
+            <a:ext cx="10018713" cy="1398079"/>
+          </a:xfrm>
+        </p:spPr>
         <p:txBody>
           <a:bodyPr/>
           <a:lstStyle/>
           <a:p>
             <a:r>
               <a:rPr lang="en-US" dirty="0" smtClean="0"/>
-              <a:t>Summary</a:t>
+              <a:t>Ski-kit Learn</a:t>
             </a:r>
             <a:endParaRPr lang="en-US" dirty="0"/>
           </a:p>
         </p:txBody>
       </p:sp>
-      <p:sp>
-        <p:nvSpPr>
-          <p:cNvPr id="3" name="Content Placeholder 2"/>
-          <p:cNvSpPr>
-            <a:spLocks noGrp="1"/>
-          </p:cNvSpPr>
+      <p:graphicFrame>
+        <p:nvGraphicFramePr>
+          <p:cNvPr id="4" name="Content Placeholder 3"/>
+          <p:cNvGraphicFramePr>
+            <a:graphicFrameLocks noGrp="1"/>
+          </p:cNvGraphicFramePr>
           <p:nvPr>
             <p:ph idx="1"/>
+            <p:extLst>
+              <p:ext uri="{D42A27DB-BD31-4B8C-83A1-F6EECF244321}">
+                <p14:modId xmlns:p14="http://schemas.microsoft.com/office/powerpoint/2010/main" val="1619404318"/>
+              </p:ext>
+            </p:extLst>
+          </p:nvPr>
+        </p:nvGraphicFramePr>
+        <p:xfrm>
+          <a:off x="1484313" y="2142348"/>
+          <a:ext cx="10018713" cy="3942080"/>
+        </p:xfrm>
+        <a:graphic>
+          <a:graphicData uri="http://schemas.openxmlformats.org/drawingml/2006/table">
+            <a:tbl>
+              <a:tblPr firstRow="1" bandRow="1">
+                <a:tableStyleId>{073A0DAA-6AF3-43AB-8588-CEC1D06C72B9}</a:tableStyleId>
+              </a:tblPr>
+              <a:tblGrid>
+                <a:gridCol w="3339571"/>
+                <a:gridCol w="3339571"/>
+                <a:gridCol w="3339571"/>
+              </a:tblGrid>
+              <a:tr h="370840">
+                <a:tc>
+                  <a:txBody>
+                    <a:bodyPr/>
+                    <a:lstStyle/>
+                    <a:p>
+                      <a:r>
+                        <a:rPr lang="en-US" dirty="0" smtClean="0"/>
+                        <a:t>Name</a:t>
+                      </a:r>
+                      <a:r>
+                        <a:rPr lang="en-US" baseline="0" dirty="0" smtClean="0"/>
+                        <a:t> of Method</a:t>
+                      </a:r>
+                      <a:endParaRPr lang="en-US" dirty="0"/>
+                    </a:p>
+                  </a:txBody>
+                  <a:tcPr/>
+                </a:tc>
+                <a:tc>
+                  <a:txBody>
+                    <a:bodyPr/>
+                    <a:lstStyle/>
+                    <a:p>
+                      <a:r>
+                        <a:rPr lang="en-US" dirty="0" smtClean="0"/>
+                        <a:t>Example use</a:t>
+                      </a:r>
+                      <a:endParaRPr lang="en-US" dirty="0"/>
+                    </a:p>
+                  </a:txBody>
+                  <a:tcPr/>
+                </a:tc>
+                <a:tc>
+                  <a:txBody>
+                    <a:bodyPr/>
+                    <a:lstStyle/>
+                    <a:p>
+                      <a:r>
+                        <a:rPr lang="en-US" dirty="0" smtClean="0"/>
+                        <a:t>Algorithm</a:t>
+                      </a:r>
+                      <a:endParaRPr lang="en-US" dirty="0"/>
+                    </a:p>
+                  </a:txBody>
+                  <a:tcPr/>
+                </a:tc>
+              </a:tr>
+              <a:tr h="370840">
+                <a:tc>
+                  <a:txBody>
+                    <a:bodyPr/>
+                    <a:lstStyle/>
+                    <a:p>
+                      <a:r>
+                        <a:rPr lang="en-US" dirty="0" smtClean="0"/>
+                        <a:t>Classification</a:t>
+                      </a:r>
+                      <a:endParaRPr lang="en-US" dirty="0"/>
+                    </a:p>
+                  </a:txBody>
+                  <a:tcPr/>
+                </a:tc>
+                <a:tc>
+                  <a:txBody>
+                    <a:bodyPr/>
+                    <a:lstStyle/>
+                    <a:p>
+                      <a:r>
+                        <a:rPr lang="en-US" dirty="0" smtClean="0"/>
+                        <a:t>Spam Detection, Image Recognition</a:t>
+                      </a:r>
+                      <a:endParaRPr lang="en-US" dirty="0"/>
+                    </a:p>
+                  </a:txBody>
+                  <a:tcPr/>
+                </a:tc>
+                <a:tc>
+                  <a:txBody>
+                    <a:bodyPr/>
+                    <a:lstStyle/>
+                    <a:p>
+                      <a:r>
+                        <a:rPr lang="en-US" dirty="0" smtClean="0"/>
+                        <a:t>SVM, random forest, nearest</a:t>
+                      </a:r>
+                      <a:r>
+                        <a:rPr lang="en-US" baseline="0" dirty="0" smtClean="0"/>
+                        <a:t> neighbours</a:t>
+                      </a:r>
+                      <a:endParaRPr lang="en-US" dirty="0"/>
+                    </a:p>
+                  </a:txBody>
+                  <a:tcPr/>
+                </a:tc>
+              </a:tr>
+              <a:tr h="370840">
+                <a:tc>
+                  <a:txBody>
+                    <a:bodyPr/>
+                    <a:lstStyle/>
+                    <a:p>
+                      <a:r>
+                        <a:rPr lang="en-US" dirty="0" smtClean="0"/>
+                        <a:t>Regression</a:t>
+                      </a:r>
+                      <a:endParaRPr lang="en-US" dirty="0"/>
+                    </a:p>
+                  </a:txBody>
+                  <a:tcPr/>
+                </a:tc>
+                <a:tc>
+                  <a:txBody>
+                    <a:bodyPr/>
+                    <a:lstStyle/>
+                    <a:p>
+                      <a:r>
+                        <a:rPr lang="en-US" dirty="0" smtClean="0"/>
+                        <a:t>Drug response, stock prices</a:t>
+                      </a:r>
+                      <a:endParaRPr lang="en-US" dirty="0"/>
+                    </a:p>
+                  </a:txBody>
+                  <a:tcPr/>
+                </a:tc>
+                <a:tc>
+                  <a:txBody>
+                    <a:bodyPr/>
+                    <a:lstStyle/>
+                    <a:p>
+                      <a:r>
+                        <a:rPr lang="en-US" dirty="0" smtClean="0"/>
+                        <a:t>SVR, Ridge regression, LASSO</a:t>
+                      </a:r>
+                      <a:endParaRPr lang="en-US" dirty="0"/>
+                    </a:p>
+                  </a:txBody>
+                  <a:tcPr/>
+                </a:tc>
+              </a:tr>
+              <a:tr h="370840">
+                <a:tc>
+                  <a:txBody>
+                    <a:bodyPr/>
+                    <a:lstStyle/>
+                    <a:p>
+                      <a:r>
+                        <a:rPr lang="en-US" dirty="0" smtClean="0"/>
+                        <a:t>Clustering</a:t>
+                      </a:r>
+                      <a:endParaRPr lang="en-US" dirty="0"/>
+                    </a:p>
+                  </a:txBody>
+                  <a:tcPr/>
+                </a:tc>
+                <a:tc>
+                  <a:txBody>
+                    <a:bodyPr/>
+                    <a:lstStyle/>
+                    <a:p>
+                      <a:r>
+                        <a:rPr lang="en-US" dirty="0" smtClean="0"/>
+                        <a:t>Customer segmentation, grouping experiment outcomes</a:t>
+                      </a:r>
+                      <a:endParaRPr lang="en-US" dirty="0"/>
+                    </a:p>
+                  </a:txBody>
+                  <a:tcPr/>
+                </a:tc>
+                <a:tc>
+                  <a:txBody>
+                    <a:bodyPr/>
+                    <a:lstStyle/>
+                    <a:p>
+                      <a:r>
+                        <a:rPr lang="en-US" dirty="0" smtClean="0"/>
+                        <a:t>K-Means, Spectral Clustering, mean-shift</a:t>
+                      </a:r>
+                      <a:endParaRPr lang="en-US" dirty="0"/>
+                    </a:p>
+                  </a:txBody>
+                  <a:tcPr/>
+                </a:tc>
+              </a:tr>
+              <a:tr h="370840">
+                <a:tc>
+                  <a:txBody>
+                    <a:bodyPr/>
+                    <a:lstStyle/>
+                    <a:p>
+                      <a:r>
+                        <a:rPr lang="en-US" dirty="0" smtClean="0"/>
+                        <a:t>Dimensionality Reduction</a:t>
+                      </a:r>
+                      <a:endParaRPr lang="en-US" dirty="0"/>
+                    </a:p>
+                  </a:txBody>
+                  <a:tcPr/>
+                </a:tc>
+                <a:tc>
+                  <a:txBody>
+                    <a:bodyPr/>
+                    <a:lstStyle/>
+                    <a:p>
+                      <a:r>
+                        <a:rPr lang="en-US" dirty="0" smtClean="0"/>
+                        <a:t>Visualization, increased efficiency</a:t>
+                      </a:r>
+                      <a:endParaRPr lang="en-US" dirty="0"/>
+                    </a:p>
+                  </a:txBody>
+                  <a:tcPr/>
+                </a:tc>
+                <a:tc>
+                  <a:txBody>
+                    <a:bodyPr/>
+                    <a:lstStyle/>
+                    <a:p>
+                      <a:r>
+                        <a:rPr lang="en-US" dirty="0" smtClean="0"/>
+                        <a:t>PCA, Feature Selection, non-negative</a:t>
+                      </a:r>
+                      <a:r>
+                        <a:rPr lang="en-US" baseline="0" dirty="0" smtClean="0"/>
+                        <a:t> matrix factorisation</a:t>
+                      </a:r>
+                      <a:endParaRPr lang="en-US" dirty="0"/>
+                    </a:p>
+                  </a:txBody>
+                  <a:tcPr/>
+                </a:tc>
+              </a:tr>
+              <a:tr h="370840">
+                <a:tc>
+                  <a:txBody>
+                    <a:bodyPr/>
+                    <a:lstStyle/>
+                    <a:p>
+                      <a:r>
+                        <a:rPr lang="en-US" dirty="0" smtClean="0"/>
+                        <a:t>Model Selection</a:t>
+                      </a:r>
+                      <a:endParaRPr lang="en-US" dirty="0"/>
+                    </a:p>
+                  </a:txBody>
+                  <a:tcPr/>
+                </a:tc>
+                <a:tc>
+                  <a:txBody>
+                    <a:bodyPr/>
+                    <a:lstStyle/>
+                    <a:p>
+                      <a:r>
+                        <a:rPr lang="en-US" dirty="0" smtClean="0"/>
+                        <a:t>Improved accuracy via parameter tuning</a:t>
+                      </a:r>
+                      <a:endParaRPr lang="en-US" dirty="0"/>
+                    </a:p>
+                  </a:txBody>
+                  <a:tcPr/>
+                </a:tc>
+                <a:tc>
+                  <a:txBody>
+                    <a:bodyPr/>
+                    <a:lstStyle/>
+                    <a:p>
+                      <a:r>
+                        <a:rPr lang="en-US" dirty="0" smtClean="0"/>
+                        <a:t>Grid</a:t>
+                      </a:r>
+                      <a:r>
+                        <a:rPr lang="en-US" baseline="0" dirty="0" smtClean="0"/>
+                        <a:t> search, cross validation, metrics</a:t>
+                      </a:r>
+                      <a:endParaRPr lang="en-US" dirty="0"/>
+                    </a:p>
+                  </a:txBody>
+                  <a:tcPr/>
+                </a:tc>
+              </a:tr>
+              <a:tr h="370840">
+                <a:tc>
+                  <a:txBody>
+                    <a:bodyPr/>
+                    <a:lstStyle/>
+                    <a:p>
+                      <a:r>
+                        <a:rPr lang="en-US" dirty="0" smtClean="0"/>
+                        <a:t>Preprocessing</a:t>
+                      </a:r>
+                      <a:endParaRPr lang="en-US" dirty="0"/>
+                    </a:p>
+                  </a:txBody>
+                  <a:tcPr/>
+                </a:tc>
+                <a:tc>
+                  <a:txBody>
+                    <a:bodyPr/>
+                    <a:lstStyle/>
+                    <a:p>
+                      <a:r>
+                        <a:rPr lang="en-US" dirty="0" smtClean="0"/>
+                        <a:t>Transforming</a:t>
+                      </a:r>
+                      <a:r>
+                        <a:rPr lang="en-US" baseline="0" dirty="0" smtClean="0"/>
+                        <a:t> data (</a:t>
+                      </a:r>
+                      <a:r>
+                        <a:rPr lang="en-US" baseline="0" dirty="0" err="1" smtClean="0"/>
+                        <a:t>i.e</a:t>
+                      </a:r>
+                      <a:r>
+                        <a:rPr lang="en-US" baseline="0" dirty="0" smtClean="0"/>
+                        <a:t> text) for use in ML algorithms</a:t>
+                      </a:r>
+                      <a:endParaRPr lang="en-US" dirty="0"/>
+                    </a:p>
+                  </a:txBody>
+                  <a:tcPr/>
+                </a:tc>
+                <a:tc>
+                  <a:txBody>
+                    <a:bodyPr/>
+                    <a:lstStyle/>
+                    <a:p>
+                      <a:r>
+                        <a:rPr lang="en-US" dirty="0" smtClean="0"/>
+                        <a:t>Feature Extraction</a:t>
+                      </a:r>
+                      <a:endParaRPr lang="en-US" dirty="0"/>
+                    </a:p>
+                  </a:txBody>
+                  <a:tcPr/>
+                </a:tc>
+              </a:tr>
+            </a:tbl>
+          </a:graphicData>
+        </a:graphic>
+      </p:graphicFrame>
+      <p:sp>
+        <p:nvSpPr>
+          <p:cNvPr id="5" name="Rectangle 4"/>
+          <p:cNvSpPr/>
+          <p:nvPr/>
+        </p:nvSpPr>
+        <p:spPr>
+          <a:xfrm>
+            <a:off x="5545074" y="6173126"/>
+            <a:ext cx="1897186" cy="276999"/>
+          </a:xfrm>
+          <a:prstGeom prst="rect">
+            <a:avLst/>
+          </a:prstGeom>
+        </p:spPr>
+        <p:txBody>
+          <a:bodyPr wrap="none">
+            <a:spAutoFit/>
+          </a:bodyPr>
+          <a:lstStyle/>
+          <a:p>
+            <a:r>
+              <a:rPr lang="en-US" sz="1200" dirty="0" smtClean="0"/>
+              <a:t>Taken from </a:t>
+            </a:r>
+            <a:r>
+              <a:rPr lang="en-US" sz="1200" dirty="0" err="1" smtClean="0"/>
+              <a:t>skikit-learn.org</a:t>
+            </a:r>
+            <a:endParaRPr lang="en-US" sz="1200" dirty="0"/>
+          </a:p>
+        </p:txBody>
+      </p:sp>
+    </p:spTree>
+    <p:extLst>
+      <p:ext uri="{BB962C8B-B14F-4D97-AF65-F5344CB8AC3E}">
+        <p14:creationId xmlns:p14="http://schemas.microsoft.com/office/powerpoint/2010/main" val="1250834394"/>
+      </p:ext>
+    </p:extLst>
+  </p:cSld>
+  <p:clrMapOvr>
+    <a:masterClrMapping/>
+  </p:clrMapOvr>
+  <p:timing>
+    <p:tnLst>
+      <p:par>
+        <p:cTn id="1" dur="indefinite" restart="never" nodeType="tmRoot"/>
+      </p:par>
+    </p:tnLst>
+  </p:timing>
+</p:sld>
+</file>
+
+<file path=ppt/slides/slide11.xml><?xml version="1.0" encoding="utf-8"?>
+<p:sld xmlns:a="http://schemas.openxmlformats.org/drawingml/2006/main" xmlns:r="http://schemas.openxmlformats.org/officeDocument/2006/relationships" xmlns:p="http://schemas.openxmlformats.org/presentationml/2006/main">
+  <p:cSld>
+    <p:spTree>
+      <p:nvGrpSpPr>
+        <p:cNvPr id="1" name=""/>
+        <p:cNvGrpSpPr/>
+        <p:nvPr/>
+      </p:nvGrpSpPr>
+      <p:grpSpPr>
+        <a:xfrm>
+          <a:off x="0" y="0"/>
+          <a:ext cx="0" cy="0"/>
+          <a:chOff x="0" y="0"/>
+          <a:chExt cx="0" cy="0"/>
+        </a:xfrm>
+      </p:grpSpPr>
+      <p:sp>
+        <p:nvSpPr>
+          <p:cNvPr id="2" name="Title 1"/>
+          <p:cNvSpPr>
+            <a:spLocks noGrp="1"/>
+          </p:cNvSpPr>
+          <p:nvPr>
+            <p:ph type="title"/>
           </p:nvPr>
         </p:nvSpPr>
         <p:spPr/>
@@ -6591,7 +7044,380 @@
           <a:bodyPr/>
           <a:lstStyle/>
           <a:p>
+            <a:r>
+              <a:rPr lang="en-US" dirty="0" smtClean="0"/>
+              <a:t>Practical 1.1 – Decision Trees</a:t>
+            </a:r>
             <a:endParaRPr lang="en-US" dirty="0"/>
+          </a:p>
+        </p:txBody>
+      </p:sp>
+      <p:sp>
+        <p:nvSpPr>
+          <p:cNvPr id="3" name="Content Placeholder 2"/>
+          <p:cNvSpPr>
+            <a:spLocks noGrp="1"/>
+          </p:cNvSpPr>
+          <p:nvPr>
+            <p:ph idx="1"/>
+          </p:nvPr>
+        </p:nvSpPr>
+        <p:spPr>
+          <a:xfrm>
+            <a:off x="1484310" y="2727960"/>
+            <a:ext cx="10018713" cy="3108960"/>
+          </a:xfrm>
+        </p:spPr>
+        <p:txBody>
+          <a:bodyPr/>
+          <a:lstStyle/>
+          <a:p>
+            <a:pPr marL="457200" indent="-457200">
+              <a:buFont typeface="+mj-lt"/>
+              <a:buAutoNum type="arabicPeriod"/>
+            </a:pPr>
+            <a:r>
+              <a:rPr lang="en-US" dirty="0" smtClean="0"/>
+              <a:t>Enter </a:t>
+            </a:r>
+            <a:r>
+              <a:rPr lang="en-US" dirty="0"/>
+              <a:t>the folder </a:t>
+            </a:r>
+            <a:r>
+              <a:rPr lang="en-US" dirty="0" smtClean="0"/>
+              <a:t>‘Practical-1-1-DT’</a:t>
+            </a:r>
+          </a:p>
+          <a:p>
+            <a:pPr marL="457200" indent="-457200">
+              <a:buFont typeface="+mj-lt"/>
+              <a:buAutoNum type="arabicPeriod"/>
+            </a:pPr>
+            <a:r>
+              <a:rPr lang="en-US" dirty="0" smtClean="0"/>
+              <a:t>Open ‘</a:t>
+            </a:r>
+            <a:r>
+              <a:rPr lang="en-US" dirty="0" err="1" smtClean="0"/>
+              <a:t>apples.py</a:t>
+            </a:r>
+            <a:r>
+              <a:rPr lang="en-US" dirty="0" smtClean="0"/>
+              <a:t>’, run the example, and make changes to the features, labels, and trying your own pieces of fruit. Try and understand what is happening.</a:t>
+            </a:r>
+          </a:p>
+          <a:p>
+            <a:pPr marL="457200" indent="-457200">
+              <a:buFont typeface="+mj-lt"/>
+              <a:buAutoNum type="arabicPeriod"/>
+            </a:pPr>
+            <a:r>
+              <a:rPr lang="en-US" dirty="0" smtClean="0"/>
+              <a:t>A ’</a:t>
+            </a:r>
+            <a:r>
+              <a:rPr lang="en-US" dirty="0" err="1" smtClean="0"/>
+              <a:t>tree.dot</a:t>
+            </a:r>
+            <a:r>
+              <a:rPr lang="en-US" dirty="0" smtClean="0"/>
+              <a:t>’ file will be created from running ’</a:t>
+            </a:r>
+            <a:r>
+              <a:rPr lang="en-US" dirty="0" err="1" smtClean="0"/>
+              <a:t>apples.py</a:t>
+            </a:r>
+            <a:r>
+              <a:rPr lang="en-US" dirty="0" smtClean="0"/>
+              <a:t>’. Use $ bash </a:t>
+            </a:r>
+            <a:r>
+              <a:rPr lang="en-US" dirty="0" err="1" smtClean="0"/>
+              <a:t>apples.sh</a:t>
+            </a:r>
+            <a:r>
+              <a:rPr lang="en-US" dirty="0" smtClean="0"/>
+              <a:t> $ to create a .</a:t>
+            </a:r>
+            <a:r>
+              <a:rPr lang="en-US" dirty="0" err="1" smtClean="0"/>
+              <a:t>png</a:t>
+            </a:r>
+            <a:r>
+              <a:rPr lang="en-US" dirty="0" smtClean="0"/>
+              <a:t> to </a:t>
+            </a:r>
+            <a:r>
+              <a:rPr lang="en-US" dirty="0" err="1" smtClean="0"/>
+              <a:t>visualise</a:t>
+            </a:r>
+            <a:r>
+              <a:rPr lang="en-US" dirty="0" smtClean="0"/>
+              <a:t> the decision tree.</a:t>
+            </a:r>
+          </a:p>
+        </p:txBody>
+      </p:sp>
+    </p:spTree>
+    <p:extLst>
+      <p:ext uri="{BB962C8B-B14F-4D97-AF65-F5344CB8AC3E}">
+        <p14:creationId xmlns:p14="http://schemas.microsoft.com/office/powerpoint/2010/main" val="1734546924"/>
+      </p:ext>
+    </p:extLst>
+  </p:cSld>
+  <p:clrMapOvr>
+    <a:masterClrMapping/>
+  </p:clrMapOvr>
+  <p:timing>
+    <p:tnLst>
+      <p:par>
+        <p:cTn id="1" dur="indefinite" restart="never" nodeType="tmRoot"/>
+      </p:par>
+    </p:tnLst>
+  </p:timing>
+</p:sld>
+</file>
+
+<file path=ppt/slides/slide12.xml><?xml version="1.0" encoding="utf-8"?>
+<p:sld xmlns:a="http://schemas.openxmlformats.org/drawingml/2006/main" xmlns:r="http://schemas.openxmlformats.org/officeDocument/2006/relationships" xmlns:p="http://schemas.openxmlformats.org/presentationml/2006/main">
+  <p:cSld>
+    <p:spTree>
+      <p:nvGrpSpPr>
+        <p:cNvPr id="1" name=""/>
+        <p:cNvGrpSpPr/>
+        <p:nvPr/>
+      </p:nvGrpSpPr>
+      <p:grpSpPr>
+        <a:xfrm>
+          <a:off x="0" y="0"/>
+          <a:ext cx="0" cy="0"/>
+          <a:chOff x="0" y="0"/>
+          <a:chExt cx="0" cy="0"/>
+        </a:xfrm>
+      </p:grpSpPr>
+      <p:sp>
+        <p:nvSpPr>
+          <p:cNvPr id="2" name="Title 1"/>
+          <p:cNvSpPr>
+            <a:spLocks noGrp="1"/>
+          </p:cNvSpPr>
+          <p:nvPr>
+            <p:ph type="title"/>
+          </p:nvPr>
+        </p:nvSpPr>
+        <p:spPr/>
+        <p:txBody>
+          <a:bodyPr/>
+          <a:lstStyle/>
+          <a:p>
+            <a:r>
+              <a:rPr lang="en-US" dirty="0" smtClean="0"/>
+              <a:t>Practical 1.2 – Classification &amp; Iris Dataset</a:t>
+            </a:r>
+            <a:endParaRPr lang="en-US" dirty="0"/>
+          </a:p>
+        </p:txBody>
+      </p:sp>
+      <p:sp>
+        <p:nvSpPr>
+          <p:cNvPr id="3" name="Content Placeholder 2"/>
+          <p:cNvSpPr>
+            <a:spLocks noGrp="1"/>
+          </p:cNvSpPr>
+          <p:nvPr>
+            <p:ph idx="1"/>
+          </p:nvPr>
+        </p:nvSpPr>
+        <p:spPr>
+          <a:xfrm>
+            <a:off x="1484310" y="2865119"/>
+            <a:ext cx="10018713" cy="2926081"/>
+          </a:xfrm>
+        </p:spPr>
+        <p:txBody>
+          <a:bodyPr>
+            <a:normAutofit/>
+          </a:bodyPr>
+          <a:lstStyle/>
+          <a:p>
+            <a:pPr marL="457200" indent="-457200">
+              <a:buFont typeface="+mj-lt"/>
+              <a:buAutoNum type="arabicPeriod"/>
+            </a:pPr>
+            <a:r>
+              <a:rPr lang="en-US" dirty="0"/>
+              <a:t>Enter the folder ‘Practical-1-1-DT</a:t>
+            </a:r>
+            <a:r>
+              <a:rPr lang="en-US" dirty="0" smtClean="0"/>
+              <a:t>’</a:t>
+            </a:r>
+          </a:p>
+          <a:p>
+            <a:pPr marL="457200" indent="-457200">
+              <a:buFont typeface="+mj-lt"/>
+              <a:buAutoNum type="arabicPeriod"/>
+            </a:pPr>
+            <a:r>
+              <a:rPr lang="en-US" dirty="0" smtClean="0"/>
+              <a:t>Open ‘</a:t>
+            </a:r>
+            <a:r>
+              <a:rPr lang="en-US" dirty="0" err="1" smtClean="0"/>
+              <a:t>iris.py</a:t>
+            </a:r>
+            <a:r>
+              <a:rPr lang="en-US" dirty="0" smtClean="0"/>
+              <a:t>’, run the example, and make changes to the code, such as features, labels etc. </a:t>
+            </a:r>
+          </a:p>
+          <a:p>
+            <a:pPr marL="457200" indent="-457200">
+              <a:buFont typeface="+mj-lt"/>
+              <a:buAutoNum type="arabicPeriod"/>
+            </a:pPr>
+            <a:r>
+              <a:rPr lang="en-US" dirty="0" smtClean="0"/>
+              <a:t>Complete Tasks 1 and 2 by implementing iris_dataset_2 and 3. </a:t>
+            </a:r>
+          </a:p>
+          <a:p>
+            <a:pPr marL="457200" indent="-457200">
+              <a:buFont typeface="+mj-lt"/>
+              <a:buAutoNum type="arabicPeriod"/>
+            </a:pPr>
+            <a:r>
+              <a:rPr lang="en-US" dirty="0" smtClean="0"/>
+              <a:t>For a challenge, complete Task 3 by using another dataset. </a:t>
+            </a:r>
+          </a:p>
+          <a:p>
+            <a:pPr marL="0" indent="0">
+              <a:buNone/>
+            </a:pPr>
+            <a:r>
+              <a:rPr lang="en-US" dirty="0" smtClean="0"/>
+              <a:t>Attempt all of the tasks before looking at the solutions-</a:t>
+            </a:r>
+            <a:r>
+              <a:rPr lang="en-US" dirty="0" err="1" smtClean="0"/>
+              <a:t>iris.py</a:t>
+            </a:r>
+            <a:r>
+              <a:rPr lang="en-US" dirty="0" smtClean="0"/>
+              <a:t> file.</a:t>
+            </a:r>
+            <a:endParaRPr lang="en-US" dirty="0"/>
+          </a:p>
+        </p:txBody>
+      </p:sp>
+    </p:spTree>
+    <p:extLst>
+      <p:ext uri="{BB962C8B-B14F-4D97-AF65-F5344CB8AC3E}">
+        <p14:creationId xmlns:p14="http://schemas.microsoft.com/office/powerpoint/2010/main" val="1055987457"/>
+      </p:ext>
+    </p:extLst>
+  </p:cSld>
+  <p:clrMapOvr>
+    <a:masterClrMapping/>
+  </p:clrMapOvr>
+  <p:timing>
+    <p:tnLst>
+      <p:par>
+        <p:cTn id="1" dur="indefinite" restart="never" nodeType="tmRoot"/>
+      </p:par>
+    </p:tnLst>
+  </p:timing>
+</p:sld>
+</file>
+
+<file path=ppt/slides/slide13.xml><?xml version="1.0" encoding="utf-8"?>
+<p:sld xmlns:a="http://schemas.openxmlformats.org/drawingml/2006/main" xmlns:r="http://schemas.openxmlformats.org/officeDocument/2006/relationships" xmlns:p="http://schemas.openxmlformats.org/presentationml/2006/main">
+  <p:cSld>
+    <p:spTree>
+      <p:nvGrpSpPr>
+        <p:cNvPr id="1" name=""/>
+        <p:cNvGrpSpPr/>
+        <p:nvPr/>
+      </p:nvGrpSpPr>
+      <p:grpSpPr>
+        <a:xfrm>
+          <a:off x="0" y="0"/>
+          <a:ext cx="0" cy="0"/>
+          <a:chOff x="0" y="0"/>
+          <a:chExt cx="0" cy="0"/>
+        </a:xfrm>
+      </p:grpSpPr>
+      <p:sp>
+        <p:nvSpPr>
+          <p:cNvPr id="2" name="Title 1"/>
+          <p:cNvSpPr>
+            <a:spLocks noGrp="1"/>
+          </p:cNvSpPr>
+          <p:nvPr>
+            <p:ph type="title"/>
+          </p:nvPr>
+        </p:nvSpPr>
+        <p:spPr/>
+        <p:txBody>
+          <a:bodyPr/>
+          <a:lstStyle/>
+          <a:p>
+            <a:r>
+              <a:rPr lang="en-US" dirty="0" smtClean="0"/>
+              <a:t>Summary</a:t>
+            </a:r>
+            <a:endParaRPr lang="en-US" dirty="0"/>
+          </a:p>
+        </p:txBody>
+      </p:sp>
+      <p:sp>
+        <p:nvSpPr>
+          <p:cNvPr id="3" name="Content Placeholder 2"/>
+          <p:cNvSpPr>
+            <a:spLocks noGrp="1"/>
+          </p:cNvSpPr>
+          <p:nvPr>
+            <p:ph idx="1"/>
+          </p:nvPr>
+        </p:nvSpPr>
+        <p:spPr/>
+        <p:txBody>
+          <a:bodyPr/>
+          <a:lstStyle/>
+          <a:p>
+            <a:endParaRPr lang="en-US" dirty="0"/>
+          </a:p>
+        </p:txBody>
+      </p:sp>
+      <p:sp>
+        <p:nvSpPr>
+          <p:cNvPr id="4" name="TextBox 3"/>
+          <p:cNvSpPr txBox="1"/>
+          <p:nvPr/>
+        </p:nvSpPr>
+        <p:spPr>
+          <a:xfrm>
+            <a:off x="5577840" y="6416041"/>
+            <a:ext cx="6431280" cy="307777"/>
+          </a:xfrm>
+          <a:prstGeom prst="rect">
+            <a:avLst/>
+          </a:prstGeom>
+          <a:noFill/>
+        </p:spPr>
+        <p:txBody>
+          <a:bodyPr wrap="square" rtlCol="0">
+            <a:spAutoFit/>
+          </a:bodyPr>
+          <a:lstStyle/>
+          <a:p>
+            <a:r>
+              <a:rPr lang="en-US" sz="1400" dirty="0"/>
+              <a:t>This work was supported by an EPSRC Doctoral Training Centre grant (EP/L015382/1)</a:t>
+            </a:r>
+            <a:endParaRPr lang="en-US" sz="1400" dirty="0"/>
           </a:p>
         </p:txBody>
       </p:sp>
@@ -6649,7 +7475,7 @@
           <a:p>
             <a:r>
               <a:rPr lang="en-US" dirty="0" smtClean="0"/>
-              <a:t>Overview (Open for Suggestions)</a:t>
+              <a:t>Overview</a:t>
             </a:r>
             <a:endParaRPr lang="en-US" dirty="0"/>
           </a:p>
@@ -6696,8 +7522,9 @@
             </a:pPr>
             <a:r>
               <a:rPr lang="en-US" dirty="0" smtClean="0"/>
-              <a:t>TensorFlow for Poets</a:t>
-            </a:r>
+              <a:t>Practical 1 – Decision Trees/K-Means</a:t>
+            </a:r>
+            <a:endParaRPr lang="en-US" dirty="0" smtClean="0"/>
           </a:p>
           <a:p>
             <a:pPr marL="457200" indent="-457200">
@@ -6706,7 +7533,7 @@
             </a:pPr>
             <a:r>
               <a:rPr lang="en-US" dirty="0" smtClean="0"/>
-              <a:t>Hands-on with Installation</a:t>
+              <a:t>More Theory</a:t>
             </a:r>
           </a:p>
           <a:p>
@@ -6716,9 +7543,9 @@
             </a:pPr>
             <a:r>
               <a:rPr lang="en-US" dirty="0" smtClean="0"/>
-              <a:t>Summary</a:t>
-            </a:r>
-            <a:endParaRPr lang="en-US" dirty="0"/>
+              <a:t>Practical 2 – TBD</a:t>
+            </a:r>
+            <a:endParaRPr lang="en-US" dirty="0" smtClean="0"/>
           </a:p>
         </p:txBody>
       </p:sp>
@@ -6735,7 +7562,275 @@
   <p:timing>
     <p:tnLst>
       <p:par>
-        <p:cTn id="1" dur="indefinite" restart="never" nodeType="tmRoot"/>
+        <p:cTn id="1" dur="indefinite" restart="never" nodeType="tmRoot">
+          <p:childTnLst>
+            <p:seq concurrent="1" nextAc="seek">
+              <p:cTn id="2" dur="indefinite" nodeType="mainSeq">
+                <p:childTnLst>
+                  <p:par>
+                    <p:cTn id="3" fill="hold">
+                      <p:stCondLst>
+                        <p:cond delay="indefinite"/>
+                      </p:stCondLst>
+                      <p:childTnLst>
+                        <p:par>
+                          <p:cTn id="4" fill="hold">
+                            <p:stCondLst>
+                              <p:cond delay="0"/>
+                            </p:stCondLst>
+                            <p:childTnLst>
+                              <p:par>
+                                <p:cTn id="5" presetID="1" presetClass="entr" presetSubtype="0" fill="hold" nodeType="clickEffect">
+                                  <p:stCondLst>
+                                    <p:cond delay="0"/>
+                                  </p:stCondLst>
+                                  <p:childTnLst>
+                                    <p:set>
+                                      <p:cBhvr>
+                                        <p:cTn id="6" dur="1" fill="hold">
+                                          <p:stCondLst>
+                                            <p:cond delay="0"/>
+                                          </p:stCondLst>
+                                        </p:cTn>
+                                        <p:tgtEl>
+                                          <p:spTgt spid="3">
+                                            <p:txEl>
+                                              <p:pRg st="0" end="0"/>
+                                            </p:txEl>
+                                          </p:spTgt>
+                                        </p:tgtEl>
+                                        <p:attrNameLst>
+                                          <p:attrName>style.visibility</p:attrName>
+                                        </p:attrNameLst>
+                                      </p:cBhvr>
+                                      <p:to>
+                                        <p:strVal val="visible"/>
+                                      </p:to>
+                                    </p:set>
+                                  </p:childTnLst>
+                                </p:cTn>
+                              </p:par>
+                            </p:childTnLst>
+                          </p:cTn>
+                        </p:par>
+                      </p:childTnLst>
+                    </p:cTn>
+                  </p:par>
+                  <p:par>
+                    <p:cTn id="7" fill="hold">
+                      <p:stCondLst>
+                        <p:cond delay="indefinite"/>
+                      </p:stCondLst>
+                      <p:childTnLst>
+                        <p:par>
+                          <p:cTn id="8" fill="hold">
+                            <p:stCondLst>
+                              <p:cond delay="0"/>
+                            </p:stCondLst>
+                            <p:childTnLst>
+                              <p:par>
+                                <p:cTn id="9" presetID="1" presetClass="entr" presetSubtype="0" fill="hold" nodeType="clickEffect">
+                                  <p:stCondLst>
+                                    <p:cond delay="0"/>
+                                  </p:stCondLst>
+                                  <p:childTnLst>
+                                    <p:set>
+                                      <p:cBhvr>
+                                        <p:cTn id="10" dur="1" fill="hold">
+                                          <p:stCondLst>
+                                            <p:cond delay="0"/>
+                                          </p:stCondLst>
+                                        </p:cTn>
+                                        <p:tgtEl>
+                                          <p:spTgt spid="3">
+                                            <p:txEl>
+                                              <p:pRg st="1" end="1"/>
+                                            </p:txEl>
+                                          </p:spTgt>
+                                        </p:tgtEl>
+                                        <p:attrNameLst>
+                                          <p:attrName>style.visibility</p:attrName>
+                                        </p:attrNameLst>
+                                      </p:cBhvr>
+                                      <p:to>
+                                        <p:strVal val="visible"/>
+                                      </p:to>
+                                    </p:set>
+                                  </p:childTnLst>
+                                </p:cTn>
+                              </p:par>
+                            </p:childTnLst>
+                          </p:cTn>
+                        </p:par>
+                      </p:childTnLst>
+                    </p:cTn>
+                  </p:par>
+                  <p:par>
+                    <p:cTn id="11" fill="hold">
+                      <p:stCondLst>
+                        <p:cond delay="indefinite"/>
+                      </p:stCondLst>
+                      <p:childTnLst>
+                        <p:par>
+                          <p:cTn id="12" fill="hold">
+                            <p:stCondLst>
+                              <p:cond delay="0"/>
+                            </p:stCondLst>
+                            <p:childTnLst>
+                              <p:par>
+                                <p:cTn id="13" presetID="1" presetClass="entr" presetSubtype="0" fill="hold" nodeType="clickEffect">
+                                  <p:stCondLst>
+                                    <p:cond delay="0"/>
+                                  </p:stCondLst>
+                                  <p:childTnLst>
+                                    <p:set>
+                                      <p:cBhvr>
+                                        <p:cTn id="14" dur="1" fill="hold">
+                                          <p:stCondLst>
+                                            <p:cond delay="0"/>
+                                          </p:stCondLst>
+                                        </p:cTn>
+                                        <p:tgtEl>
+                                          <p:spTgt spid="3">
+                                            <p:txEl>
+                                              <p:pRg st="2" end="2"/>
+                                            </p:txEl>
+                                          </p:spTgt>
+                                        </p:tgtEl>
+                                        <p:attrNameLst>
+                                          <p:attrName>style.visibility</p:attrName>
+                                        </p:attrNameLst>
+                                      </p:cBhvr>
+                                      <p:to>
+                                        <p:strVal val="visible"/>
+                                      </p:to>
+                                    </p:set>
+                                  </p:childTnLst>
+                                </p:cTn>
+                              </p:par>
+                            </p:childTnLst>
+                          </p:cTn>
+                        </p:par>
+                      </p:childTnLst>
+                    </p:cTn>
+                  </p:par>
+                  <p:par>
+                    <p:cTn id="15" fill="hold">
+                      <p:stCondLst>
+                        <p:cond delay="indefinite"/>
+                      </p:stCondLst>
+                      <p:childTnLst>
+                        <p:par>
+                          <p:cTn id="16" fill="hold">
+                            <p:stCondLst>
+                              <p:cond delay="0"/>
+                            </p:stCondLst>
+                            <p:childTnLst>
+                              <p:par>
+                                <p:cTn id="17" presetID="1" presetClass="entr" presetSubtype="0" fill="hold" nodeType="clickEffect">
+                                  <p:stCondLst>
+                                    <p:cond delay="0"/>
+                                  </p:stCondLst>
+                                  <p:childTnLst>
+                                    <p:set>
+                                      <p:cBhvr>
+                                        <p:cTn id="18" dur="1" fill="hold">
+                                          <p:stCondLst>
+                                            <p:cond delay="0"/>
+                                          </p:stCondLst>
+                                        </p:cTn>
+                                        <p:tgtEl>
+                                          <p:spTgt spid="3">
+                                            <p:txEl>
+                                              <p:pRg st="3" end="3"/>
+                                            </p:txEl>
+                                          </p:spTgt>
+                                        </p:tgtEl>
+                                        <p:attrNameLst>
+                                          <p:attrName>style.visibility</p:attrName>
+                                        </p:attrNameLst>
+                                      </p:cBhvr>
+                                      <p:to>
+                                        <p:strVal val="visible"/>
+                                      </p:to>
+                                    </p:set>
+                                  </p:childTnLst>
+                                </p:cTn>
+                              </p:par>
+                            </p:childTnLst>
+                          </p:cTn>
+                        </p:par>
+                      </p:childTnLst>
+                    </p:cTn>
+                  </p:par>
+                  <p:par>
+                    <p:cTn id="19" fill="hold">
+                      <p:stCondLst>
+                        <p:cond delay="indefinite"/>
+                      </p:stCondLst>
+                      <p:childTnLst>
+                        <p:par>
+                          <p:cTn id="20" fill="hold">
+                            <p:stCondLst>
+                              <p:cond delay="0"/>
+                            </p:stCondLst>
+                            <p:childTnLst>
+                              <p:par>
+                                <p:cTn id="21" presetID="1" presetClass="entr" presetSubtype="0" fill="hold" nodeType="clickEffect">
+                                  <p:stCondLst>
+                                    <p:cond delay="0"/>
+                                  </p:stCondLst>
+                                  <p:childTnLst>
+                                    <p:set>
+                                      <p:cBhvr>
+                                        <p:cTn id="22" dur="1" fill="hold">
+                                          <p:stCondLst>
+                                            <p:cond delay="0"/>
+                                          </p:stCondLst>
+                                        </p:cTn>
+                                        <p:tgtEl>
+                                          <p:spTgt spid="3">
+                                            <p:txEl>
+                                              <p:pRg st="4" end="4"/>
+                                            </p:txEl>
+                                          </p:spTgt>
+                                        </p:tgtEl>
+                                        <p:attrNameLst>
+                                          <p:attrName>style.visibility</p:attrName>
+                                        </p:attrNameLst>
+                                      </p:cBhvr>
+                                      <p:to>
+                                        <p:strVal val="visible"/>
+                                      </p:to>
+                                    </p:set>
+                                  </p:childTnLst>
+                                </p:cTn>
+                              </p:par>
+                            </p:childTnLst>
+                          </p:cTn>
+                        </p:par>
+                      </p:childTnLst>
+                    </p:cTn>
+                  </p:par>
+                </p:childTnLst>
+              </p:cTn>
+              <p:prevCondLst>
+                <p:cond evt="onPrev" delay="0">
+                  <p:tgtEl>
+                    <p:sldTgt/>
+                  </p:tgtEl>
+                </p:cond>
+              </p:prevCondLst>
+              <p:nextCondLst>
+                <p:cond evt="onNext" delay="0">
+                  <p:tgtEl>
+                    <p:sldTgt/>
+                  </p:tgtEl>
+                </p:cond>
+              </p:nextCondLst>
+            </p:seq>
+          </p:childTnLst>
+        </p:cTn>
       </p:par>
     </p:tnLst>
   </p:timing>
@@ -6799,17 +7894,53 @@
           <a:p>
             <a:r>
               <a:rPr lang="en-US" dirty="0" smtClean="0"/>
-              <a:t>Moderate understanding of Python, including it’s more useful library packages.</a:t>
-            </a:r>
-          </a:p>
-          <a:p>
+              <a:t>Solid understanding of Python.</a:t>
+            </a:r>
+          </a:p>
+          <a:p>
+            <a:r>
+              <a:rPr lang="en-US" dirty="0"/>
+              <a:t>No/Little understanding of Machine Learning</a:t>
+            </a:r>
             <a:r>
               <a:rPr lang="en-US" dirty="0" smtClean="0"/>
-              <a:t>No/Little understanding of Machine Learning.</a:t>
-            </a:r>
-          </a:p>
-          <a:p>
-            <a:endParaRPr lang="en-US" dirty="0"/>
+              <a:t>.</a:t>
+            </a:r>
+            <a:endParaRPr lang="en-US" dirty="0" smtClean="0"/>
+          </a:p>
+          <a:p>
+            <a:r>
+              <a:rPr lang="en-US" dirty="0" smtClean="0"/>
+              <a:t>Exposure to Pandas and </a:t>
+            </a:r>
+            <a:r>
+              <a:rPr lang="en-US" dirty="0" err="1" smtClean="0"/>
+              <a:t>NumPy</a:t>
+            </a:r>
+            <a:r>
+              <a:rPr lang="en-US" dirty="0" smtClean="0"/>
+              <a:t> beneficial.</a:t>
+            </a:r>
+            <a:endParaRPr lang="en-US" dirty="0" smtClean="0"/>
+          </a:p>
+          <a:p>
+            <a:r>
+              <a:rPr lang="en-US" dirty="0" smtClean="0"/>
+              <a:t>Knowledge of a Python IDE like </a:t>
+            </a:r>
+            <a:r>
+              <a:rPr lang="en-US" i="1" dirty="0" err="1" smtClean="0"/>
+              <a:t>spyder</a:t>
+            </a:r>
+            <a:r>
+              <a:rPr lang="en-US" i="1" dirty="0" smtClean="0"/>
+              <a:t> </a:t>
+            </a:r>
+            <a:r>
+              <a:rPr lang="en-US" dirty="0" smtClean="0"/>
+              <a:t>will be beneficial.</a:t>
+            </a:r>
+            <a:endParaRPr lang="en-US" i="1" dirty="0" smtClean="0"/>
           </a:p>
         </p:txBody>
       </p:sp>
@@ -6826,7 +7957,226 @@
   <p:timing>
     <p:tnLst>
       <p:par>
-        <p:cTn id="1" dur="indefinite" restart="never" nodeType="tmRoot"/>
+        <p:cTn id="1" dur="indefinite" restart="never" nodeType="tmRoot">
+          <p:childTnLst>
+            <p:seq concurrent="1" nextAc="seek">
+              <p:cTn id="2" dur="indefinite" nodeType="mainSeq">
+                <p:childTnLst>
+                  <p:par>
+                    <p:cTn id="3" fill="hold">
+                      <p:stCondLst>
+                        <p:cond delay="indefinite"/>
+                      </p:stCondLst>
+                      <p:childTnLst>
+                        <p:par>
+                          <p:cTn id="4" fill="hold">
+                            <p:stCondLst>
+                              <p:cond delay="0"/>
+                            </p:stCondLst>
+                            <p:childTnLst>
+                              <p:par>
+                                <p:cTn id="5" presetID="1" presetClass="entr" presetSubtype="0" fill="hold" nodeType="clickEffect">
+                                  <p:stCondLst>
+                                    <p:cond delay="0"/>
+                                  </p:stCondLst>
+                                  <p:childTnLst>
+                                    <p:set>
+                                      <p:cBhvr>
+                                        <p:cTn id="6" dur="1" fill="hold">
+                                          <p:stCondLst>
+                                            <p:cond delay="0"/>
+                                          </p:stCondLst>
+                                        </p:cTn>
+                                        <p:tgtEl>
+                                          <p:spTgt spid="3">
+                                            <p:txEl>
+                                              <p:pRg st="0" end="0"/>
+                                            </p:txEl>
+                                          </p:spTgt>
+                                        </p:tgtEl>
+                                        <p:attrNameLst>
+                                          <p:attrName>style.visibility</p:attrName>
+                                        </p:attrNameLst>
+                                      </p:cBhvr>
+                                      <p:to>
+                                        <p:strVal val="visible"/>
+                                      </p:to>
+                                    </p:set>
+                                  </p:childTnLst>
+                                </p:cTn>
+                              </p:par>
+                            </p:childTnLst>
+                          </p:cTn>
+                        </p:par>
+                      </p:childTnLst>
+                    </p:cTn>
+                  </p:par>
+                  <p:par>
+                    <p:cTn id="7" fill="hold">
+                      <p:stCondLst>
+                        <p:cond delay="indefinite"/>
+                      </p:stCondLst>
+                      <p:childTnLst>
+                        <p:par>
+                          <p:cTn id="8" fill="hold">
+                            <p:stCondLst>
+                              <p:cond delay="0"/>
+                            </p:stCondLst>
+                            <p:childTnLst>
+                              <p:par>
+                                <p:cTn id="9" presetID="1" presetClass="entr" presetSubtype="0" fill="hold" nodeType="clickEffect">
+                                  <p:stCondLst>
+                                    <p:cond delay="0"/>
+                                  </p:stCondLst>
+                                  <p:childTnLst>
+                                    <p:set>
+                                      <p:cBhvr>
+                                        <p:cTn id="10" dur="1" fill="hold">
+                                          <p:stCondLst>
+                                            <p:cond delay="0"/>
+                                          </p:stCondLst>
+                                        </p:cTn>
+                                        <p:tgtEl>
+                                          <p:spTgt spid="3">
+                                            <p:txEl>
+                                              <p:pRg st="1" end="1"/>
+                                            </p:txEl>
+                                          </p:spTgt>
+                                        </p:tgtEl>
+                                        <p:attrNameLst>
+                                          <p:attrName>style.visibility</p:attrName>
+                                        </p:attrNameLst>
+                                      </p:cBhvr>
+                                      <p:to>
+                                        <p:strVal val="visible"/>
+                                      </p:to>
+                                    </p:set>
+                                  </p:childTnLst>
+                                </p:cTn>
+                              </p:par>
+                            </p:childTnLst>
+                          </p:cTn>
+                        </p:par>
+                      </p:childTnLst>
+                    </p:cTn>
+                  </p:par>
+                  <p:par>
+                    <p:cTn id="11" fill="hold">
+                      <p:stCondLst>
+                        <p:cond delay="indefinite"/>
+                      </p:stCondLst>
+                      <p:childTnLst>
+                        <p:par>
+                          <p:cTn id="12" fill="hold">
+                            <p:stCondLst>
+                              <p:cond delay="0"/>
+                            </p:stCondLst>
+                            <p:childTnLst>
+                              <p:par>
+                                <p:cTn id="13" presetID="1" presetClass="entr" presetSubtype="0" fill="hold" nodeType="clickEffect">
+                                  <p:stCondLst>
+                                    <p:cond delay="0"/>
+                                  </p:stCondLst>
+                                  <p:childTnLst>
+                                    <p:set>
+                                      <p:cBhvr>
+                                        <p:cTn id="14" dur="1" fill="hold">
+                                          <p:stCondLst>
+                                            <p:cond delay="0"/>
+                                          </p:stCondLst>
+                                        </p:cTn>
+                                        <p:tgtEl>
+                                          <p:spTgt spid="3">
+                                            <p:txEl>
+                                              <p:pRg st="2" end="2"/>
+                                            </p:txEl>
+                                          </p:spTgt>
+                                        </p:tgtEl>
+                                        <p:attrNameLst>
+                                          <p:attrName>style.visibility</p:attrName>
+                                        </p:attrNameLst>
+                                      </p:cBhvr>
+                                      <p:to>
+                                        <p:strVal val="visible"/>
+                                      </p:to>
+                                    </p:set>
+                                  </p:childTnLst>
+                                </p:cTn>
+                              </p:par>
+                            </p:childTnLst>
+                          </p:cTn>
+                        </p:par>
+                      </p:childTnLst>
+                    </p:cTn>
+                  </p:par>
+                  <p:par>
+                    <p:cTn id="15" fill="hold">
+                      <p:stCondLst>
+                        <p:cond delay="indefinite"/>
+                      </p:stCondLst>
+                      <p:childTnLst>
+                        <p:par>
+                          <p:cTn id="16" fill="hold">
+                            <p:stCondLst>
+                              <p:cond delay="0"/>
+                            </p:stCondLst>
+                            <p:childTnLst>
+                              <p:par>
+                                <p:cTn id="17" presetID="1" presetClass="entr" presetSubtype="0" fill="hold" nodeType="clickEffect">
+                                  <p:stCondLst>
+                                    <p:cond delay="0"/>
+                                  </p:stCondLst>
+                                  <p:childTnLst>
+                                    <p:set>
+                                      <p:cBhvr>
+                                        <p:cTn id="18" dur="1" fill="hold">
+                                          <p:stCondLst>
+                                            <p:cond delay="0"/>
+                                          </p:stCondLst>
+                                        </p:cTn>
+                                        <p:tgtEl>
+                                          <p:spTgt spid="3">
+                                            <p:txEl>
+                                              <p:pRg st="3" end="3"/>
+                                            </p:txEl>
+                                          </p:spTgt>
+                                        </p:tgtEl>
+                                        <p:attrNameLst>
+                                          <p:attrName>style.visibility</p:attrName>
+                                        </p:attrNameLst>
+                                      </p:cBhvr>
+                                      <p:to>
+                                        <p:strVal val="visible"/>
+                                      </p:to>
+                                    </p:set>
+                                  </p:childTnLst>
+                                </p:cTn>
+                              </p:par>
+                            </p:childTnLst>
+                          </p:cTn>
+                        </p:par>
+                      </p:childTnLst>
+                    </p:cTn>
+                  </p:par>
+                </p:childTnLst>
+              </p:cTn>
+              <p:prevCondLst>
+                <p:cond evt="onPrev" delay="0">
+                  <p:tgtEl>
+                    <p:sldTgt/>
+                  </p:tgtEl>
+                </p:cond>
+              </p:prevCondLst>
+              <p:nextCondLst>
+                <p:cond evt="onNext" delay="0">
+                  <p:tgtEl>
+                    <p:sldTgt/>
+                  </p:tgtEl>
+                </p:cond>
+              </p:nextCondLst>
+            </p:seq>
+          </p:childTnLst>
+        </p:cTn>
       </p:par>
     </p:tnLst>
   </p:timing>
@@ -6933,7 +8283,226 @@
   <p:timing>
     <p:tnLst>
       <p:par>
-        <p:cTn id="1" dur="indefinite" restart="never" nodeType="tmRoot"/>
+        <p:cTn id="1" dur="indefinite" restart="never" nodeType="tmRoot">
+          <p:childTnLst>
+            <p:seq concurrent="1" nextAc="seek">
+              <p:cTn id="2" dur="indefinite" nodeType="mainSeq">
+                <p:childTnLst>
+                  <p:par>
+                    <p:cTn id="3" fill="hold">
+                      <p:stCondLst>
+                        <p:cond delay="indefinite"/>
+                      </p:stCondLst>
+                      <p:childTnLst>
+                        <p:par>
+                          <p:cTn id="4" fill="hold">
+                            <p:stCondLst>
+                              <p:cond delay="0"/>
+                            </p:stCondLst>
+                            <p:childTnLst>
+                              <p:par>
+                                <p:cTn id="5" presetID="1" presetClass="entr" presetSubtype="0" fill="hold" nodeType="clickEffect">
+                                  <p:stCondLst>
+                                    <p:cond delay="0"/>
+                                  </p:stCondLst>
+                                  <p:childTnLst>
+                                    <p:set>
+                                      <p:cBhvr>
+                                        <p:cTn id="6" dur="1" fill="hold">
+                                          <p:stCondLst>
+                                            <p:cond delay="0"/>
+                                          </p:stCondLst>
+                                        </p:cTn>
+                                        <p:tgtEl>
+                                          <p:spTgt spid="3">
+                                            <p:txEl>
+                                              <p:pRg st="0" end="0"/>
+                                            </p:txEl>
+                                          </p:spTgt>
+                                        </p:tgtEl>
+                                        <p:attrNameLst>
+                                          <p:attrName>style.visibility</p:attrName>
+                                        </p:attrNameLst>
+                                      </p:cBhvr>
+                                      <p:to>
+                                        <p:strVal val="visible"/>
+                                      </p:to>
+                                    </p:set>
+                                  </p:childTnLst>
+                                </p:cTn>
+                              </p:par>
+                            </p:childTnLst>
+                          </p:cTn>
+                        </p:par>
+                      </p:childTnLst>
+                    </p:cTn>
+                  </p:par>
+                  <p:par>
+                    <p:cTn id="7" fill="hold">
+                      <p:stCondLst>
+                        <p:cond delay="indefinite"/>
+                      </p:stCondLst>
+                      <p:childTnLst>
+                        <p:par>
+                          <p:cTn id="8" fill="hold">
+                            <p:stCondLst>
+                              <p:cond delay="0"/>
+                            </p:stCondLst>
+                            <p:childTnLst>
+                              <p:par>
+                                <p:cTn id="9" presetID="1" presetClass="entr" presetSubtype="0" fill="hold" nodeType="clickEffect">
+                                  <p:stCondLst>
+                                    <p:cond delay="0"/>
+                                  </p:stCondLst>
+                                  <p:childTnLst>
+                                    <p:set>
+                                      <p:cBhvr>
+                                        <p:cTn id="10" dur="1" fill="hold">
+                                          <p:stCondLst>
+                                            <p:cond delay="0"/>
+                                          </p:stCondLst>
+                                        </p:cTn>
+                                        <p:tgtEl>
+                                          <p:spTgt spid="3">
+                                            <p:txEl>
+                                              <p:pRg st="1" end="1"/>
+                                            </p:txEl>
+                                          </p:spTgt>
+                                        </p:tgtEl>
+                                        <p:attrNameLst>
+                                          <p:attrName>style.visibility</p:attrName>
+                                        </p:attrNameLst>
+                                      </p:cBhvr>
+                                      <p:to>
+                                        <p:strVal val="visible"/>
+                                      </p:to>
+                                    </p:set>
+                                  </p:childTnLst>
+                                </p:cTn>
+                              </p:par>
+                            </p:childTnLst>
+                          </p:cTn>
+                        </p:par>
+                      </p:childTnLst>
+                    </p:cTn>
+                  </p:par>
+                  <p:par>
+                    <p:cTn id="11" fill="hold">
+                      <p:stCondLst>
+                        <p:cond delay="indefinite"/>
+                      </p:stCondLst>
+                      <p:childTnLst>
+                        <p:par>
+                          <p:cTn id="12" fill="hold">
+                            <p:stCondLst>
+                              <p:cond delay="0"/>
+                            </p:stCondLst>
+                            <p:childTnLst>
+                              <p:par>
+                                <p:cTn id="13" presetID="1" presetClass="entr" presetSubtype="0" fill="hold" nodeType="clickEffect">
+                                  <p:stCondLst>
+                                    <p:cond delay="0"/>
+                                  </p:stCondLst>
+                                  <p:childTnLst>
+                                    <p:set>
+                                      <p:cBhvr>
+                                        <p:cTn id="14" dur="1" fill="hold">
+                                          <p:stCondLst>
+                                            <p:cond delay="0"/>
+                                          </p:stCondLst>
+                                        </p:cTn>
+                                        <p:tgtEl>
+                                          <p:spTgt spid="3">
+                                            <p:txEl>
+                                              <p:pRg st="2" end="2"/>
+                                            </p:txEl>
+                                          </p:spTgt>
+                                        </p:tgtEl>
+                                        <p:attrNameLst>
+                                          <p:attrName>style.visibility</p:attrName>
+                                        </p:attrNameLst>
+                                      </p:cBhvr>
+                                      <p:to>
+                                        <p:strVal val="visible"/>
+                                      </p:to>
+                                    </p:set>
+                                  </p:childTnLst>
+                                </p:cTn>
+                              </p:par>
+                            </p:childTnLst>
+                          </p:cTn>
+                        </p:par>
+                      </p:childTnLst>
+                    </p:cTn>
+                  </p:par>
+                  <p:par>
+                    <p:cTn id="15" fill="hold">
+                      <p:stCondLst>
+                        <p:cond delay="indefinite"/>
+                      </p:stCondLst>
+                      <p:childTnLst>
+                        <p:par>
+                          <p:cTn id="16" fill="hold">
+                            <p:stCondLst>
+                              <p:cond delay="0"/>
+                            </p:stCondLst>
+                            <p:childTnLst>
+                              <p:par>
+                                <p:cTn id="17" presetID="1" presetClass="entr" presetSubtype="0" fill="hold" nodeType="clickEffect">
+                                  <p:stCondLst>
+                                    <p:cond delay="0"/>
+                                  </p:stCondLst>
+                                  <p:childTnLst>
+                                    <p:set>
+                                      <p:cBhvr>
+                                        <p:cTn id="18" dur="1" fill="hold">
+                                          <p:stCondLst>
+                                            <p:cond delay="0"/>
+                                          </p:stCondLst>
+                                        </p:cTn>
+                                        <p:tgtEl>
+                                          <p:spTgt spid="3">
+                                            <p:txEl>
+                                              <p:pRg st="3" end="3"/>
+                                            </p:txEl>
+                                          </p:spTgt>
+                                        </p:tgtEl>
+                                        <p:attrNameLst>
+                                          <p:attrName>style.visibility</p:attrName>
+                                        </p:attrNameLst>
+                                      </p:cBhvr>
+                                      <p:to>
+                                        <p:strVal val="visible"/>
+                                      </p:to>
+                                    </p:set>
+                                  </p:childTnLst>
+                                </p:cTn>
+                              </p:par>
+                            </p:childTnLst>
+                          </p:cTn>
+                        </p:par>
+                      </p:childTnLst>
+                    </p:cTn>
+                  </p:par>
+                </p:childTnLst>
+              </p:cTn>
+              <p:prevCondLst>
+                <p:cond evt="onPrev" delay="0">
+                  <p:tgtEl>
+                    <p:sldTgt/>
+                  </p:tgtEl>
+                </p:cond>
+              </p:prevCondLst>
+              <p:nextCondLst>
+                <p:cond evt="onNext" delay="0">
+                  <p:tgtEl>
+                    <p:sldTgt/>
+                  </p:tgtEl>
+                </p:cond>
+              </p:nextCondLst>
+            </p:seq>
+          </p:childTnLst>
+        </p:cTn>
       </p:par>
     </p:tnLst>
   </p:timing>
@@ -6985,8 +8554,8 @@
           </a:p>
         </p:txBody>
       </p:sp>
-      <mc:AlternateContent xmlns:mc="http://schemas.openxmlformats.org/markup-compatibility/2006">
-        <mc:Choice xmlns:a14="http://schemas.microsoft.com/office/drawing/2010/main" Requires="a14">
+      <mc:AlternateContent xmlns:mc="http://schemas.openxmlformats.org/markup-compatibility/2006" xmlns:a14="http://schemas.microsoft.com/office/drawing/2010/main">
+        <mc:Choice Requires="a14">
           <p:sp>
             <p:nvSpPr>
               <p:cNvPr id="4" name="TextBox 3"/>
@@ -7009,6 +8578,7 @@
               </a:bodyPr>
               <a:lstStyle/>
               <a:p>
+                <a:pPr/>
                 <a14:m>
                   <m:oMathPara xmlns:m="http://schemas.openxmlformats.org/officeDocument/2006/math">
                     <m:oMathParaPr>
@@ -7058,7 +8628,7 @@
             </p:txBody>
           </p:sp>
         </mc:Choice>
-        <mc:Fallback>
+        <mc:Fallback xmlns="">
           <p:sp>
             <p:nvSpPr>
               <p:cNvPr id="4" name="TextBox 3"/>
@@ -8133,9 +9703,181 @@
   <p:timing>
     <p:tnLst>
       <p:par>
-        <p:cTn id="1" dur="indefinite" restart="never" nodeType="tmRoot"/>
+        <p:cTn id="1" dur="indefinite" restart="never" nodeType="tmRoot">
+          <p:childTnLst>
+            <p:seq concurrent="1" nextAc="seek">
+              <p:cTn id="2" dur="indefinite" nodeType="mainSeq">
+                <p:childTnLst>
+                  <p:par>
+                    <p:cTn id="3" fill="hold">
+                      <p:stCondLst>
+                        <p:cond delay="indefinite"/>
+                      </p:stCondLst>
+                      <p:childTnLst>
+                        <p:par>
+                          <p:cTn id="4" fill="hold">
+                            <p:stCondLst>
+                              <p:cond delay="0"/>
+                            </p:stCondLst>
+                            <p:childTnLst>
+                              <p:par>
+                                <p:cTn id="5" presetID="1" presetClass="entr" presetSubtype="0" fill="hold" grpId="0" nodeType="clickEffect">
+                                  <p:stCondLst>
+                                    <p:cond delay="0"/>
+                                  </p:stCondLst>
+                                  <p:childTnLst>
+                                    <p:set>
+                                      <p:cBhvr>
+                                        <p:cTn id="6" dur="1" fill="hold">
+                                          <p:stCondLst>
+                                            <p:cond delay="0"/>
+                                          </p:stCondLst>
+                                        </p:cTn>
+                                        <p:tgtEl>
+                                          <p:spTgt spid="5"/>
+                                        </p:tgtEl>
+                                        <p:attrNameLst>
+                                          <p:attrName>style.visibility</p:attrName>
+                                        </p:attrNameLst>
+                                      </p:cBhvr>
+                                      <p:to>
+                                        <p:strVal val="visible"/>
+                                      </p:to>
+                                    </p:set>
+                                  </p:childTnLst>
+                                </p:cTn>
+                              </p:par>
+                              <p:par>
+                                <p:cTn id="7" presetID="1" presetClass="entr" presetSubtype="0" fill="hold" grpId="0" nodeType="withEffect">
+                                  <p:stCondLst>
+                                    <p:cond delay="0"/>
+                                  </p:stCondLst>
+                                  <p:childTnLst>
+                                    <p:set>
+                                      <p:cBhvr>
+                                        <p:cTn id="8" dur="1" fill="hold">
+                                          <p:stCondLst>
+                                            <p:cond delay="0"/>
+                                          </p:stCondLst>
+                                        </p:cTn>
+                                        <p:tgtEl>
+                                          <p:spTgt spid="4"/>
+                                        </p:tgtEl>
+                                        <p:attrNameLst>
+                                          <p:attrName>style.visibility</p:attrName>
+                                        </p:attrNameLst>
+                                      </p:cBhvr>
+                                      <p:to>
+                                        <p:strVal val="visible"/>
+                                      </p:to>
+                                    </p:set>
+                                  </p:childTnLst>
+                                </p:cTn>
+                              </p:par>
+                            </p:childTnLst>
+                          </p:cTn>
+                        </p:par>
+                      </p:childTnLst>
+                    </p:cTn>
+                  </p:par>
+                  <p:par>
+                    <p:cTn id="9" fill="hold">
+                      <p:stCondLst>
+                        <p:cond delay="indefinite"/>
+                      </p:stCondLst>
+                      <p:childTnLst>
+                        <p:par>
+                          <p:cTn id="10" fill="hold">
+                            <p:stCondLst>
+                              <p:cond delay="0"/>
+                            </p:stCondLst>
+                            <p:childTnLst>
+                              <p:par>
+                                <p:cTn id="11" presetID="1" presetClass="entr" presetSubtype="0" fill="hold" nodeType="clickEffect">
+                                  <p:stCondLst>
+                                    <p:cond delay="0"/>
+                                  </p:stCondLst>
+                                  <p:childTnLst>
+                                    <p:set>
+                                      <p:cBhvr>
+                                        <p:cTn id="12" dur="1" fill="hold">
+                                          <p:stCondLst>
+                                            <p:cond delay="0"/>
+                                          </p:stCondLst>
+                                        </p:cTn>
+                                        <p:tgtEl>
+                                          <p:spTgt spid="6"/>
+                                        </p:tgtEl>
+                                        <p:attrNameLst>
+                                          <p:attrName>style.visibility</p:attrName>
+                                        </p:attrNameLst>
+                                      </p:cBhvr>
+                                      <p:to>
+                                        <p:strVal val="visible"/>
+                                      </p:to>
+                                    </p:set>
+                                  </p:childTnLst>
+                                </p:cTn>
+                              </p:par>
+                              <p:par>
+                                <p:cTn id="13" presetID="1" presetClass="entr" presetSubtype="0" fill="hold" grpId="0" nodeType="withEffect">
+                                  <p:stCondLst>
+                                    <p:cond delay="0"/>
+                                  </p:stCondLst>
+                                  <p:childTnLst>
+                                    <p:set>
+                                      <p:cBhvr>
+                                        <p:cTn id="14" dur="1" fill="hold">
+                                          <p:stCondLst>
+                                            <p:cond delay="0"/>
+                                          </p:stCondLst>
+                                        </p:cTn>
+                                        <p:tgtEl>
+                                          <p:spTgt spid="8"/>
+                                        </p:tgtEl>
+                                        <p:attrNameLst>
+                                          <p:attrName>style.visibility</p:attrName>
+                                        </p:attrNameLst>
+                                      </p:cBhvr>
+                                      <p:to>
+                                        <p:strVal val="visible"/>
+                                      </p:to>
+                                    </p:set>
+                                  </p:childTnLst>
+                                </p:cTn>
+                              </p:par>
+                            </p:childTnLst>
+                          </p:cTn>
+                        </p:par>
+                      </p:childTnLst>
+                    </p:cTn>
+                  </p:par>
+                </p:childTnLst>
+              </p:cTn>
+              <p:prevCondLst>
+                <p:cond evt="onPrev" delay="0">
+                  <p:tgtEl>
+                    <p:sldTgt/>
+                  </p:tgtEl>
+                </p:cond>
+              </p:prevCondLst>
+              <p:nextCondLst>
+                <p:cond evt="onNext" delay="0">
+                  <p:tgtEl>
+                    <p:sldTgt/>
+                  </p:tgtEl>
+                </p:cond>
+              </p:nextCondLst>
+            </p:seq>
+          </p:childTnLst>
+        </p:cTn>
       </p:par>
     </p:tnLst>
+    <p:bldLst>
+      <p:bldP spid="4" grpId="0"/>
+      <p:bldP spid="5" grpId="0"/>
+      <p:bldP spid="8" grpId="0"/>
+    </p:bldLst>
   </p:timing>
 </p:sld>
 </file>
@@ -8768,7 +10510,226 @@
   <p:timing>
     <p:tnLst>
       <p:par>
-        <p:cTn id="1" dur="indefinite" restart="never" nodeType="tmRoot"/>
+        <p:cTn id="1" dur="indefinite" restart="never" nodeType="tmRoot">
+          <p:childTnLst>
+            <p:seq concurrent="1" nextAc="seek">
+              <p:cTn id="2" dur="indefinite" nodeType="mainSeq">
+                <p:childTnLst>
+                  <p:par>
+                    <p:cTn id="3" fill="hold">
+                      <p:stCondLst>
+                        <p:cond delay="indefinite"/>
+                      </p:stCondLst>
+                      <p:childTnLst>
+                        <p:par>
+                          <p:cTn id="4" fill="hold">
+                            <p:stCondLst>
+                              <p:cond delay="0"/>
+                            </p:stCondLst>
+                            <p:childTnLst>
+                              <p:par>
+                                <p:cTn id="5" presetID="1" presetClass="entr" presetSubtype="0" fill="hold" nodeType="clickEffect">
+                                  <p:stCondLst>
+                                    <p:cond delay="0"/>
+                                  </p:stCondLst>
+                                  <p:childTnLst>
+                                    <p:set>
+                                      <p:cBhvr>
+                                        <p:cTn id="6" dur="1" fill="hold">
+                                          <p:stCondLst>
+                                            <p:cond delay="0"/>
+                                          </p:stCondLst>
+                                        </p:cTn>
+                                        <p:tgtEl>
+                                          <p:spTgt spid="7">
+                                            <p:txEl>
+                                              <p:pRg st="0" end="0"/>
+                                            </p:txEl>
+                                          </p:spTgt>
+                                        </p:tgtEl>
+                                        <p:attrNameLst>
+                                          <p:attrName>style.visibility</p:attrName>
+                                        </p:attrNameLst>
+                                      </p:cBhvr>
+                                      <p:to>
+                                        <p:strVal val="visible"/>
+                                      </p:to>
+                                    </p:set>
+                                  </p:childTnLst>
+                                </p:cTn>
+                              </p:par>
+                            </p:childTnLst>
+                          </p:cTn>
+                        </p:par>
+                      </p:childTnLst>
+                    </p:cTn>
+                  </p:par>
+                  <p:par>
+                    <p:cTn id="7" fill="hold">
+                      <p:stCondLst>
+                        <p:cond delay="indefinite"/>
+                      </p:stCondLst>
+                      <p:childTnLst>
+                        <p:par>
+                          <p:cTn id="8" fill="hold">
+                            <p:stCondLst>
+                              <p:cond delay="0"/>
+                            </p:stCondLst>
+                            <p:childTnLst>
+                              <p:par>
+                                <p:cTn id="9" presetID="1" presetClass="entr" presetSubtype="0" fill="hold" nodeType="clickEffect">
+                                  <p:stCondLst>
+                                    <p:cond delay="0"/>
+                                  </p:stCondLst>
+                                  <p:childTnLst>
+                                    <p:set>
+                                      <p:cBhvr>
+                                        <p:cTn id="10" dur="1" fill="hold">
+                                          <p:stCondLst>
+                                            <p:cond delay="0"/>
+                                          </p:stCondLst>
+                                        </p:cTn>
+                                        <p:tgtEl>
+                                          <p:spTgt spid="7">
+                                            <p:txEl>
+                                              <p:pRg st="1" end="1"/>
+                                            </p:txEl>
+                                          </p:spTgt>
+                                        </p:tgtEl>
+                                        <p:attrNameLst>
+                                          <p:attrName>style.visibility</p:attrName>
+                                        </p:attrNameLst>
+                                      </p:cBhvr>
+                                      <p:to>
+                                        <p:strVal val="visible"/>
+                                      </p:to>
+                                    </p:set>
+                                  </p:childTnLst>
+                                </p:cTn>
+                              </p:par>
+                            </p:childTnLst>
+                          </p:cTn>
+                        </p:par>
+                      </p:childTnLst>
+                    </p:cTn>
+                  </p:par>
+                  <p:par>
+                    <p:cTn id="11" fill="hold">
+                      <p:stCondLst>
+                        <p:cond delay="indefinite"/>
+                      </p:stCondLst>
+                      <p:childTnLst>
+                        <p:par>
+                          <p:cTn id="12" fill="hold">
+                            <p:stCondLst>
+                              <p:cond delay="0"/>
+                            </p:stCondLst>
+                            <p:childTnLst>
+                              <p:par>
+                                <p:cTn id="13" presetID="1" presetClass="entr" presetSubtype="0" fill="hold" nodeType="clickEffect">
+                                  <p:stCondLst>
+                                    <p:cond delay="0"/>
+                                  </p:stCondLst>
+                                  <p:childTnLst>
+                                    <p:set>
+                                      <p:cBhvr>
+                                        <p:cTn id="14" dur="1" fill="hold">
+                                          <p:stCondLst>
+                                            <p:cond delay="0"/>
+                                          </p:stCondLst>
+                                        </p:cTn>
+                                        <p:tgtEl>
+                                          <p:spTgt spid="7">
+                                            <p:txEl>
+                                              <p:pRg st="2" end="2"/>
+                                            </p:txEl>
+                                          </p:spTgt>
+                                        </p:tgtEl>
+                                        <p:attrNameLst>
+                                          <p:attrName>style.visibility</p:attrName>
+                                        </p:attrNameLst>
+                                      </p:cBhvr>
+                                      <p:to>
+                                        <p:strVal val="visible"/>
+                                      </p:to>
+                                    </p:set>
+                                  </p:childTnLst>
+                                </p:cTn>
+                              </p:par>
+                            </p:childTnLst>
+                          </p:cTn>
+                        </p:par>
+                      </p:childTnLst>
+                    </p:cTn>
+                  </p:par>
+                  <p:par>
+                    <p:cTn id="15" fill="hold">
+                      <p:stCondLst>
+                        <p:cond delay="indefinite"/>
+                      </p:stCondLst>
+                      <p:childTnLst>
+                        <p:par>
+                          <p:cTn id="16" fill="hold">
+                            <p:stCondLst>
+                              <p:cond delay="0"/>
+                            </p:stCondLst>
+                            <p:childTnLst>
+                              <p:par>
+                                <p:cTn id="17" presetID="1" presetClass="entr" presetSubtype="0" fill="hold" nodeType="clickEffect">
+                                  <p:stCondLst>
+                                    <p:cond delay="0"/>
+                                  </p:stCondLst>
+                                  <p:childTnLst>
+                                    <p:set>
+                                      <p:cBhvr>
+                                        <p:cTn id="18" dur="1" fill="hold">
+                                          <p:stCondLst>
+                                            <p:cond delay="0"/>
+                                          </p:stCondLst>
+                                        </p:cTn>
+                                        <p:tgtEl>
+                                          <p:spTgt spid="7">
+                                            <p:txEl>
+                                              <p:pRg st="3" end="3"/>
+                                            </p:txEl>
+                                          </p:spTgt>
+                                        </p:tgtEl>
+                                        <p:attrNameLst>
+                                          <p:attrName>style.visibility</p:attrName>
+                                        </p:attrNameLst>
+                                      </p:cBhvr>
+                                      <p:to>
+                                        <p:strVal val="visible"/>
+                                      </p:to>
+                                    </p:set>
+                                  </p:childTnLst>
+                                </p:cTn>
+                              </p:par>
+                            </p:childTnLst>
+                          </p:cTn>
+                        </p:par>
+                      </p:childTnLst>
+                    </p:cTn>
+                  </p:par>
+                </p:childTnLst>
+              </p:cTn>
+              <p:prevCondLst>
+                <p:cond evt="onPrev" delay="0">
+                  <p:tgtEl>
+                    <p:sldTgt/>
+                  </p:tgtEl>
+                </p:cond>
+              </p:prevCondLst>
+              <p:nextCondLst>
+                <p:cond evt="onNext" delay="0">
+                  <p:tgtEl>
+                    <p:sldTgt/>
+                  </p:tgtEl>
+                </p:cond>
+              </p:nextCondLst>
+            </p:seq>
+          </p:childTnLst>
+        </p:cTn>
       </p:par>
     </p:tnLst>
   </p:timing>
@@ -8969,7 +10930,177 @@
   <p:timing>
     <p:tnLst>
       <p:par>
-        <p:cTn id="1" dur="indefinite" restart="never" nodeType="tmRoot"/>
+        <p:cTn id="1" dur="indefinite" restart="never" nodeType="tmRoot">
+          <p:childTnLst>
+            <p:seq concurrent="1" nextAc="seek">
+              <p:cTn id="2" dur="indefinite" nodeType="mainSeq">
+                <p:childTnLst>
+                  <p:par>
+                    <p:cTn id="3" fill="hold">
+                      <p:stCondLst>
+                        <p:cond delay="indefinite"/>
+                      </p:stCondLst>
+                      <p:childTnLst>
+                        <p:par>
+                          <p:cTn id="4" fill="hold">
+                            <p:stCondLst>
+                              <p:cond delay="0"/>
+                            </p:stCondLst>
+                            <p:childTnLst>
+                              <p:par>
+                                <p:cTn id="5" presetID="1" presetClass="entr" presetSubtype="0" fill="hold" nodeType="clickEffect">
+                                  <p:stCondLst>
+                                    <p:cond delay="0"/>
+                                  </p:stCondLst>
+                                  <p:childTnLst>
+                                    <p:set>
+                                      <p:cBhvr>
+                                        <p:cTn id="6" dur="1" fill="hold">
+                                          <p:stCondLst>
+                                            <p:cond delay="0"/>
+                                          </p:stCondLst>
+                                        </p:cTn>
+                                        <p:tgtEl>
+                                          <p:spTgt spid="3">
+                                            <p:txEl>
+                                              <p:pRg st="2" end="2"/>
+                                            </p:txEl>
+                                          </p:spTgt>
+                                        </p:tgtEl>
+                                        <p:attrNameLst>
+                                          <p:attrName>style.visibility</p:attrName>
+                                        </p:attrNameLst>
+                                      </p:cBhvr>
+                                      <p:to>
+                                        <p:strVal val="visible"/>
+                                      </p:to>
+                                    </p:set>
+                                  </p:childTnLst>
+                                </p:cTn>
+                              </p:par>
+                            </p:childTnLst>
+                          </p:cTn>
+                        </p:par>
+                      </p:childTnLst>
+                    </p:cTn>
+                  </p:par>
+                  <p:par>
+                    <p:cTn id="7" fill="hold">
+                      <p:stCondLst>
+                        <p:cond delay="indefinite"/>
+                      </p:stCondLst>
+                      <p:childTnLst>
+                        <p:par>
+                          <p:cTn id="8" fill="hold">
+                            <p:stCondLst>
+                              <p:cond delay="0"/>
+                            </p:stCondLst>
+                            <p:childTnLst>
+                              <p:par>
+                                <p:cTn id="9" presetID="1" presetClass="entr" presetSubtype="0" fill="hold" nodeType="clickEffect">
+                                  <p:stCondLst>
+                                    <p:cond delay="0"/>
+                                  </p:stCondLst>
+                                  <p:childTnLst>
+                                    <p:set>
+                                      <p:cBhvr>
+                                        <p:cTn id="10" dur="1" fill="hold">
+                                          <p:stCondLst>
+                                            <p:cond delay="0"/>
+                                          </p:stCondLst>
+                                        </p:cTn>
+                                        <p:tgtEl>
+                                          <p:spTgt spid="3">
+                                            <p:txEl>
+                                              <p:pRg st="3" end="3"/>
+                                            </p:txEl>
+                                          </p:spTgt>
+                                        </p:tgtEl>
+                                        <p:attrNameLst>
+                                          <p:attrName>style.visibility</p:attrName>
+                                        </p:attrNameLst>
+                                      </p:cBhvr>
+                                      <p:to>
+                                        <p:strVal val="visible"/>
+                                      </p:to>
+                                    </p:set>
+                                  </p:childTnLst>
+                                </p:cTn>
+                              </p:par>
+                            </p:childTnLst>
+                          </p:cTn>
+                        </p:par>
+                      </p:childTnLst>
+                    </p:cTn>
+                  </p:par>
+                  <p:par>
+                    <p:cTn id="11" fill="hold">
+                      <p:stCondLst>
+                        <p:cond delay="indefinite"/>
+                      </p:stCondLst>
+                      <p:childTnLst>
+                        <p:par>
+                          <p:cTn id="12" fill="hold">
+                            <p:stCondLst>
+                              <p:cond delay="0"/>
+                            </p:stCondLst>
+                            <p:childTnLst>
+                              <p:par>
+                                <p:cTn id="13" presetID="1" presetClass="entr" presetSubtype="0" fill="hold" nodeType="clickEffect">
+                                  <p:stCondLst>
+                                    <p:cond delay="0"/>
+                                  </p:stCondLst>
+                                  <p:childTnLst>
+                                    <p:set>
+                                      <p:cBhvr>
+                                        <p:cTn id="14" dur="1" fill="hold">
+                                          <p:stCondLst>
+                                            <p:cond delay="0"/>
+                                          </p:stCondLst>
+                                        </p:cTn>
+                                        <p:tgtEl>
+                                          <p:spTgt spid="3">
+                                            <p:txEl>
+                                              <p:pRg st="4" end="4"/>
+                                            </p:txEl>
+                                          </p:spTgt>
+                                        </p:tgtEl>
+                                        <p:attrNameLst>
+                                          <p:attrName>style.visibility</p:attrName>
+                                        </p:attrNameLst>
+                                      </p:cBhvr>
+                                      <p:to>
+                                        <p:strVal val="visible"/>
+                                      </p:to>
+                                    </p:set>
+                                  </p:childTnLst>
+                                </p:cTn>
+                              </p:par>
+                            </p:childTnLst>
+                          </p:cTn>
+                        </p:par>
+                      </p:childTnLst>
+                    </p:cTn>
+                  </p:par>
+                </p:childTnLst>
+              </p:cTn>
+              <p:prevCondLst>
+                <p:cond evt="onPrev" delay="0">
+                  <p:tgtEl>
+                    <p:sldTgt/>
+                  </p:tgtEl>
+                </p:cond>
+              </p:prevCondLst>
+              <p:nextCondLst>
+                <p:cond evt="onNext" delay="0">
+                  <p:tgtEl>
+                    <p:sldTgt/>
+                  </p:tgtEl>
+                </p:cond>
+              </p:nextCondLst>
+            </p:seq>
+          </p:childTnLst>
+        </p:cTn>
       </p:par>
     </p:tnLst>
   </p:timing>
@@ -9003,101 +11134,91 @@
             <p:ph type="title"/>
           </p:nvPr>
         </p:nvSpPr>
-        <p:spPr/>
+        <p:spPr>
+          <a:xfrm>
+            <a:off x="1484311" y="472440"/>
+            <a:ext cx="10018713" cy="1752599"/>
+          </a:xfrm>
+        </p:spPr>
         <p:txBody>
           <a:bodyPr/>
           <a:lstStyle/>
           <a:p>
             <a:r>
               <a:rPr lang="en-US" dirty="0" smtClean="0"/>
-              <a:t>Ski-kit Learn</a:t>
+              <a:t>Understandability of Machine Learning</a:t>
             </a:r>
             <a:endParaRPr lang="en-US" dirty="0"/>
           </a:p>
         </p:txBody>
       </p:sp>
-      <p:sp>
-        <p:nvSpPr>
-          <p:cNvPr id="3" name="Content Placeholder 2"/>
-          <p:cNvSpPr>
-            <a:spLocks noGrp="1"/>
-          </p:cNvSpPr>
+      <p:pic>
+        <p:nvPicPr>
+          <p:cNvPr id="6" name="Content Placeholder 5"/>
+          <p:cNvPicPr>
+            <a:picLocks noGrp="1" noChangeAspect="1"/>
+          </p:cNvPicPr>
           <p:nvPr>
             <p:ph idx="1"/>
           </p:nvPr>
-        </p:nvSpPr>
+        </p:nvPicPr>
+        <p:blipFill>
+          <a:blip r:embed="rId2">
+            <a:extLst>
+              <a:ext uri="{28A0092B-C50C-407E-A947-70E740481C1C}">
+                <a14:useLocalDpi xmlns:a14="http://schemas.microsoft.com/office/drawing/2010/main" val="0"/>
+              </a:ext>
+            </a:extLst>
+          </a:blip>
+          <a:stretch>
+            <a:fillRect/>
+          </a:stretch>
+        </p:blipFill>
         <p:spPr>
           <a:xfrm>
-            <a:off x="1484310" y="2308485"/>
-            <a:ext cx="10018713" cy="3482715"/>
+            <a:off x="2821991" y="1885602"/>
+            <a:ext cx="7149818" cy="4164678"/>
           </a:xfrm>
         </p:spPr>
-        <p:txBody>
-          <a:bodyPr/>
+      </p:pic>
+      <p:sp>
+        <p:nvSpPr>
+          <p:cNvPr id="7" name="TextBox 6"/>
+          <p:cNvSpPr txBox="1"/>
+          <p:nvPr/>
+        </p:nvSpPr>
+        <p:spPr>
+          <a:xfrm>
+            <a:off x="5642520" y="6248401"/>
+            <a:ext cx="1505040" cy="276999"/>
+          </a:xfrm>
+          <a:prstGeom prst="rect">
+            <a:avLst/>
+          </a:prstGeom>
+          <a:noFill/>
+        </p:spPr>
+        <p:txBody>
+          <a:bodyPr wrap="square" rtlCol="0">
+            <a:spAutoFit/>
+          </a:bodyPr>
           <a:lstStyle/>
           <a:p>
             <a:r>
-              <a:rPr lang="en-US" dirty="0" smtClean="0"/>
-              <a:t>A package in Python programming language. Part of the Anaconda Distribution. </a:t>
-            </a:r>
-          </a:p>
-          <a:p>
-            <a:r>
-              <a:rPr lang="en-US" dirty="0" smtClean="0"/>
-              <a:t>Built on </a:t>
-            </a:r>
-            <a:r>
-              <a:rPr lang="en-US" dirty="0" err="1" smtClean="0"/>
-              <a:t>NumPy</a:t>
-            </a:r>
-            <a:r>
-              <a:rPr lang="en-US" dirty="0" smtClean="0"/>
-              <a:t>, </a:t>
-            </a:r>
-            <a:r>
-              <a:rPr lang="en-US" dirty="0" err="1" smtClean="0"/>
-              <a:t>SciPy</a:t>
-            </a:r>
-            <a:r>
-              <a:rPr lang="en-US" dirty="0" smtClean="0"/>
-              <a:t> and </a:t>
-            </a:r>
-            <a:r>
-              <a:rPr lang="en-US" dirty="0" err="1" smtClean="0"/>
-              <a:t>Matplotlib</a:t>
-            </a:r>
-            <a:r>
-              <a:rPr lang="en-US" dirty="0" smtClean="0"/>
-              <a:t> libraries.</a:t>
-            </a:r>
-          </a:p>
-          <a:p>
-            <a:r>
-              <a:rPr lang="en-US" dirty="0" smtClean="0"/>
-              <a:t>Open source, commercially usable.</a:t>
-            </a:r>
-          </a:p>
-          <a:p>
-            <a:r>
-              <a:rPr lang="en-US" dirty="0" smtClean="0"/>
-              <a:t>Simple to set up for most applications, very powerful functionality.</a:t>
-            </a:r>
-          </a:p>
-          <a:p>
-            <a:r>
-              <a:rPr lang="en-US" dirty="0" smtClean="0"/>
-              <a:t>Highly accessible.</a:t>
-            </a:r>
-          </a:p>
-          <a:p>
-            <a:endParaRPr lang="en-US" dirty="0" smtClean="0"/>
+              <a:rPr lang="en-US" sz="1200" dirty="0" smtClean="0"/>
+              <a:t>Taken from </a:t>
+            </a:r>
+            <a:r>
+              <a:rPr lang="en-US" sz="1200" dirty="0" err="1" smtClean="0"/>
+              <a:t>Nautil.us</a:t>
+            </a:r>
+            <a:endParaRPr lang="en-US" sz="1200" dirty="0"/>
           </a:p>
         </p:txBody>
       </p:sp>
     </p:spTree>
     <p:extLst>
       <p:ext uri="{BB962C8B-B14F-4D97-AF65-F5344CB8AC3E}">
-        <p14:creationId xmlns:p14="http://schemas.microsoft.com/office/powerpoint/2010/main" val="1138083365"/>
+        <p14:creationId xmlns:p14="http://schemas.microsoft.com/office/powerpoint/2010/main" val="215447314"/>
       </p:ext>
     </p:extLst>
   </p:cSld>
@@ -9141,10 +11262,33 @@
             <p:ph type="title"/>
           </p:nvPr>
         </p:nvSpPr>
+        <p:spPr/>
+        <p:txBody>
+          <a:bodyPr/>
+          <a:lstStyle/>
+          <a:p>
+            <a:r>
+              <a:rPr lang="en-US" dirty="0" smtClean="0"/>
+              <a:t>Ski-kit Learn</a:t>
+            </a:r>
+            <a:endParaRPr lang="en-US" dirty="0"/>
+          </a:p>
+        </p:txBody>
+      </p:sp>
+      <p:sp>
+        <p:nvSpPr>
+          <p:cNvPr id="3" name="Content Placeholder 2"/>
+          <p:cNvSpPr>
+            <a:spLocks noGrp="1"/>
+          </p:cNvSpPr>
+          <p:nvPr>
+            <p:ph idx="1"/>
+          </p:nvPr>
+        </p:nvSpPr>
         <p:spPr>
           <a:xfrm>
-            <a:off x="1484311" y="655571"/>
-            <a:ext cx="10018713" cy="1398079"/>
+            <a:off x="1484310" y="2308485"/>
+            <a:ext cx="10018713" cy="3482715"/>
           </a:xfrm>
         </p:spPr>
         <p:txBody>
@@ -9153,419 +11297,70 @@
           <a:p>
             <a:r>
               <a:rPr lang="en-US" dirty="0" smtClean="0"/>
-              <a:t>Ski-kit Learn</a:t>
-            </a:r>
-            <a:endParaRPr lang="en-US" dirty="0"/>
-          </a:p>
-        </p:txBody>
-      </p:sp>
-      <p:graphicFrame>
-        <p:nvGraphicFramePr>
-          <p:cNvPr id="4" name="Content Placeholder 3"/>
-          <p:cNvGraphicFramePr>
-            <a:graphicFrameLocks noGrp="1"/>
-          </p:cNvGraphicFramePr>
-          <p:nvPr>
-            <p:ph idx="1"/>
-            <p:extLst>
-              <p:ext uri="{D42A27DB-BD31-4B8C-83A1-F6EECF244321}">
-                <p14:modId xmlns:p14="http://schemas.microsoft.com/office/powerpoint/2010/main" val="1619404318"/>
-              </p:ext>
-            </p:extLst>
-          </p:nvPr>
-        </p:nvGraphicFramePr>
-        <p:xfrm>
-          <a:off x="1484313" y="2142348"/>
-          <a:ext cx="10018713" cy="3942080"/>
-        </p:xfrm>
-        <a:graphic>
-          <a:graphicData uri="http://schemas.openxmlformats.org/drawingml/2006/table">
-            <a:tbl>
-              <a:tblPr firstRow="1" bandRow="1">
-                <a:tableStyleId>{073A0DAA-6AF3-43AB-8588-CEC1D06C72B9}</a:tableStyleId>
-              </a:tblPr>
-              <a:tblGrid>
-                <a:gridCol w="3339571"/>
-                <a:gridCol w="3339571"/>
-                <a:gridCol w="3339571"/>
-              </a:tblGrid>
-              <a:tr h="370840">
-                <a:tc>
-                  <a:txBody>
-                    <a:bodyPr/>
-                    <a:lstStyle/>
-                    <a:p>
-                      <a:r>
-                        <a:rPr lang="en-US" dirty="0" smtClean="0"/>
-                        <a:t>Name</a:t>
-                      </a:r>
-                      <a:r>
-                        <a:rPr lang="en-US" baseline="0" dirty="0" smtClean="0"/>
-                        <a:t> of Method</a:t>
-                      </a:r>
-                      <a:endParaRPr lang="en-US" dirty="0"/>
-                    </a:p>
-                  </a:txBody>
-                  <a:tcPr/>
-                </a:tc>
-                <a:tc>
-                  <a:txBody>
-                    <a:bodyPr/>
-                    <a:lstStyle/>
-                    <a:p>
-                      <a:r>
-                        <a:rPr lang="en-US" dirty="0" smtClean="0"/>
-                        <a:t>Example use</a:t>
-                      </a:r>
-                      <a:endParaRPr lang="en-US" dirty="0"/>
-                    </a:p>
-                  </a:txBody>
-                  <a:tcPr/>
-                </a:tc>
-                <a:tc>
-                  <a:txBody>
-                    <a:bodyPr/>
-                    <a:lstStyle/>
-                    <a:p>
-                      <a:r>
-                        <a:rPr lang="en-US" dirty="0" smtClean="0"/>
-                        <a:t>Algorithm</a:t>
-                      </a:r>
-                      <a:endParaRPr lang="en-US" dirty="0"/>
-                    </a:p>
-                  </a:txBody>
-                  <a:tcPr/>
-                </a:tc>
-              </a:tr>
-              <a:tr h="370840">
-                <a:tc>
-                  <a:txBody>
-                    <a:bodyPr/>
-                    <a:lstStyle/>
-                    <a:p>
-                      <a:r>
-                        <a:rPr lang="en-US" dirty="0" smtClean="0"/>
-                        <a:t>Classification</a:t>
-                      </a:r>
-                      <a:endParaRPr lang="en-US" dirty="0"/>
-                    </a:p>
-                  </a:txBody>
-                  <a:tcPr/>
-                </a:tc>
-                <a:tc>
-                  <a:txBody>
-                    <a:bodyPr/>
-                    <a:lstStyle/>
-                    <a:p>
-                      <a:r>
-                        <a:rPr lang="en-US" dirty="0" smtClean="0"/>
-                        <a:t>Spam Detection, Image Recognition</a:t>
-                      </a:r>
-                      <a:endParaRPr lang="en-US" dirty="0"/>
-                    </a:p>
-                  </a:txBody>
-                  <a:tcPr/>
-                </a:tc>
-                <a:tc>
-                  <a:txBody>
-                    <a:bodyPr/>
-                    <a:lstStyle/>
-                    <a:p>
-                      <a:r>
-                        <a:rPr lang="en-US" dirty="0" smtClean="0"/>
-                        <a:t>SVM, random forest, nearest</a:t>
-                      </a:r>
-                      <a:r>
-                        <a:rPr lang="en-US" baseline="0" dirty="0" smtClean="0"/>
-                        <a:t> neighbours</a:t>
-                      </a:r>
-                      <a:endParaRPr lang="en-US" dirty="0"/>
-                    </a:p>
-                  </a:txBody>
-                  <a:tcPr/>
-                </a:tc>
-              </a:tr>
-              <a:tr h="370840">
-                <a:tc>
-                  <a:txBody>
-                    <a:bodyPr/>
-                    <a:lstStyle/>
-                    <a:p>
-                      <a:r>
-                        <a:rPr lang="en-US" dirty="0" smtClean="0"/>
-                        <a:t>Regression</a:t>
-                      </a:r>
-                      <a:endParaRPr lang="en-US" dirty="0"/>
-                    </a:p>
-                  </a:txBody>
-                  <a:tcPr/>
-                </a:tc>
-                <a:tc>
-                  <a:txBody>
-                    <a:bodyPr/>
-                    <a:lstStyle/>
-                    <a:p>
-                      <a:r>
-                        <a:rPr lang="en-US" dirty="0" smtClean="0"/>
-                        <a:t>Drug response, stock prices</a:t>
-                      </a:r>
-                      <a:endParaRPr lang="en-US" dirty="0"/>
-                    </a:p>
-                  </a:txBody>
-                  <a:tcPr/>
-                </a:tc>
-                <a:tc>
-                  <a:txBody>
-                    <a:bodyPr/>
-                    <a:lstStyle/>
-                    <a:p>
-                      <a:r>
-                        <a:rPr lang="en-US" dirty="0" smtClean="0"/>
-                        <a:t>SVR, Ridge regression, LASSO</a:t>
-                      </a:r>
-                      <a:endParaRPr lang="en-US" dirty="0"/>
-                    </a:p>
-                  </a:txBody>
-                  <a:tcPr/>
-                </a:tc>
-              </a:tr>
-              <a:tr h="370840">
-                <a:tc>
-                  <a:txBody>
-                    <a:bodyPr/>
-                    <a:lstStyle/>
-                    <a:p>
-                      <a:r>
-                        <a:rPr lang="en-US" dirty="0" smtClean="0"/>
-                        <a:t>Clustering</a:t>
-                      </a:r>
-                      <a:endParaRPr lang="en-US" dirty="0"/>
-                    </a:p>
-                  </a:txBody>
-                  <a:tcPr/>
-                </a:tc>
-                <a:tc>
-                  <a:txBody>
-                    <a:bodyPr/>
-                    <a:lstStyle/>
-                    <a:p>
-                      <a:r>
-                        <a:rPr lang="en-US" dirty="0" smtClean="0"/>
-                        <a:t>Customer segmentation, grouping experiment outcomes</a:t>
-                      </a:r>
-                      <a:endParaRPr lang="en-US" dirty="0"/>
-                    </a:p>
-                  </a:txBody>
-                  <a:tcPr/>
-                </a:tc>
-                <a:tc>
-                  <a:txBody>
-                    <a:bodyPr/>
-                    <a:lstStyle/>
-                    <a:p>
-                      <a:r>
-                        <a:rPr lang="en-US" dirty="0" smtClean="0"/>
-                        <a:t>K-Means, Spectral Clustering, mean-shift</a:t>
-                      </a:r>
-                      <a:endParaRPr lang="en-US" dirty="0"/>
-                    </a:p>
-                  </a:txBody>
-                  <a:tcPr/>
-                </a:tc>
-              </a:tr>
-              <a:tr h="370840">
-                <a:tc>
-                  <a:txBody>
-                    <a:bodyPr/>
-                    <a:lstStyle/>
-                    <a:p>
-                      <a:r>
-                        <a:rPr lang="en-US" dirty="0" smtClean="0"/>
-                        <a:t>Dimensionality Reduction</a:t>
-                      </a:r>
-                      <a:endParaRPr lang="en-US" dirty="0"/>
-                    </a:p>
-                  </a:txBody>
-                  <a:tcPr/>
-                </a:tc>
-                <a:tc>
-                  <a:txBody>
-                    <a:bodyPr/>
-                    <a:lstStyle/>
-                    <a:p>
-                      <a:r>
-                        <a:rPr lang="en-US" dirty="0" smtClean="0"/>
-                        <a:t>Visualization, increased efficiency</a:t>
-                      </a:r>
-                      <a:endParaRPr lang="en-US" dirty="0"/>
-                    </a:p>
-                  </a:txBody>
-                  <a:tcPr/>
-                </a:tc>
-                <a:tc>
-                  <a:txBody>
-                    <a:bodyPr/>
-                    <a:lstStyle/>
-                    <a:p>
-                      <a:r>
-                        <a:rPr lang="en-US" dirty="0" smtClean="0"/>
-                        <a:t>PCA, Feature Selection, non-negative</a:t>
-                      </a:r>
-                      <a:r>
-                        <a:rPr lang="en-US" baseline="0" dirty="0" smtClean="0"/>
-                        <a:t> matrix factorisation</a:t>
-                      </a:r>
-                      <a:endParaRPr lang="en-US" dirty="0"/>
-                    </a:p>
-                  </a:txBody>
-                  <a:tcPr/>
-                </a:tc>
-              </a:tr>
-              <a:tr h="370840">
-                <a:tc>
-                  <a:txBody>
-                    <a:bodyPr/>
-                    <a:lstStyle/>
-                    <a:p>
-                      <a:r>
-                        <a:rPr lang="en-US" dirty="0" smtClean="0"/>
-                        <a:t>Model Selection</a:t>
-                      </a:r>
-                      <a:endParaRPr lang="en-US" dirty="0"/>
-                    </a:p>
-                  </a:txBody>
-                  <a:tcPr/>
-                </a:tc>
-                <a:tc>
-                  <a:txBody>
-                    <a:bodyPr/>
-                    <a:lstStyle/>
-                    <a:p>
-                      <a:r>
-                        <a:rPr lang="en-US" dirty="0" smtClean="0"/>
-                        <a:t>Improved accuracy via parameter tuning</a:t>
-                      </a:r>
-                      <a:endParaRPr lang="en-US" dirty="0"/>
-                    </a:p>
-                  </a:txBody>
-                  <a:tcPr/>
-                </a:tc>
-                <a:tc>
-                  <a:txBody>
-                    <a:bodyPr/>
-                    <a:lstStyle/>
-                    <a:p>
-                      <a:r>
-                        <a:rPr lang="en-US" dirty="0" smtClean="0"/>
-                        <a:t>Grid</a:t>
-                      </a:r>
-                      <a:r>
-                        <a:rPr lang="en-US" baseline="0" dirty="0" smtClean="0"/>
-                        <a:t> search, cross validation, metrics</a:t>
-                      </a:r>
-                      <a:endParaRPr lang="en-US" dirty="0"/>
-                    </a:p>
-                  </a:txBody>
-                  <a:tcPr/>
-                </a:tc>
-              </a:tr>
-              <a:tr h="370840">
-                <a:tc>
-                  <a:txBody>
-                    <a:bodyPr/>
-                    <a:lstStyle/>
-                    <a:p>
-                      <a:r>
-                        <a:rPr lang="en-US" dirty="0" smtClean="0"/>
-                        <a:t>Preprocessing</a:t>
-                      </a:r>
-                      <a:endParaRPr lang="en-US" dirty="0"/>
-                    </a:p>
-                  </a:txBody>
-                  <a:tcPr/>
-                </a:tc>
-                <a:tc>
-                  <a:txBody>
-                    <a:bodyPr/>
-                    <a:lstStyle/>
-                    <a:p>
-                      <a:r>
-                        <a:rPr lang="en-US" dirty="0" smtClean="0"/>
-                        <a:t>Transforming</a:t>
-                      </a:r>
-                      <a:r>
-                        <a:rPr lang="en-US" baseline="0" dirty="0" smtClean="0"/>
-                        <a:t> data (</a:t>
-                      </a:r>
-                      <a:r>
-                        <a:rPr lang="en-US" baseline="0" dirty="0" err="1" smtClean="0"/>
-                        <a:t>i.e</a:t>
-                      </a:r>
-                      <a:r>
-                        <a:rPr lang="en-US" baseline="0" dirty="0" smtClean="0"/>
-                        <a:t> text) for use in ML algorithms</a:t>
-                      </a:r>
-                      <a:endParaRPr lang="en-US" dirty="0"/>
-                    </a:p>
-                  </a:txBody>
-                  <a:tcPr/>
-                </a:tc>
-                <a:tc>
-                  <a:txBody>
-                    <a:bodyPr/>
-                    <a:lstStyle/>
-                    <a:p>
-                      <a:r>
-                        <a:rPr lang="en-US" dirty="0" smtClean="0"/>
-                        <a:t>Feature Extraction</a:t>
-                      </a:r>
-                      <a:endParaRPr lang="en-US" dirty="0"/>
-                    </a:p>
-                  </a:txBody>
-                  <a:tcPr/>
-                </a:tc>
-              </a:tr>
-            </a:tbl>
-          </a:graphicData>
-        </a:graphic>
-      </p:graphicFrame>
-      <p:sp>
-        <p:nvSpPr>
-          <p:cNvPr id="5" name="Rectangle 4"/>
-          <p:cNvSpPr/>
-          <p:nvPr/>
-        </p:nvSpPr>
-        <p:spPr>
-          <a:xfrm>
-            <a:off x="5545074" y="6173126"/>
-            <a:ext cx="1897186" cy="276999"/>
-          </a:xfrm>
-          <a:prstGeom prst="rect">
-            <a:avLst/>
-          </a:prstGeom>
-        </p:spPr>
-        <p:txBody>
-          <a:bodyPr wrap="none">
-            <a:spAutoFit/>
-          </a:bodyPr>
-          <a:lstStyle/>
-          <a:p>
-            <a:r>
-              <a:rPr lang="en-US" sz="1200" dirty="0" smtClean="0"/>
-              <a:t>Taken from </a:t>
-            </a:r>
-            <a:r>
-              <a:rPr lang="en-US" sz="1200" dirty="0" err="1" smtClean="0"/>
-              <a:t>skikit-learn.org</a:t>
-            </a:r>
-            <a:endParaRPr lang="en-US" sz="1200" dirty="0"/>
+              <a:t>A package in Python programming language. Part of the Anaconda Distribution. </a:t>
+            </a:r>
+          </a:p>
+          <a:p>
+            <a:r>
+              <a:rPr lang="en-US" dirty="0" smtClean="0"/>
+              <a:t>Built on </a:t>
+            </a:r>
+            <a:r>
+              <a:rPr lang="en-US" dirty="0" err="1" smtClean="0"/>
+              <a:t>NumPy</a:t>
+            </a:r>
+            <a:r>
+              <a:rPr lang="en-US" dirty="0" smtClean="0"/>
+              <a:t>, </a:t>
+            </a:r>
+            <a:r>
+              <a:rPr lang="en-US" dirty="0" err="1" smtClean="0"/>
+              <a:t>SciPy</a:t>
+            </a:r>
+            <a:r>
+              <a:rPr lang="en-US" dirty="0" smtClean="0"/>
+              <a:t> and </a:t>
+            </a:r>
+            <a:r>
+              <a:rPr lang="en-US" dirty="0" err="1" smtClean="0"/>
+              <a:t>MatPlotLib</a:t>
+            </a:r>
+            <a:r>
+              <a:rPr lang="en-US" dirty="0" smtClean="0"/>
+              <a:t> </a:t>
+            </a:r>
+            <a:r>
+              <a:rPr lang="en-US" dirty="0" smtClean="0"/>
+              <a:t>libraries.</a:t>
+            </a:r>
+          </a:p>
+          <a:p>
+            <a:r>
+              <a:rPr lang="en-US" dirty="0" smtClean="0"/>
+              <a:t>Open source, commercially usable.</a:t>
+            </a:r>
+          </a:p>
+          <a:p>
+            <a:r>
+              <a:rPr lang="en-US" dirty="0" smtClean="0"/>
+              <a:t>Simple to set up for most applications, very powerful functionality.</a:t>
+            </a:r>
+          </a:p>
+          <a:p>
+            <a:r>
+              <a:rPr lang="en-US" dirty="0" smtClean="0"/>
+              <a:t>Highly accessible.</a:t>
+            </a:r>
+          </a:p>
+          <a:p>
+            <a:endParaRPr lang="en-US" dirty="0" smtClean="0"/>
           </a:p>
         </p:txBody>
       </p:sp>
     </p:spTree>
     <p:extLst>
       <p:ext uri="{BB962C8B-B14F-4D97-AF65-F5344CB8AC3E}">
-        <p14:creationId xmlns:p14="http://schemas.microsoft.com/office/powerpoint/2010/main" val="1250834394"/>
+        <p14:creationId xmlns:p14="http://schemas.microsoft.com/office/powerpoint/2010/main" val="1138083365"/>
       </p:ext>
     </p:extLst>
   </p:cSld>
@@ -9575,7 +11370,275 @@
   <p:timing>
     <p:tnLst>
       <p:par>
-        <p:cTn id="1" dur="indefinite" restart="never" nodeType="tmRoot"/>
+        <p:cTn id="1" dur="indefinite" restart="never" nodeType="tmRoot">
+          <p:childTnLst>
+            <p:seq concurrent="1" nextAc="seek">
+              <p:cTn id="2" dur="indefinite" nodeType="mainSeq">
+                <p:childTnLst>
+                  <p:par>
+                    <p:cTn id="3" fill="hold">
+                      <p:stCondLst>
+                        <p:cond delay="indefinite"/>
+                      </p:stCondLst>
+                      <p:childTnLst>
+                        <p:par>
+                          <p:cTn id="4" fill="hold">
+                            <p:stCondLst>
+                              <p:cond delay="0"/>
+                            </p:stCondLst>
+                            <p:childTnLst>
+                              <p:par>
+                                <p:cTn id="5" presetID="1" presetClass="entr" presetSubtype="0" fill="hold" nodeType="clickEffect">
+                                  <p:stCondLst>
+                                    <p:cond delay="0"/>
+                                  </p:stCondLst>
+                                  <p:childTnLst>
+                                    <p:set>
+                                      <p:cBhvr>
+                                        <p:cTn id="6" dur="1" fill="hold">
+                                          <p:stCondLst>
+                                            <p:cond delay="0"/>
+                                          </p:stCondLst>
+                                        </p:cTn>
+                                        <p:tgtEl>
+                                          <p:spTgt spid="3">
+                                            <p:txEl>
+                                              <p:pRg st="0" end="0"/>
+                                            </p:txEl>
+                                          </p:spTgt>
+                                        </p:tgtEl>
+                                        <p:attrNameLst>
+                                          <p:attrName>style.visibility</p:attrName>
+                                        </p:attrNameLst>
+                                      </p:cBhvr>
+                                      <p:to>
+                                        <p:strVal val="visible"/>
+                                      </p:to>
+                                    </p:set>
+                                  </p:childTnLst>
+                                </p:cTn>
+                              </p:par>
+                            </p:childTnLst>
+                          </p:cTn>
+                        </p:par>
+                      </p:childTnLst>
+                    </p:cTn>
+                  </p:par>
+                  <p:par>
+                    <p:cTn id="7" fill="hold">
+                      <p:stCondLst>
+                        <p:cond delay="indefinite"/>
+                      </p:stCondLst>
+                      <p:childTnLst>
+                        <p:par>
+                          <p:cTn id="8" fill="hold">
+                            <p:stCondLst>
+                              <p:cond delay="0"/>
+                            </p:stCondLst>
+                            <p:childTnLst>
+                              <p:par>
+                                <p:cTn id="9" presetID="1" presetClass="entr" presetSubtype="0" fill="hold" nodeType="clickEffect">
+                                  <p:stCondLst>
+                                    <p:cond delay="0"/>
+                                  </p:stCondLst>
+                                  <p:childTnLst>
+                                    <p:set>
+                                      <p:cBhvr>
+                                        <p:cTn id="10" dur="1" fill="hold">
+                                          <p:stCondLst>
+                                            <p:cond delay="0"/>
+                                          </p:stCondLst>
+                                        </p:cTn>
+                                        <p:tgtEl>
+                                          <p:spTgt spid="3">
+                                            <p:txEl>
+                                              <p:pRg st="1" end="1"/>
+                                            </p:txEl>
+                                          </p:spTgt>
+                                        </p:tgtEl>
+                                        <p:attrNameLst>
+                                          <p:attrName>style.visibility</p:attrName>
+                                        </p:attrNameLst>
+                                      </p:cBhvr>
+                                      <p:to>
+                                        <p:strVal val="visible"/>
+                                      </p:to>
+                                    </p:set>
+                                  </p:childTnLst>
+                                </p:cTn>
+                              </p:par>
+                            </p:childTnLst>
+                          </p:cTn>
+                        </p:par>
+                      </p:childTnLst>
+                    </p:cTn>
+                  </p:par>
+                  <p:par>
+                    <p:cTn id="11" fill="hold">
+                      <p:stCondLst>
+                        <p:cond delay="indefinite"/>
+                      </p:stCondLst>
+                      <p:childTnLst>
+                        <p:par>
+                          <p:cTn id="12" fill="hold">
+                            <p:stCondLst>
+                              <p:cond delay="0"/>
+                            </p:stCondLst>
+                            <p:childTnLst>
+                              <p:par>
+                                <p:cTn id="13" presetID="1" presetClass="entr" presetSubtype="0" fill="hold" nodeType="clickEffect">
+                                  <p:stCondLst>
+                                    <p:cond delay="0"/>
+                                  </p:stCondLst>
+                                  <p:childTnLst>
+                                    <p:set>
+                                      <p:cBhvr>
+                                        <p:cTn id="14" dur="1" fill="hold">
+                                          <p:stCondLst>
+                                            <p:cond delay="0"/>
+                                          </p:stCondLst>
+                                        </p:cTn>
+                                        <p:tgtEl>
+                                          <p:spTgt spid="3">
+                                            <p:txEl>
+                                              <p:pRg st="2" end="2"/>
+                                            </p:txEl>
+                                          </p:spTgt>
+                                        </p:tgtEl>
+                                        <p:attrNameLst>
+                                          <p:attrName>style.visibility</p:attrName>
+                                        </p:attrNameLst>
+                                      </p:cBhvr>
+                                      <p:to>
+                                        <p:strVal val="visible"/>
+                                      </p:to>
+                                    </p:set>
+                                  </p:childTnLst>
+                                </p:cTn>
+                              </p:par>
+                            </p:childTnLst>
+                          </p:cTn>
+                        </p:par>
+                      </p:childTnLst>
+                    </p:cTn>
+                  </p:par>
+                  <p:par>
+                    <p:cTn id="15" fill="hold">
+                      <p:stCondLst>
+                        <p:cond delay="indefinite"/>
+                      </p:stCondLst>
+                      <p:childTnLst>
+                        <p:par>
+                          <p:cTn id="16" fill="hold">
+                            <p:stCondLst>
+                              <p:cond delay="0"/>
+                            </p:stCondLst>
+                            <p:childTnLst>
+                              <p:par>
+                                <p:cTn id="17" presetID="1" presetClass="entr" presetSubtype="0" fill="hold" nodeType="clickEffect">
+                                  <p:stCondLst>
+                                    <p:cond delay="0"/>
+                                  </p:stCondLst>
+                                  <p:childTnLst>
+                                    <p:set>
+                                      <p:cBhvr>
+                                        <p:cTn id="18" dur="1" fill="hold">
+                                          <p:stCondLst>
+                                            <p:cond delay="0"/>
+                                          </p:stCondLst>
+                                        </p:cTn>
+                                        <p:tgtEl>
+                                          <p:spTgt spid="3">
+                                            <p:txEl>
+                                              <p:pRg st="3" end="3"/>
+                                            </p:txEl>
+                                          </p:spTgt>
+                                        </p:tgtEl>
+                                        <p:attrNameLst>
+                                          <p:attrName>style.visibility</p:attrName>
+                                        </p:attrNameLst>
+                                      </p:cBhvr>
+                                      <p:to>
+                                        <p:strVal val="visible"/>
+                                      </p:to>
+                                    </p:set>
+                                  </p:childTnLst>
+                                </p:cTn>
+                              </p:par>
+                            </p:childTnLst>
+                          </p:cTn>
+                        </p:par>
+                      </p:childTnLst>
+                    </p:cTn>
+                  </p:par>
+                  <p:par>
+                    <p:cTn id="19" fill="hold">
+                      <p:stCondLst>
+                        <p:cond delay="indefinite"/>
+                      </p:stCondLst>
+                      <p:childTnLst>
+                        <p:par>
+                          <p:cTn id="20" fill="hold">
+                            <p:stCondLst>
+                              <p:cond delay="0"/>
+                            </p:stCondLst>
+                            <p:childTnLst>
+                              <p:par>
+                                <p:cTn id="21" presetID="1" presetClass="entr" presetSubtype="0" fill="hold" nodeType="clickEffect">
+                                  <p:stCondLst>
+                                    <p:cond delay="0"/>
+                                  </p:stCondLst>
+                                  <p:childTnLst>
+                                    <p:set>
+                                      <p:cBhvr>
+                                        <p:cTn id="22" dur="1" fill="hold">
+                                          <p:stCondLst>
+                                            <p:cond delay="0"/>
+                                          </p:stCondLst>
+                                        </p:cTn>
+                                        <p:tgtEl>
+                                          <p:spTgt spid="3">
+                                            <p:txEl>
+                                              <p:pRg st="4" end="4"/>
+                                            </p:txEl>
+                                          </p:spTgt>
+                                        </p:tgtEl>
+                                        <p:attrNameLst>
+                                          <p:attrName>style.visibility</p:attrName>
+                                        </p:attrNameLst>
+                                      </p:cBhvr>
+                                      <p:to>
+                                        <p:strVal val="visible"/>
+                                      </p:to>
+                                    </p:set>
+                                  </p:childTnLst>
+                                </p:cTn>
+                              </p:par>
+                            </p:childTnLst>
+                          </p:cTn>
+                        </p:par>
+                      </p:childTnLst>
+                    </p:cTn>
+                  </p:par>
+                </p:childTnLst>
+              </p:cTn>
+              <p:prevCondLst>
+                <p:cond evt="onPrev" delay="0">
+                  <p:tgtEl>
+                    <p:sldTgt/>
+                  </p:tgtEl>
+                </p:cond>
+              </p:prevCondLst>
+              <p:nextCondLst>
+                <p:cond evt="onNext" delay="0">
+                  <p:tgtEl>
+                    <p:sldTgt/>
+                  </p:tgtEl>
+                </p:cond>
+              </p:nextCondLst>
+            </p:seq>
+          </p:childTnLst>
+        </p:cTn>
       </p:par>
     </p:tnLst>
   </p:timing>

</xml_diff>

<commit_message>
Additions of my slides. Merge of all slides. Fixed typos. Enforced consistency.
</commit_message>
<xml_diff>
--- a/ML_Tools.pptx
+++ b/ML_Tools.pptx
@@ -10401,7 +10401,19 @@
             </a:r>
             <a:r>
               <a:rPr lang="en-US" dirty="0" smtClean="0"/>
-              <a:t>“Saratoga Houses” dataset found in the “data” directory (Python code is already written to read this in).</a:t>
+              <a:t>Boston</a:t>
+            </a:r>
+            <a:r>
+              <a:rPr lang="en-US" dirty="0" smtClean="0"/>
+              <a:t> dataset found in </a:t>
+            </a:r>
+            <a:r>
+              <a:rPr lang="en-US" dirty="0" err="1" smtClean="0"/>
+              <a:t>scikit</a:t>
+            </a:r>
+            <a:r>
+              <a:rPr lang="en-US" smtClean="0"/>
+              <a:t>-learn.</a:t>
             </a:r>
             <a:endParaRPr lang="en-US" dirty="0"/>
           </a:p>

</xml_diff>

<commit_message>
Renamed Exerice to Practical for Practical 2 stuff
</commit_message>
<xml_diff>
--- a/ML_Tools.pptx
+++ b/ML_Tools.pptx
@@ -7214,8 +7214,21 @@
             </a:r>
             <a:r>
               <a:rPr lang="en-US" dirty="0" smtClean="0"/>
-              <a:t>‘Practical-1-1-DT’</a:t>
-            </a:r>
+              <a:t>‘</a:t>
+            </a:r>
+            <a:r>
+              <a:rPr lang="en-US" dirty="0" smtClean="0"/>
+              <a:t>Practical</a:t>
+            </a:r>
+            <a:r>
+              <a:rPr lang="en-US" dirty="0" smtClean="0"/>
+              <a:t>_1</a:t>
+            </a:r>
+            <a:r>
+              <a:rPr lang="en-US" dirty="0" smtClean="0"/>
+              <a:t>’</a:t>
+            </a:r>
+            <a:endParaRPr lang="en-US" dirty="0" smtClean="0"/>
           </a:p>
           <a:p>
             <a:pPr marL="457200" indent="-457200">
@@ -7380,12 +7393,21 @@
             </a:pPr>
             <a:r>
               <a:rPr lang="en-US" dirty="0"/>
-              <a:t>Enter the folder ‘Practical-1-1-DT</a:t>
+              <a:t>Enter the folder ‘</a:t>
+            </a:r>
+            <a:r>
+              <a:rPr lang="en-US" dirty="0" smtClean="0"/>
+              <a:t>Practical</a:t>
+            </a:r>
+            <a:r>
+              <a:rPr lang="en-US" dirty="0" smtClean="0"/>
+              <a:t>_1</a:t>
             </a:r>
             <a:r>
               <a:rPr lang="en-US" dirty="0" smtClean="0"/>
               <a:t>’</a:t>
             </a:r>
+            <a:endParaRPr lang="en-US" dirty="0" smtClean="0"/>
           </a:p>
           <a:p>
             <a:pPr marL="457200" indent="-457200">
@@ -10306,7 +10328,11 @@
           <a:p>
             <a:r>
               <a:rPr lang="en-US" dirty="0" smtClean="0"/>
-              <a:t>Regression Exercise</a:t>
+              <a:t>Regression </a:t>
+            </a:r>
+            <a:r>
+              <a:rPr lang="en-US" dirty="0" smtClean="0"/>
+              <a:t>Practical</a:t>
             </a:r>
             <a:endParaRPr lang="en-US" dirty="0"/>
           </a:p>
@@ -10350,7 +10376,7 @@
             </a:r>
             <a:r>
               <a:rPr lang="en-US" dirty="0" err="1" smtClean="0"/>
-              <a:t>RegressionExercise</a:t>
+              <a:t>RegressionPractical</a:t>
             </a:r>
             <a:r>
               <a:rPr lang="en-US" dirty="0" smtClean="0"/>
@@ -10362,7 +10388,7 @@
             </a:r>
             <a:r>
               <a:rPr lang="en-US" dirty="0" smtClean="0"/>
-              <a:t> Notebook, located in the “Exercises” directory.</a:t>
+              <a:t> Notebook, located in the “Practical_2” directory.</a:t>
             </a:r>
             <a:endParaRPr lang="en-US" dirty="0" smtClean="0"/>
           </a:p>
@@ -10412,7 +10438,7 @@
               <a:t>scikit</a:t>
             </a:r>
             <a:r>
-              <a:rPr lang="en-US" smtClean="0"/>
+              <a:rPr lang="en-US" dirty="0" smtClean="0"/>
               <a:t>-learn.</a:t>
             </a:r>
             <a:endParaRPr lang="en-US" dirty="0"/>

</xml_diff>

<commit_message>
Updated Powerpoint very slightly
</commit_message>
<xml_diff>
--- a/ML_Tools.pptx
+++ b/ML_Tools.pptx
@@ -5,7 +5,7 @@
     <p:sldMasterId id="2147483648" r:id="rId1"/>
   </p:sldMasterIdLst>
   <p:notesMasterIdLst>
-    <p:notesMasterId r:id="rId35"/>
+    <p:notesMasterId r:id="rId32"/>
   </p:notesMasterIdLst>
   <p:sldIdLst>
     <p:sldId id="256" r:id="rId2"/>
@@ -20,27 +20,24 @@
     <p:sldId id="265" r:id="rId11"/>
     <p:sldId id="297" r:id="rId12"/>
     <p:sldId id="298" r:id="rId13"/>
-    <p:sldId id="257" r:id="rId14"/>
-    <p:sldId id="269" r:id="rId15"/>
-    <p:sldId id="270" r:id="rId16"/>
-    <p:sldId id="275" r:id="rId17"/>
-    <p:sldId id="289" r:id="rId18"/>
-    <p:sldId id="271" r:id="rId19"/>
-    <p:sldId id="272" r:id="rId20"/>
-    <p:sldId id="273" r:id="rId21"/>
-    <p:sldId id="274" r:id="rId22"/>
-    <p:sldId id="276" r:id="rId23"/>
-    <p:sldId id="277" r:id="rId24"/>
-    <p:sldId id="300" r:id="rId25"/>
-    <p:sldId id="294" r:id="rId26"/>
-    <p:sldId id="293" r:id="rId27"/>
-    <p:sldId id="284" r:id="rId28"/>
-    <p:sldId id="292" r:id="rId29"/>
-    <p:sldId id="291" r:id="rId30"/>
-    <p:sldId id="290" r:id="rId31"/>
-    <p:sldId id="278" r:id="rId32"/>
-    <p:sldId id="288" r:id="rId33"/>
-    <p:sldId id="279" r:id="rId34"/>
+    <p:sldId id="269" r:id="rId14"/>
+    <p:sldId id="270" r:id="rId15"/>
+    <p:sldId id="275" r:id="rId16"/>
+    <p:sldId id="289" r:id="rId17"/>
+    <p:sldId id="271" r:id="rId18"/>
+    <p:sldId id="272" r:id="rId19"/>
+    <p:sldId id="273" r:id="rId20"/>
+    <p:sldId id="274" r:id="rId21"/>
+    <p:sldId id="276" r:id="rId22"/>
+    <p:sldId id="300" r:id="rId23"/>
+    <p:sldId id="294" r:id="rId24"/>
+    <p:sldId id="293" r:id="rId25"/>
+    <p:sldId id="284" r:id="rId26"/>
+    <p:sldId id="292" r:id="rId27"/>
+    <p:sldId id="291" r:id="rId28"/>
+    <p:sldId id="290" r:id="rId29"/>
+    <p:sldId id="288" r:id="rId30"/>
+    <p:sldId id="279" r:id="rId31"/>
   </p:sldIdLst>
   <p:sldSz cx="12192000" cy="6858000"/>
   <p:notesSz cx="6858000" cy="9144000"/>
@@ -7514,85 +7511,6 @@
           <a:p>
             <a:r>
               <a:rPr lang="en-US" dirty="0" smtClean="0"/>
-              <a:t>Classification Summary</a:t>
-            </a:r>
-            <a:endParaRPr lang="en-US" dirty="0"/>
-          </a:p>
-        </p:txBody>
-      </p:sp>
-      <p:sp>
-        <p:nvSpPr>
-          <p:cNvPr id="3" name="Content Placeholder 2"/>
-          <p:cNvSpPr>
-            <a:spLocks noGrp="1"/>
-          </p:cNvSpPr>
-          <p:nvPr>
-            <p:ph idx="1"/>
-          </p:nvPr>
-        </p:nvSpPr>
-        <p:spPr/>
-        <p:txBody>
-          <a:bodyPr/>
-          <a:lstStyle/>
-          <a:p>
-            <a:endParaRPr lang="en-US" dirty="0"/>
-          </a:p>
-        </p:txBody>
-      </p:sp>
-    </p:spTree>
-    <p:extLst>
-      <p:ext uri="{BB962C8B-B14F-4D97-AF65-F5344CB8AC3E}">
-        <p14:creationId xmlns:p14="http://schemas.microsoft.com/office/powerpoint/2010/main" val="460922839"/>
-      </p:ext>
-    </p:extLst>
-  </p:cSld>
-  <p:clrMapOvr>
-    <a:masterClrMapping/>
-  </p:clrMapOvr>
-  <p:timing>
-    <p:tnLst>
-      <p:par>
-        <p:cTn xmlns:p14="http://schemas.microsoft.com/office/powerpoint/2010/main" id="1" dur="indefinite" restart="never" nodeType="tmRoot"/>
-      </p:par>
-    </p:tnLst>
-  </p:timing>
-</p:sld>
-</file>
-
-<file path=ppt/slides/slide14.xml><?xml version="1.0" encoding="utf-8"?>
-<p:sld xmlns:a="http://schemas.openxmlformats.org/drawingml/2006/main" xmlns:r="http://schemas.openxmlformats.org/officeDocument/2006/relationships" xmlns:p="http://schemas.openxmlformats.org/presentationml/2006/main">
-  <p:cSld>
-    <p:spTree>
-      <p:nvGrpSpPr>
-        <p:cNvPr id="1" name=""/>
-        <p:cNvGrpSpPr/>
-        <p:nvPr/>
-      </p:nvGrpSpPr>
-      <p:grpSpPr>
-        <a:xfrm>
-          <a:off x="0" y="0"/>
-          <a:ext cx="0" cy="0"/>
-          <a:chOff x="0" y="0"/>
-          <a:chExt cx="0" cy="0"/>
-        </a:xfrm>
-      </p:grpSpPr>
-      <p:sp>
-        <p:nvSpPr>
-          <p:cNvPr id="2" name="Title 1"/>
-          <p:cNvSpPr>
-            <a:spLocks noGrp="1"/>
-          </p:cNvSpPr>
-          <p:nvPr>
-            <p:ph type="title"/>
-          </p:nvPr>
-        </p:nvSpPr>
-        <p:spPr/>
-        <p:txBody>
-          <a:bodyPr/>
-          <a:lstStyle/>
-          <a:p>
-            <a:r>
-              <a:rPr lang="en-US" dirty="0" smtClean="0"/>
               <a:t>Regression</a:t>
             </a:r>
             <a:endParaRPr lang="en-US" dirty="0"/>
@@ -7969,7 +7887,7 @@
 </p:sld>
 </file>
 
-<file path=ppt/slides/slide15.xml><?xml version="1.0" encoding="utf-8"?>
+<file path=ppt/slides/slide14.xml><?xml version="1.0" encoding="utf-8"?>
 <p:sld xmlns:a="http://schemas.openxmlformats.org/drawingml/2006/main" xmlns:r="http://schemas.openxmlformats.org/officeDocument/2006/relationships" xmlns:p="http://schemas.openxmlformats.org/presentationml/2006/main">
   <p:cSld>
     <p:spTree>
@@ -8749,6 +8667,172 @@
     <p:extLst>
       <p:ext uri="{BB962C8B-B14F-4D97-AF65-F5344CB8AC3E}">
         <p14:creationId xmlns:p14="http://schemas.microsoft.com/office/powerpoint/2010/main" val="3263225446"/>
+      </p:ext>
+    </p:extLst>
+  </p:cSld>
+  <p:clrMapOvr>
+    <a:masterClrMapping/>
+  </p:clrMapOvr>
+  <p:timing>
+    <p:tnLst>
+      <p:par>
+        <p:cTn xmlns:p14="http://schemas.microsoft.com/office/powerpoint/2010/main" id="1" dur="indefinite" restart="never" nodeType="tmRoot"/>
+      </p:par>
+    </p:tnLst>
+  </p:timing>
+</p:sld>
+</file>
+
+<file path=ppt/slides/slide15.xml><?xml version="1.0" encoding="utf-8"?>
+<p:sld xmlns:a="http://schemas.openxmlformats.org/drawingml/2006/main" xmlns:r="http://schemas.openxmlformats.org/officeDocument/2006/relationships" xmlns:p="http://schemas.openxmlformats.org/presentationml/2006/main">
+  <p:cSld>
+    <p:spTree>
+      <p:nvGrpSpPr>
+        <p:cNvPr id="1" name=""/>
+        <p:cNvGrpSpPr/>
+        <p:nvPr/>
+      </p:nvGrpSpPr>
+      <p:grpSpPr>
+        <a:xfrm>
+          <a:off x="0" y="0"/>
+          <a:ext cx="0" cy="0"/>
+          <a:chOff x="0" y="0"/>
+          <a:chExt cx="0" cy="0"/>
+        </a:xfrm>
+      </p:grpSpPr>
+      <p:sp>
+        <p:nvSpPr>
+          <p:cNvPr id="2" name="Title 1"/>
+          <p:cNvSpPr>
+            <a:spLocks noGrp="1"/>
+          </p:cNvSpPr>
+          <p:nvPr>
+            <p:ph type="title"/>
+          </p:nvPr>
+        </p:nvSpPr>
+        <p:spPr/>
+        <p:txBody>
+          <a:bodyPr/>
+          <a:lstStyle/>
+          <a:p>
+            <a:r>
+              <a:rPr lang="en-US" dirty="0" smtClean="0"/>
+              <a:t>Preprocessing</a:t>
+            </a:r>
+            <a:endParaRPr lang="en-US" dirty="0"/>
+          </a:p>
+        </p:txBody>
+      </p:sp>
+      <p:sp>
+        <p:nvSpPr>
+          <p:cNvPr id="3" name="Content Placeholder 2"/>
+          <p:cNvSpPr>
+            <a:spLocks noGrp="1"/>
+          </p:cNvSpPr>
+          <p:nvPr>
+            <p:ph idx="1"/>
+          </p:nvPr>
+        </p:nvSpPr>
+        <p:spPr>
+          <a:xfrm>
+            <a:off x="1484310" y="2262246"/>
+            <a:ext cx="10018713" cy="3613547"/>
+          </a:xfrm>
+        </p:spPr>
+        <p:txBody>
+          <a:bodyPr>
+            <a:noAutofit/>
+          </a:bodyPr>
+          <a:lstStyle/>
+          <a:p>
+            <a:r>
+              <a:rPr lang="en-US" dirty="0" smtClean="0"/>
+              <a:t>Preprocessing </a:t>
+            </a:r>
+            <a:r>
+              <a:rPr lang="en-US" dirty="0" smtClean="0"/>
+              <a:t>is </a:t>
+            </a:r>
+            <a:r>
+              <a:rPr lang="en-US" dirty="0" smtClean="0"/>
+              <a:t>the processing of </a:t>
+            </a:r>
+            <a:r>
+              <a:rPr lang="en-US" dirty="0" smtClean="0"/>
+              <a:t>data before modeling or analysis such that it is gotten into a ready state to be worked on.</a:t>
+            </a:r>
+            <a:endParaRPr lang="en-US" dirty="0" smtClean="0"/>
+          </a:p>
+          <a:p>
+            <a:r>
+              <a:rPr lang="en-US" dirty="0" smtClean="0"/>
+              <a:t>An example of preprocessing was seen earlier in the first classification exercise, where the texture of the fruit was given as a string and had to be converted to a binary number</a:t>
+            </a:r>
+            <a:r>
+              <a:rPr lang="en-US" dirty="0" smtClean="0"/>
+              <a:t>.</a:t>
+            </a:r>
+          </a:p>
+          <a:p>
+            <a:r>
+              <a:rPr lang="en-US" dirty="0" smtClean="0"/>
+              <a:t>Other preprocessing includes the </a:t>
+            </a:r>
+            <a:r>
+              <a:rPr lang="en-US" dirty="0"/>
+              <a:t>splitting of data into training and testing </a:t>
+            </a:r>
+            <a:r>
+              <a:rPr lang="en-US" dirty="0" smtClean="0"/>
+              <a:t>sets and </a:t>
+            </a:r>
+            <a:r>
+              <a:rPr lang="en-US" dirty="0" err="1" smtClean="0"/>
+              <a:t>normalisation</a:t>
+            </a:r>
+            <a:r>
+              <a:rPr lang="en-US" dirty="0" smtClean="0"/>
+              <a:t> of the data.</a:t>
+            </a:r>
+            <a:endParaRPr lang="en-US" dirty="0" smtClean="0"/>
+          </a:p>
+          <a:p>
+            <a:r>
+              <a:rPr lang="en-US" dirty="0" smtClean="0"/>
+              <a:t>More about preprocessing can be found on the </a:t>
+            </a:r>
+            <a:r>
+              <a:rPr lang="en-US" dirty="0" err="1" smtClean="0"/>
+              <a:t>scikit</a:t>
+            </a:r>
+            <a:r>
+              <a:rPr lang="en-US" dirty="0" smtClean="0"/>
+              <a:t>-</a:t>
+            </a:r>
+            <a:r>
+              <a:rPr lang="en-US" dirty="0"/>
+              <a:t>learn website: </a:t>
+            </a:r>
+            <a:r>
+              <a:rPr lang="en-US" dirty="0">
+                <a:hlinkClick r:id="rId2"/>
+              </a:rPr>
+              <a:t>http://scikit-learn.org/stable/modules/preprocessing.html#</a:t>
+            </a:r>
+            <a:r>
+              <a:rPr lang="en-US" dirty="0" smtClean="0">
+                <a:hlinkClick r:id="rId2"/>
+              </a:rPr>
+              <a:t>preprocessing</a:t>
+            </a:r>
+            <a:endParaRPr lang="en-US" dirty="0"/>
+          </a:p>
+        </p:txBody>
+      </p:sp>
+    </p:spTree>
+    <p:extLst>
+      <p:ext uri="{BB962C8B-B14F-4D97-AF65-F5344CB8AC3E}">
+        <p14:creationId xmlns:p14="http://schemas.microsoft.com/office/powerpoint/2010/main" val="238913107"/>
       </p:ext>
     </p:extLst>
   </p:cSld>
@@ -8798,172 +8882,6 @@
           <a:lstStyle/>
           <a:p>
             <a:r>
-              <a:rPr lang="en-US" dirty="0" smtClean="0"/>
-              <a:t>Preprocessing</a:t>
-            </a:r>
-            <a:endParaRPr lang="en-US" dirty="0"/>
-          </a:p>
-        </p:txBody>
-      </p:sp>
-      <p:sp>
-        <p:nvSpPr>
-          <p:cNvPr id="3" name="Content Placeholder 2"/>
-          <p:cNvSpPr>
-            <a:spLocks noGrp="1"/>
-          </p:cNvSpPr>
-          <p:nvPr>
-            <p:ph idx="1"/>
-          </p:nvPr>
-        </p:nvSpPr>
-        <p:spPr>
-          <a:xfrm>
-            <a:off x="1484310" y="2262246"/>
-            <a:ext cx="10018713" cy="3613547"/>
-          </a:xfrm>
-        </p:spPr>
-        <p:txBody>
-          <a:bodyPr>
-            <a:noAutofit/>
-          </a:bodyPr>
-          <a:lstStyle/>
-          <a:p>
-            <a:r>
-              <a:rPr lang="en-US" dirty="0" smtClean="0"/>
-              <a:t>Preprocessing </a:t>
-            </a:r>
-            <a:r>
-              <a:rPr lang="en-US" dirty="0" smtClean="0"/>
-              <a:t>is </a:t>
-            </a:r>
-            <a:r>
-              <a:rPr lang="en-US" dirty="0" smtClean="0"/>
-              <a:t>the processing of </a:t>
-            </a:r>
-            <a:r>
-              <a:rPr lang="en-US" dirty="0" smtClean="0"/>
-              <a:t>data before modeling or analysis such that it is gotten into a ready state to be worked on.</a:t>
-            </a:r>
-            <a:endParaRPr lang="en-US" dirty="0" smtClean="0"/>
-          </a:p>
-          <a:p>
-            <a:r>
-              <a:rPr lang="en-US" dirty="0" smtClean="0"/>
-              <a:t>An example of preprocessing was seen earlier in the first classification exercise, where the texture of the fruit was given as a string and had to be converted to a binary number</a:t>
-            </a:r>
-            <a:r>
-              <a:rPr lang="en-US" dirty="0" smtClean="0"/>
-              <a:t>.</a:t>
-            </a:r>
-          </a:p>
-          <a:p>
-            <a:r>
-              <a:rPr lang="en-US" dirty="0" smtClean="0"/>
-              <a:t>Other preprocessing includes the </a:t>
-            </a:r>
-            <a:r>
-              <a:rPr lang="en-US" dirty="0"/>
-              <a:t>splitting of data into training and testing </a:t>
-            </a:r>
-            <a:r>
-              <a:rPr lang="en-US" dirty="0" smtClean="0"/>
-              <a:t>sets and </a:t>
-            </a:r>
-            <a:r>
-              <a:rPr lang="en-US" dirty="0" err="1" smtClean="0"/>
-              <a:t>normalisation</a:t>
-            </a:r>
-            <a:r>
-              <a:rPr lang="en-US" dirty="0" smtClean="0"/>
-              <a:t> of the data.</a:t>
-            </a:r>
-            <a:endParaRPr lang="en-US" dirty="0" smtClean="0"/>
-          </a:p>
-          <a:p>
-            <a:r>
-              <a:rPr lang="en-US" dirty="0" smtClean="0"/>
-              <a:t>More about preprocessing can be found on the </a:t>
-            </a:r>
-            <a:r>
-              <a:rPr lang="en-US" dirty="0" err="1" smtClean="0"/>
-              <a:t>scikit</a:t>
-            </a:r>
-            <a:r>
-              <a:rPr lang="en-US" dirty="0" smtClean="0"/>
-              <a:t>-</a:t>
-            </a:r>
-            <a:r>
-              <a:rPr lang="en-US" dirty="0"/>
-              <a:t>learn website: </a:t>
-            </a:r>
-            <a:r>
-              <a:rPr lang="en-US" dirty="0">
-                <a:hlinkClick r:id="rId2"/>
-              </a:rPr>
-              <a:t>http://scikit-learn.org/stable/modules/preprocessing.html#</a:t>
-            </a:r>
-            <a:r>
-              <a:rPr lang="en-US" dirty="0" smtClean="0">
-                <a:hlinkClick r:id="rId2"/>
-              </a:rPr>
-              <a:t>preprocessing</a:t>
-            </a:r>
-            <a:endParaRPr lang="en-US" dirty="0"/>
-          </a:p>
-        </p:txBody>
-      </p:sp>
-    </p:spTree>
-    <p:extLst>
-      <p:ext uri="{BB962C8B-B14F-4D97-AF65-F5344CB8AC3E}">
-        <p14:creationId xmlns:p14="http://schemas.microsoft.com/office/powerpoint/2010/main" val="238913107"/>
-      </p:ext>
-    </p:extLst>
-  </p:cSld>
-  <p:clrMapOvr>
-    <a:masterClrMapping/>
-  </p:clrMapOvr>
-  <p:timing>
-    <p:tnLst>
-      <p:par>
-        <p:cTn xmlns:p14="http://schemas.microsoft.com/office/powerpoint/2010/main" id="1" dur="indefinite" restart="never" nodeType="tmRoot"/>
-      </p:par>
-    </p:tnLst>
-  </p:timing>
-</p:sld>
-</file>
-
-<file path=ppt/slides/slide17.xml><?xml version="1.0" encoding="utf-8"?>
-<p:sld xmlns:a="http://schemas.openxmlformats.org/drawingml/2006/main" xmlns:r="http://schemas.openxmlformats.org/officeDocument/2006/relationships" xmlns:p="http://schemas.openxmlformats.org/presentationml/2006/main">
-  <p:cSld>
-    <p:spTree>
-      <p:nvGrpSpPr>
-        <p:cNvPr id="1" name=""/>
-        <p:cNvGrpSpPr/>
-        <p:nvPr/>
-      </p:nvGrpSpPr>
-      <p:grpSpPr>
-        <a:xfrm>
-          <a:off x="0" y="0"/>
-          <a:ext cx="0" cy="0"/>
-          <a:chOff x="0" y="0"/>
-          <a:chExt cx="0" cy="0"/>
-        </a:xfrm>
-      </p:grpSpPr>
-      <p:sp>
-        <p:nvSpPr>
-          <p:cNvPr id="2" name="Title 1"/>
-          <p:cNvSpPr>
-            <a:spLocks noGrp="1"/>
-          </p:cNvSpPr>
-          <p:nvPr>
-            <p:ph type="title"/>
-          </p:nvPr>
-        </p:nvSpPr>
-        <p:spPr/>
-        <p:txBody>
-          <a:bodyPr/>
-          <a:lstStyle/>
-          <a:p>
-            <a:r>
               <a:rPr lang="en-US" dirty="0" err="1" smtClean="0"/>
               <a:t>Underfiitting</a:t>
             </a:r>
@@ -9215,6 +9133,190 @@
 </p:sld>
 </file>
 
+<file path=ppt/slides/slide17.xml><?xml version="1.0" encoding="utf-8"?>
+<p:sld xmlns:a="http://schemas.openxmlformats.org/drawingml/2006/main" xmlns:r="http://schemas.openxmlformats.org/officeDocument/2006/relationships" xmlns:p="http://schemas.openxmlformats.org/presentationml/2006/main">
+  <p:cSld>
+    <p:spTree>
+      <p:nvGrpSpPr>
+        <p:cNvPr id="1" name=""/>
+        <p:cNvGrpSpPr/>
+        <p:nvPr/>
+      </p:nvGrpSpPr>
+      <p:grpSpPr>
+        <a:xfrm>
+          <a:off x="0" y="0"/>
+          <a:ext cx="0" cy="0"/>
+          <a:chOff x="0" y="0"/>
+          <a:chExt cx="0" cy="0"/>
+        </a:xfrm>
+      </p:grpSpPr>
+      <p:sp>
+        <p:nvSpPr>
+          <p:cNvPr id="2" name="Title 1"/>
+          <p:cNvSpPr>
+            <a:spLocks noGrp="1"/>
+          </p:cNvSpPr>
+          <p:nvPr>
+            <p:ph type="title"/>
+          </p:nvPr>
+        </p:nvSpPr>
+        <p:spPr/>
+        <p:txBody>
+          <a:bodyPr/>
+          <a:lstStyle/>
+          <a:p>
+            <a:r>
+              <a:rPr lang="en-US" dirty="0" err="1" smtClean="0"/>
+              <a:t>Scikit</a:t>
+            </a:r>
+            <a:r>
+              <a:rPr lang="en-US" dirty="0" smtClean="0"/>
+              <a:t>-Learn and Regression</a:t>
+            </a:r>
+            <a:endParaRPr lang="en-US" dirty="0"/>
+          </a:p>
+        </p:txBody>
+      </p:sp>
+      <p:sp>
+        <p:nvSpPr>
+          <p:cNvPr id="3" name="Content Placeholder 2"/>
+          <p:cNvSpPr>
+            <a:spLocks noGrp="1"/>
+          </p:cNvSpPr>
+          <p:nvPr>
+            <p:ph idx="1"/>
+          </p:nvPr>
+        </p:nvSpPr>
+        <p:spPr>
+          <a:xfrm>
+            <a:off x="1484310" y="2080805"/>
+            <a:ext cx="10018713" cy="3822902"/>
+          </a:xfrm>
+        </p:spPr>
+        <p:txBody>
+          <a:bodyPr>
+            <a:noAutofit/>
+          </a:bodyPr>
+          <a:lstStyle/>
+          <a:p>
+            <a:r>
+              <a:rPr lang="en-US" dirty="0" err="1"/>
+              <a:t>S</a:t>
+            </a:r>
+            <a:r>
+              <a:rPr lang="en-US" dirty="0" err="1" smtClean="0"/>
+              <a:t>cikit</a:t>
+            </a:r>
+            <a:r>
+              <a:rPr lang="en-US" dirty="0" smtClean="0"/>
+              <a:t>-learn makes linear regression very simple.</a:t>
+            </a:r>
+          </a:p>
+          <a:p>
+            <a:r>
+              <a:rPr lang="en-US" dirty="0" smtClean="0"/>
+              <a:t>Import the </a:t>
+            </a:r>
+            <a:r>
+              <a:rPr lang="en-US" dirty="0" err="1" smtClean="0"/>
+              <a:t>linear_model</a:t>
+            </a:r>
+            <a:r>
+              <a:rPr lang="en-US" dirty="0" smtClean="0"/>
+              <a:t> module from </a:t>
+            </a:r>
+            <a:r>
+              <a:rPr lang="en-US" dirty="0" err="1" smtClean="0"/>
+              <a:t>sklearn</a:t>
+            </a:r>
+            <a:r>
+              <a:rPr lang="en-US" dirty="0" smtClean="0"/>
+              <a:t>, choose which linear model to use, fit the data to it, </a:t>
+            </a:r>
+            <a:r>
+              <a:rPr lang="en-US" dirty="0" err="1" smtClean="0"/>
+              <a:t>analyse</a:t>
+            </a:r>
+            <a:r>
+              <a:rPr lang="en-US" dirty="0" smtClean="0"/>
+              <a:t> and test the results.</a:t>
+            </a:r>
+          </a:p>
+          <a:p>
+            <a:r>
+              <a:rPr lang="en-US" dirty="0" smtClean="0"/>
+              <a:t>In </a:t>
+            </a:r>
+            <a:r>
+              <a:rPr lang="en-US" dirty="0" err="1" smtClean="0"/>
+              <a:t>scikit</a:t>
+            </a:r>
+            <a:r>
+              <a:rPr lang="en-US" dirty="0" smtClean="0"/>
+              <a:t>-learn there are a number of regression techniques </a:t>
+            </a:r>
+            <a:r>
+              <a:rPr lang="en-US" dirty="0" smtClean="0"/>
+              <a:t>available, including linear, </a:t>
+            </a:r>
+            <a:r>
+              <a:rPr lang="en-US" dirty="0" smtClean="0"/>
+              <a:t>lasso, </a:t>
+            </a:r>
+            <a:r>
+              <a:rPr lang="en-US" dirty="0" smtClean="0"/>
+              <a:t>and ridge regression.</a:t>
+            </a:r>
+            <a:endParaRPr lang="en-US" dirty="0" smtClean="0"/>
+          </a:p>
+          <a:p>
+            <a:r>
+              <a:rPr lang="en-US" dirty="0" smtClean="0"/>
+              <a:t>The linear regression techniques can be found under </a:t>
+            </a:r>
+            <a:r>
+              <a:rPr lang="en-US" dirty="0" err="1" smtClean="0"/>
+              <a:t>sklearn.linear_model</a:t>
+            </a:r>
+            <a:endParaRPr lang="en-US" dirty="0" smtClean="0"/>
+          </a:p>
+          <a:p>
+            <a:r>
+              <a:rPr lang="en-US" dirty="0" err="1" smtClean="0"/>
+              <a:t>Scikit</a:t>
+            </a:r>
+            <a:r>
+              <a:rPr lang="en-US" dirty="0" smtClean="0"/>
+              <a:t>-learn comes with some built in dataset which can be found under </a:t>
+            </a:r>
+            <a:r>
+              <a:rPr lang="en-US" dirty="0" err="1" smtClean="0"/>
+              <a:t>sklearn.datasets</a:t>
+            </a:r>
+            <a:endParaRPr lang="en-US" dirty="0"/>
+          </a:p>
+        </p:txBody>
+      </p:sp>
+    </p:spTree>
+    <p:extLst>
+      <p:ext uri="{BB962C8B-B14F-4D97-AF65-F5344CB8AC3E}">
+        <p14:creationId xmlns:p14="http://schemas.microsoft.com/office/powerpoint/2010/main" val="140126137"/>
+      </p:ext>
+    </p:extLst>
+  </p:cSld>
+  <p:clrMapOvr>
+    <a:masterClrMapping/>
+  </p:clrMapOvr>
+  <p:timing>
+    <p:tnLst>
+      <p:par>
+        <p:cTn xmlns:p14="http://schemas.microsoft.com/office/powerpoint/2010/main" id="1" dur="indefinite" restart="never" nodeType="tmRoot"/>
+      </p:par>
+    </p:tnLst>
+  </p:timing>
+</p:sld>
+</file>
+
 <file path=ppt/slides/slide18.xml><?xml version="1.0" encoding="utf-8"?>
 <p:sld xmlns:a="http://schemas.openxmlformats.org/drawingml/2006/main" xmlns:r="http://schemas.openxmlformats.org/officeDocument/2006/relationships" xmlns:p="http://schemas.openxmlformats.org/presentationml/2006/main">
   <p:cSld>
@@ -9248,12 +9350,8 @@
           <a:lstStyle/>
           <a:p>
             <a:r>
-              <a:rPr lang="en-US" dirty="0" err="1" smtClean="0"/>
-              <a:t>Scikit</a:t>
-            </a:r>
-            <a:r>
-              <a:rPr lang="en-US" dirty="0" smtClean="0"/>
-              <a:t>-Learn and Regression</a:t>
+              <a:rPr lang="en-US" dirty="0" smtClean="0"/>
+              <a:t>Regression and Decision Trees</a:t>
             </a:r>
             <a:endParaRPr lang="en-US" dirty="0"/>
           </a:p>
@@ -9271,109 +9369,64 @@
         </p:nvSpPr>
         <p:spPr>
           <a:xfrm>
-            <a:off x="1484310" y="2080805"/>
-            <a:ext cx="10018713" cy="3822902"/>
+            <a:off x="1484310" y="2150590"/>
+            <a:ext cx="10018713" cy="3124201"/>
           </a:xfrm>
         </p:spPr>
         <p:txBody>
-          <a:bodyPr>
-            <a:noAutofit/>
-          </a:bodyPr>
+          <a:bodyPr/>
           <a:lstStyle/>
           <a:p>
             <a:r>
-              <a:rPr lang="en-US" dirty="0" err="1"/>
-              <a:t>S</a:t>
-            </a:r>
-            <a:r>
-              <a:rPr lang="en-US" dirty="0" err="1" smtClean="0"/>
-              <a:t>cikit</a:t>
-            </a:r>
-            <a:r>
-              <a:rPr lang="en-US" dirty="0" smtClean="0"/>
-              <a:t>-learn makes linear regression very simple.</a:t>
-            </a:r>
-          </a:p>
-          <a:p>
-            <a:r>
-              <a:rPr lang="en-US" dirty="0" smtClean="0"/>
-              <a:t>Import the </a:t>
-            </a:r>
-            <a:r>
-              <a:rPr lang="en-US" dirty="0" err="1" smtClean="0"/>
-              <a:t>linear_model</a:t>
-            </a:r>
-            <a:r>
-              <a:rPr lang="en-US" dirty="0" smtClean="0"/>
-              <a:t> module from </a:t>
-            </a:r>
-            <a:r>
-              <a:rPr lang="en-US" dirty="0" err="1" smtClean="0"/>
-              <a:t>sklearn</a:t>
-            </a:r>
-            <a:r>
-              <a:rPr lang="en-US" dirty="0" smtClean="0"/>
-              <a:t>, choose which linear model to use, fit the data to it, </a:t>
-            </a:r>
-            <a:r>
-              <a:rPr lang="en-US" dirty="0" err="1" smtClean="0"/>
-              <a:t>analyse</a:t>
-            </a:r>
-            <a:r>
-              <a:rPr lang="en-US" dirty="0" smtClean="0"/>
-              <a:t> and test the results.</a:t>
-            </a:r>
-          </a:p>
-          <a:p>
-            <a:r>
-              <a:rPr lang="en-US" dirty="0" smtClean="0"/>
-              <a:t>In </a:t>
-            </a:r>
-            <a:r>
-              <a:rPr lang="en-US" dirty="0" err="1" smtClean="0"/>
-              <a:t>scikit</a:t>
-            </a:r>
-            <a:r>
-              <a:rPr lang="en-US" dirty="0" smtClean="0"/>
-              <a:t>-learn there are a number of regression techniques </a:t>
-            </a:r>
-            <a:r>
-              <a:rPr lang="en-US" dirty="0" smtClean="0"/>
-              <a:t>available, including linear, </a:t>
-            </a:r>
-            <a:r>
-              <a:rPr lang="en-US" dirty="0" smtClean="0"/>
-              <a:t>lasso, </a:t>
-            </a:r>
-            <a:r>
-              <a:rPr lang="en-US" dirty="0" smtClean="0"/>
-              <a:t>and ridge regression.</a:t>
+              <a:rPr lang="en-US" dirty="0" smtClean="0"/>
+              <a:t>When the target in a dataset is discrete the problem is one of classification.</a:t>
+            </a:r>
+          </a:p>
+          <a:p>
+            <a:r>
+              <a:rPr lang="en-US" dirty="0" smtClean="0"/>
+              <a:t>When the target in a dataset is continuous then the problem is one of prediction.</a:t>
+            </a:r>
+          </a:p>
+          <a:p>
+            <a:r>
+              <a:rPr lang="en-US" dirty="0" smtClean="0"/>
+              <a:t>It </a:t>
+            </a:r>
+            <a:r>
+              <a:rPr lang="en-US" dirty="0" smtClean="0"/>
+              <a:t>was seen how decision trees were used to classify the type of </a:t>
+            </a:r>
+            <a:r>
+              <a:rPr lang="en-US" dirty="0" smtClean="0"/>
+              <a:t>iris species.</a:t>
             </a:r>
             <a:endParaRPr lang="en-US" dirty="0" smtClean="0"/>
           </a:p>
           <a:p>
             <a:r>
               <a:rPr lang="en-US" dirty="0" smtClean="0"/>
-              <a:t>The linear regression techniques can be found under </a:t>
-            </a:r>
-            <a:r>
-              <a:rPr lang="en-US" dirty="0" err="1" smtClean="0"/>
-              <a:t>sklearn.linear_model</a:t>
-            </a:r>
-            <a:endParaRPr lang="en-US" dirty="0" smtClean="0"/>
-          </a:p>
-          <a:p>
-            <a:r>
-              <a:rPr lang="en-US" dirty="0" err="1" smtClean="0"/>
-              <a:t>Scikit</a:t>
-            </a:r>
-            <a:r>
-              <a:rPr lang="en-US" dirty="0" smtClean="0"/>
-              <a:t>-learn comes with some built in dataset which can be found under </a:t>
-            </a:r>
-            <a:r>
-              <a:rPr lang="en-US" dirty="0" err="1" smtClean="0"/>
-              <a:t>sklearn.datasets</a:t>
+              <a:t>Decision trees </a:t>
+            </a:r>
+            <a:r>
+              <a:rPr lang="en-US" dirty="0" smtClean="0"/>
+              <a:t>can be </a:t>
+            </a:r>
+            <a:r>
+              <a:rPr lang="en-US" dirty="0" smtClean="0"/>
+              <a:t>used continuous targets </a:t>
+            </a:r>
+            <a:r>
+              <a:rPr lang="en-US" dirty="0" smtClean="0"/>
+              <a:t>to predict </a:t>
+            </a:r>
+            <a:r>
+              <a:rPr lang="en-US" dirty="0" smtClean="0"/>
+              <a:t>values </a:t>
+            </a:r>
+            <a:r>
+              <a:rPr lang="en-US" dirty="0" smtClean="0"/>
+              <a:t>and the importance of each feature.</a:t>
             </a:r>
             <a:endParaRPr lang="en-US" dirty="0"/>
           </a:p>
@@ -9382,7 +9435,7 @@
     </p:spTree>
     <p:extLst>
       <p:ext uri="{BB962C8B-B14F-4D97-AF65-F5344CB8AC3E}">
-        <p14:creationId xmlns:p14="http://schemas.microsoft.com/office/powerpoint/2010/main" val="140126137"/>
+        <p14:creationId xmlns:p14="http://schemas.microsoft.com/office/powerpoint/2010/main" val="666172280"/>
       </p:ext>
     </p:extLst>
   </p:cSld>
@@ -9433,7 +9486,11 @@
           <a:p>
             <a:r>
               <a:rPr lang="en-US" dirty="0" smtClean="0"/>
-              <a:t>Regression and Decision Trees</a:t>
+              <a:t>Extra Tree </a:t>
+            </a:r>
+            <a:r>
+              <a:rPr lang="en-US" dirty="0" err="1" smtClean="0"/>
+              <a:t>Regressor</a:t>
             </a:r>
             <a:endParaRPr lang="en-US" dirty="0"/>
           </a:p>
@@ -9451,64 +9508,430 @@
         </p:nvSpPr>
         <p:spPr>
           <a:xfrm>
-            <a:off x="1484310" y="2150590"/>
-            <a:ext cx="10018713" cy="3124201"/>
+            <a:off x="1484310" y="3744323"/>
+            <a:ext cx="4837597" cy="2470344"/>
           </a:xfrm>
         </p:spPr>
         <p:txBody>
-          <a:bodyPr/>
+          <a:bodyPr>
+            <a:normAutofit/>
+          </a:bodyPr>
           <a:lstStyle/>
           <a:p>
             <a:r>
               <a:rPr lang="en-US" dirty="0" smtClean="0"/>
-              <a:t>When the target in a dataset is discrete the problem is one of classification.</a:t>
-            </a:r>
-          </a:p>
-          <a:p>
-            <a:r>
-              <a:rPr lang="en-US" dirty="0" smtClean="0"/>
-              <a:t>When the target in a dataset is continuous then the problem is one of prediction.</a:t>
-            </a:r>
-          </a:p>
-          <a:p>
-            <a:r>
-              <a:rPr lang="en-US" dirty="0" smtClean="0"/>
-              <a:t>It </a:t>
-            </a:r>
-            <a:r>
-              <a:rPr lang="en-US" dirty="0" smtClean="0"/>
-              <a:t>was seen how decision trees were used to classify the type of </a:t>
-            </a:r>
-            <a:r>
-              <a:rPr lang="en-US" dirty="0" smtClean="0"/>
-              <a:t>iris species.</a:t>
-            </a:r>
-            <a:endParaRPr lang="en-US" dirty="0" smtClean="0"/>
-          </a:p>
-          <a:p>
-            <a:r>
-              <a:rPr lang="en-US" dirty="0" smtClean="0"/>
-              <a:t>Decision trees </a:t>
-            </a:r>
-            <a:r>
-              <a:rPr lang="en-US" dirty="0" smtClean="0"/>
-              <a:t>can be </a:t>
-            </a:r>
-            <a:r>
-              <a:rPr lang="en-US" dirty="0" smtClean="0"/>
-              <a:t>used continuous targets </a:t>
-            </a:r>
-            <a:r>
-              <a:rPr lang="en-US" dirty="0" smtClean="0"/>
-              <a:t>to predict </a:t>
-            </a:r>
-            <a:r>
-              <a:rPr lang="en-US" dirty="0" smtClean="0"/>
-              <a:t>values </a:t>
-            </a:r>
-            <a:r>
-              <a:rPr lang="en-US" dirty="0" smtClean="0"/>
-              <a:t>and the importance of each feature.</a:t>
+              <a:t>When an optimal selection of features is chosen the Extra Tree performs as well as the Random Forest, though in general is computationally faster.</a:t>
+            </a:r>
+            <a:endParaRPr lang="en-US" dirty="0"/>
+          </a:p>
+        </p:txBody>
+      </p:sp>
+      <p:sp>
+        <p:nvSpPr>
+          <p:cNvPr id="4" name="Rectangle 3"/>
+          <p:cNvSpPr/>
+          <p:nvPr/>
+        </p:nvSpPr>
+        <p:spPr>
+          <a:xfrm>
+            <a:off x="5957817" y="6178482"/>
+            <a:ext cx="5544089" cy="276999"/>
+          </a:xfrm>
+          <a:prstGeom prst="rect">
+            <a:avLst/>
+          </a:prstGeom>
+        </p:spPr>
+        <p:txBody>
+          <a:bodyPr wrap="square">
+            <a:spAutoFit/>
+          </a:bodyPr>
+          <a:lstStyle/>
+          <a:p>
+            <a:pPr algn="ctr"/>
+            <a:r>
+              <a:rPr lang="en-US" sz="1200" dirty="0" smtClean="0"/>
+              <a:t>https</a:t>
+            </a:r>
+            <a:r>
+              <a:rPr lang="en-US" sz="1200" dirty="0"/>
+              <a:t>://</a:t>
+            </a:r>
+            <a:r>
+              <a:rPr lang="en-US" sz="1200" dirty="0" err="1" smtClean="0"/>
+              <a:t>wwrchgate.net</a:t>
+            </a:r>
+            <a:r>
+              <a:rPr lang="en-US" sz="1200" dirty="0"/>
+              <a:t>/301243118_fig4_Figure-6-Random-Forest-</a:t>
+            </a:r>
+            <a:r>
+              <a:rPr lang="en-US" sz="1200" dirty="0" smtClean="0"/>
+              <a:t>Model</a:t>
+            </a:r>
+            <a:r>
+              <a:rPr lang="en-US" sz="1200" dirty="0"/>
+              <a:t>w.resea</a:t>
+            </a:r>
+          </a:p>
+        </p:txBody>
+      </p:sp>
+      <p:pic>
+        <p:nvPicPr>
+          <p:cNvPr id="6" name="Picture 5" descr="RandomForest.png"/>
+          <p:cNvPicPr>
+            <a:picLocks noChangeAspect="1"/>
+          </p:cNvPicPr>
+          <p:nvPr/>
+        </p:nvPicPr>
+        <p:blipFill>
+          <a:blip r:embed="rId2">
+            <a:extLst>
+              <a:ext uri="{28A0092B-C50C-407E-A947-70E740481C1C}">
+                <a14:useLocalDpi xmlns:a14="http://schemas.microsoft.com/office/drawing/2010/main" val="0"/>
+              </a:ext>
+            </a:extLst>
+          </a:blip>
+          <a:stretch>
+            <a:fillRect/>
+          </a:stretch>
+        </p:blipFill>
+        <p:spPr>
+          <a:xfrm>
+            <a:off x="5957817" y="3716410"/>
+            <a:ext cx="5545208" cy="2462072"/>
+          </a:xfrm>
+          <a:prstGeom prst="rect">
+            <a:avLst/>
+          </a:prstGeom>
+        </p:spPr>
+      </p:pic>
+      <p:sp>
+        <p:nvSpPr>
+          <p:cNvPr id="10" name="Content Placeholder 2"/>
+          <p:cNvSpPr txBox="1">
+            <a:spLocks/>
+          </p:cNvSpPr>
+          <p:nvPr/>
+        </p:nvSpPr>
+        <p:spPr>
+          <a:xfrm>
+            <a:off x="1483193" y="1814373"/>
+            <a:ext cx="10018713" cy="2247045"/>
+          </a:xfrm>
+          <a:prstGeom prst="rect">
+            <a:avLst/>
+          </a:prstGeom>
+        </p:spPr>
+        <p:txBody>
+          <a:bodyPr vert="horz" lIns="91440" tIns="45720" rIns="91440" bIns="45720" rtlCol="0" anchor="ctr">
+            <a:noAutofit/>
+          </a:bodyPr>
+          <a:lstStyle>
+            <a:lvl1pPr marL="285750" indent="-285750" algn="l" defTabSz="457200" rtl="0" eaLnBrk="1" latinLnBrk="0" hangingPunct="1">
+              <a:spcBef>
+                <a:spcPct val="20000"/>
+              </a:spcBef>
+              <a:spcAft>
+                <a:spcPts val="600"/>
+              </a:spcAft>
+              <a:buClr>
+                <a:schemeClr val="accent1">
+                  <a:lumMod val="75000"/>
+                </a:schemeClr>
+              </a:buClr>
+              <a:buSzPct val="145000"/>
+              <a:buFont typeface="Arial"/>
+              <a:buChar char="•"/>
+              <a:defRPr sz="2400" kern="1200" cap="none">
+                <a:solidFill>
+                  <a:schemeClr val="tx1"/>
+                </a:solidFill>
+                <a:effectLst/>
+                <a:latin typeface="+mn-lt"/>
+                <a:ea typeface="+mn-ea"/>
+                <a:cs typeface="+mn-cs"/>
+              </a:defRPr>
+            </a:lvl1pPr>
+            <a:lvl2pPr marL="742950" indent="-285750" algn="l" defTabSz="457200" rtl="0" eaLnBrk="1" latinLnBrk="0" hangingPunct="1">
+              <a:spcBef>
+                <a:spcPct val="20000"/>
+              </a:spcBef>
+              <a:spcAft>
+                <a:spcPts val="600"/>
+              </a:spcAft>
+              <a:buClr>
+                <a:schemeClr val="accent1">
+                  <a:lumMod val="75000"/>
+                </a:schemeClr>
+              </a:buClr>
+              <a:buSzPct val="145000"/>
+              <a:buFont typeface="Arial"/>
+              <a:buChar char="•"/>
+              <a:defRPr sz="2000" kern="1200" cap="none">
+                <a:solidFill>
+                  <a:schemeClr val="tx1"/>
+                </a:solidFill>
+                <a:effectLst/>
+                <a:latin typeface="+mn-lt"/>
+                <a:ea typeface="+mn-ea"/>
+                <a:cs typeface="+mn-cs"/>
+              </a:defRPr>
+            </a:lvl2pPr>
+            <a:lvl3pPr marL="1200150" indent="-285750" algn="l" defTabSz="457200" rtl="0" eaLnBrk="1" latinLnBrk="0" hangingPunct="1">
+              <a:spcBef>
+                <a:spcPct val="20000"/>
+              </a:spcBef>
+              <a:spcAft>
+                <a:spcPts val="600"/>
+              </a:spcAft>
+              <a:buClr>
+                <a:schemeClr val="accent1">
+                  <a:lumMod val="75000"/>
+                </a:schemeClr>
+              </a:buClr>
+              <a:buSzPct val="145000"/>
+              <a:buFont typeface="Arial"/>
+              <a:buChar char="•"/>
+              <a:defRPr sz="1800" kern="1200" cap="none">
+                <a:solidFill>
+                  <a:schemeClr val="tx1"/>
+                </a:solidFill>
+                <a:effectLst/>
+                <a:latin typeface="+mn-lt"/>
+                <a:ea typeface="+mn-ea"/>
+                <a:cs typeface="+mn-cs"/>
+              </a:defRPr>
+            </a:lvl3pPr>
+            <a:lvl4pPr marL="1543050" indent="-171450" algn="l" defTabSz="457200" rtl="0" eaLnBrk="1" latinLnBrk="0" hangingPunct="1">
+              <a:spcBef>
+                <a:spcPct val="20000"/>
+              </a:spcBef>
+              <a:spcAft>
+                <a:spcPts val="600"/>
+              </a:spcAft>
+              <a:buClr>
+                <a:schemeClr val="accent1">
+                  <a:lumMod val="75000"/>
+                </a:schemeClr>
+              </a:buClr>
+              <a:buSzPct val="145000"/>
+              <a:buFont typeface="Arial"/>
+              <a:buChar char="•"/>
+              <a:defRPr sz="1600" kern="1200" cap="none">
+                <a:solidFill>
+                  <a:schemeClr val="tx1"/>
+                </a:solidFill>
+                <a:effectLst/>
+                <a:latin typeface="+mn-lt"/>
+                <a:ea typeface="+mn-ea"/>
+                <a:cs typeface="+mn-cs"/>
+              </a:defRPr>
+            </a:lvl4pPr>
+            <a:lvl5pPr marL="2000250" indent="-171450" algn="l" defTabSz="457200" rtl="0" eaLnBrk="1" latinLnBrk="0" hangingPunct="1">
+              <a:spcBef>
+                <a:spcPct val="20000"/>
+              </a:spcBef>
+              <a:spcAft>
+                <a:spcPts val="600"/>
+              </a:spcAft>
+              <a:buClr>
+                <a:schemeClr val="accent1">
+                  <a:lumMod val="75000"/>
+                </a:schemeClr>
+              </a:buClr>
+              <a:buSzPct val="145000"/>
+              <a:buFont typeface="Arial"/>
+              <a:buChar char="•"/>
+              <a:defRPr sz="1400" kern="1200" cap="none">
+                <a:solidFill>
+                  <a:schemeClr val="tx1"/>
+                </a:solidFill>
+                <a:effectLst/>
+                <a:latin typeface="+mn-lt"/>
+                <a:ea typeface="+mn-ea"/>
+                <a:cs typeface="+mn-cs"/>
+              </a:defRPr>
+            </a:lvl5pPr>
+            <a:lvl6pPr marL="2514600" indent="-228600" algn="l" defTabSz="457200" rtl="0" eaLnBrk="1" latinLnBrk="0" hangingPunct="1">
+              <a:spcBef>
+                <a:spcPct val="20000"/>
+              </a:spcBef>
+              <a:spcAft>
+                <a:spcPts val="600"/>
+              </a:spcAft>
+              <a:buClr>
+                <a:schemeClr val="accent1">
+                  <a:lumMod val="75000"/>
+                </a:schemeClr>
+              </a:buClr>
+              <a:buSzPct val="145000"/>
+              <a:buFont typeface="Arial"/>
+              <a:buChar char="•"/>
+              <a:defRPr sz="1400" kern="1200" cap="none">
+                <a:solidFill>
+                  <a:schemeClr val="tx1"/>
+                </a:solidFill>
+                <a:effectLst/>
+                <a:latin typeface="+mn-lt"/>
+                <a:ea typeface="+mn-ea"/>
+                <a:cs typeface="+mn-cs"/>
+              </a:defRPr>
+            </a:lvl6pPr>
+            <a:lvl7pPr marL="2971800" indent="-228600" algn="l" defTabSz="457200" rtl="0" eaLnBrk="1" latinLnBrk="0" hangingPunct="1">
+              <a:spcBef>
+                <a:spcPct val="20000"/>
+              </a:spcBef>
+              <a:spcAft>
+                <a:spcPts val="600"/>
+              </a:spcAft>
+              <a:buClr>
+                <a:schemeClr val="accent1">
+                  <a:lumMod val="75000"/>
+                </a:schemeClr>
+              </a:buClr>
+              <a:buSzPct val="145000"/>
+              <a:buFont typeface="Arial"/>
+              <a:buChar char="•"/>
+              <a:defRPr sz="1400" kern="1200" cap="none">
+                <a:solidFill>
+                  <a:schemeClr val="tx1"/>
+                </a:solidFill>
+                <a:effectLst/>
+                <a:latin typeface="+mn-lt"/>
+                <a:ea typeface="+mn-ea"/>
+                <a:cs typeface="+mn-cs"/>
+              </a:defRPr>
+            </a:lvl7pPr>
+            <a:lvl8pPr marL="3429000" indent="-228600" algn="l" defTabSz="457200" rtl="0" eaLnBrk="1" latinLnBrk="0" hangingPunct="1">
+              <a:spcBef>
+                <a:spcPct val="20000"/>
+              </a:spcBef>
+              <a:spcAft>
+                <a:spcPts val="600"/>
+              </a:spcAft>
+              <a:buClr>
+                <a:schemeClr val="accent1">
+                  <a:lumMod val="75000"/>
+                </a:schemeClr>
+              </a:buClr>
+              <a:buSzPct val="145000"/>
+              <a:buFont typeface="Arial"/>
+              <a:buChar char="•"/>
+              <a:defRPr sz="1400" kern="1200" cap="none">
+                <a:solidFill>
+                  <a:schemeClr val="tx1"/>
+                </a:solidFill>
+                <a:effectLst/>
+                <a:latin typeface="+mn-lt"/>
+                <a:ea typeface="+mn-ea"/>
+                <a:cs typeface="+mn-cs"/>
+              </a:defRPr>
+            </a:lvl8pPr>
+            <a:lvl9pPr marL="3886200" indent="-228600" algn="l" defTabSz="457200" rtl="0" eaLnBrk="1" latinLnBrk="0" hangingPunct="1">
+              <a:spcBef>
+                <a:spcPct val="20000"/>
+              </a:spcBef>
+              <a:spcAft>
+                <a:spcPts val="600"/>
+              </a:spcAft>
+              <a:buClr>
+                <a:schemeClr val="accent1">
+                  <a:lumMod val="75000"/>
+                </a:schemeClr>
+              </a:buClr>
+              <a:buSzPct val="145000"/>
+              <a:buFont typeface="Arial"/>
+              <a:buChar char="•"/>
+              <a:defRPr sz="1400" kern="1200" cap="none">
+                <a:solidFill>
+                  <a:schemeClr val="tx1"/>
+                </a:solidFill>
+                <a:effectLst/>
+                <a:latin typeface="+mn-lt"/>
+                <a:ea typeface="+mn-ea"/>
+                <a:cs typeface="+mn-cs"/>
+              </a:defRPr>
+            </a:lvl9pPr>
+          </a:lstStyle>
+          <a:p>
+            <a:r>
+              <a:rPr lang="en-US" dirty="0" smtClean="0"/>
+              <a:t>To help improve accuracy for decision trees with regression and extra tree </a:t>
+            </a:r>
+            <a:r>
+              <a:rPr lang="en-US" dirty="0" err="1" smtClean="0"/>
+              <a:t>regressor</a:t>
+            </a:r>
+            <a:r>
+              <a:rPr lang="en-US" dirty="0" smtClean="0"/>
+              <a:t> can be used.</a:t>
+            </a:r>
+          </a:p>
+          <a:p>
+            <a:pPr algn="just"/>
+            <a:r>
+              <a:rPr lang="en-US" dirty="0"/>
+              <a:t>An extra tree </a:t>
+            </a:r>
+            <a:r>
+              <a:rPr lang="en-US" dirty="0" err="1"/>
+              <a:t>regressor</a:t>
+            </a:r>
+            <a:r>
+              <a:rPr lang="en-US" dirty="0"/>
+              <a:t> </a:t>
+            </a:r>
+            <a:r>
+              <a:rPr lang="en-US" dirty="0" smtClean="0"/>
+              <a:t>fits </a:t>
+            </a:r>
+            <a:r>
+              <a:rPr lang="en-US" dirty="0"/>
+              <a:t>a number of </a:t>
+            </a:r>
+            <a:r>
+              <a:rPr lang="en-US" dirty="0" err="1"/>
+              <a:t>randomised</a:t>
+            </a:r>
+            <a:r>
+              <a:rPr lang="en-US" dirty="0"/>
+              <a:t> trees on </a:t>
+            </a:r>
+            <a:r>
+              <a:rPr lang="en-US" dirty="0" smtClean="0"/>
+              <a:t>different subsamples </a:t>
+            </a:r>
+            <a:r>
+              <a:rPr lang="en-US" dirty="0"/>
+              <a:t>of the dataset and </a:t>
+            </a:r>
+            <a:r>
+              <a:rPr lang="en-US" dirty="0" smtClean="0"/>
+              <a:t>averages them </a:t>
+            </a:r>
+            <a:r>
+              <a:rPr lang="en-US" dirty="0"/>
+              <a:t>to improve the </a:t>
+            </a:r>
+            <a:r>
+              <a:rPr lang="en-US" dirty="0" smtClean="0"/>
+              <a:t>accuracy </a:t>
+            </a:r>
+            <a:r>
+              <a:rPr lang="en-US" dirty="0"/>
+              <a:t>and </a:t>
+            </a:r>
+            <a:r>
+              <a:rPr lang="en-US" dirty="0" smtClean="0"/>
+              <a:t>to control </a:t>
+            </a:r>
+            <a:r>
+              <a:rPr lang="en-US" dirty="0" err="1" smtClean="0"/>
+              <a:t>overfitting</a:t>
+            </a:r>
+            <a:r>
+              <a:rPr lang="en-US" dirty="0" smtClean="0"/>
+              <a:t>.</a:t>
             </a:r>
             <a:endParaRPr lang="en-US" dirty="0"/>
           </a:p>
@@ -9517,7 +9940,7 @@
     </p:spTree>
     <p:extLst>
       <p:ext uri="{BB962C8B-B14F-4D97-AF65-F5344CB8AC3E}">
-        <p14:creationId xmlns:p14="http://schemas.microsoft.com/office/powerpoint/2010/main" val="666172280"/>
+        <p14:creationId xmlns:p14="http://schemas.microsoft.com/office/powerpoint/2010/main" val="833188867"/>
       </p:ext>
     </p:extLst>
   </p:cSld>
@@ -9698,11 +10121,7 @@
           <a:p>
             <a:r>
               <a:rPr lang="en-US" dirty="0" smtClean="0"/>
-              <a:t>Extra Tree </a:t>
-            </a:r>
-            <a:r>
-              <a:rPr lang="en-US" dirty="0" err="1" smtClean="0"/>
-              <a:t>Regressor</a:t>
+              <a:t>Feature Importance and Metrics</a:t>
             </a:r>
             <a:endParaRPr lang="en-US" dirty="0"/>
           </a:p>
@@ -9718,432 +10137,56 @@
             <p:ph idx="1"/>
           </p:nvPr>
         </p:nvSpPr>
-        <p:spPr>
-          <a:xfrm>
-            <a:off x="1484310" y="3744323"/>
-            <a:ext cx="4837597" cy="2470344"/>
-          </a:xfrm>
-        </p:spPr>
+        <p:spPr/>
         <p:txBody>
           <a:bodyPr>
-            <a:normAutofit/>
+            <a:normAutofit lnSpcReduction="10000"/>
           </a:bodyPr>
           <a:lstStyle/>
           <a:p>
             <a:r>
               <a:rPr lang="en-US" dirty="0" smtClean="0"/>
-              <a:t>When an optimal selection of features is chosen the Extra Tree performs as well as the Random Forest, though in general is computationally faster.</a:t>
-            </a:r>
-            <a:endParaRPr lang="en-US" dirty="0"/>
-          </a:p>
-        </p:txBody>
-      </p:sp>
-      <p:sp>
-        <p:nvSpPr>
-          <p:cNvPr id="4" name="Rectangle 3"/>
-          <p:cNvSpPr/>
-          <p:nvPr/>
-        </p:nvSpPr>
-        <p:spPr>
-          <a:xfrm>
-            <a:off x="5957817" y="6178482"/>
-            <a:ext cx="5544089" cy="276999"/>
-          </a:xfrm>
-          <a:prstGeom prst="rect">
-            <a:avLst/>
-          </a:prstGeom>
-        </p:spPr>
-        <p:txBody>
-          <a:bodyPr wrap="square">
-            <a:spAutoFit/>
-          </a:bodyPr>
-          <a:lstStyle/>
-          <a:p>
-            <a:pPr algn="ctr"/>
-            <a:r>
-              <a:rPr lang="en-US" sz="1200" dirty="0" smtClean="0"/>
-              <a:t>https</a:t>
-            </a:r>
-            <a:r>
-              <a:rPr lang="en-US" sz="1200" dirty="0"/>
-              <a:t>://</a:t>
-            </a:r>
-            <a:r>
-              <a:rPr lang="en-US" sz="1200" dirty="0" err="1" smtClean="0"/>
-              <a:t>wwrchgate.net</a:t>
-            </a:r>
-            <a:r>
-              <a:rPr lang="en-US" sz="1200" dirty="0"/>
-              <a:t>/301243118_fig4_Figure-6-Random-Forest-</a:t>
-            </a:r>
-            <a:r>
-              <a:rPr lang="en-US" sz="1200" dirty="0" smtClean="0"/>
-              <a:t>Model</a:t>
-            </a:r>
-            <a:r>
-              <a:rPr lang="en-US" sz="1200" dirty="0"/>
-              <a:t>w.resea</a:t>
-            </a:r>
-          </a:p>
-        </p:txBody>
-      </p:sp>
-      <p:pic>
-        <p:nvPicPr>
-          <p:cNvPr id="6" name="Picture 5" descr="RandomForest.png"/>
-          <p:cNvPicPr>
-            <a:picLocks noChangeAspect="1"/>
-          </p:cNvPicPr>
-          <p:nvPr/>
-        </p:nvPicPr>
-        <p:blipFill>
-          <a:blip r:embed="rId2">
-            <a:extLst>
-              <a:ext uri="{28A0092B-C50C-407E-A947-70E740481C1C}">
-                <a14:useLocalDpi xmlns:a14="http://schemas.microsoft.com/office/drawing/2010/main" val="0"/>
-              </a:ext>
-            </a:extLst>
-          </a:blip>
-          <a:stretch>
-            <a:fillRect/>
-          </a:stretch>
-        </p:blipFill>
-        <p:spPr>
-          <a:xfrm>
-            <a:off x="5957817" y="3716410"/>
-            <a:ext cx="5545208" cy="2462072"/>
-          </a:xfrm>
-          <a:prstGeom prst="rect">
-            <a:avLst/>
-          </a:prstGeom>
-        </p:spPr>
-      </p:pic>
-      <p:sp>
-        <p:nvSpPr>
-          <p:cNvPr id="10" name="Content Placeholder 2"/>
-          <p:cNvSpPr txBox="1">
-            <a:spLocks/>
-          </p:cNvSpPr>
-          <p:nvPr/>
-        </p:nvSpPr>
-        <p:spPr>
-          <a:xfrm>
-            <a:off x="1483193" y="1814373"/>
-            <a:ext cx="10018713" cy="2247045"/>
-          </a:xfrm>
-          <a:prstGeom prst="rect">
-            <a:avLst/>
-          </a:prstGeom>
-        </p:spPr>
-        <p:txBody>
-          <a:bodyPr vert="horz" lIns="91440" tIns="45720" rIns="91440" bIns="45720" rtlCol="0" anchor="ctr">
-            <a:noAutofit/>
-          </a:bodyPr>
-          <a:lstStyle>
-            <a:lvl1pPr marL="285750" indent="-285750" algn="l" defTabSz="457200" rtl="0" eaLnBrk="1" latinLnBrk="0" hangingPunct="1">
-              <a:spcBef>
-                <a:spcPct val="20000"/>
-              </a:spcBef>
-              <a:spcAft>
-                <a:spcPts val="600"/>
-              </a:spcAft>
-              <a:buClr>
-                <a:schemeClr val="accent1">
-                  <a:lumMod val="75000"/>
-                </a:schemeClr>
-              </a:buClr>
-              <a:buSzPct val="145000"/>
-              <a:buFont typeface="Arial"/>
-              <a:buChar char="•"/>
-              <a:defRPr sz="2400" kern="1200" cap="none">
-                <a:solidFill>
-                  <a:schemeClr val="tx1"/>
-                </a:solidFill>
-                <a:effectLst/>
-                <a:latin typeface="+mn-lt"/>
-                <a:ea typeface="+mn-ea"/>
-                <a:cs typeface="+mn-cs"/>
-              </a:defRPr>
-            </a:lvl1pPr>
-            <a:lvl2pPr marL="742950" indent="-285750" algn="l" defTabSz="457200" rtl="0" eaLnBrk="1" latinLnBrk="0" hangingPunct="1">
-              <a:spcBef>
-                <a:spcPct val="20000"/>
-              </a:spcBef>
-              <a:spcAft>
-                <a:spcPts val="600"/>
-              </a:spcAft>
-              <a:buClr>
-                <a:schemeClr val="accent1">
-                  <a:lumMod val="75000"/>
-                </a:schemeClr>
-              </a:buClr>
-              <a:buSzPct val="145000"/>
-              <a:buFont typeface="Arial"/>
-              <a:buChar char="•"/>
-              <a:defRPr sz="2000" kern="1200" cap="none">
-                <a:solidFill>
-                  <a:schemeClr val="tx1"/>
-                </a:solidFill>
-                <a:effectLst/>
-                <a:latin typeface="+mn-lt"/>
-                <a:ea typeface="+mn-ea"/>
-                <a:cs typeface="+mn-cs"/>
-              </a:defRPr>
-            </a:lvl2pPr>
-            <a:lvl3pPr marL="1200150" indent="-285750" algn="l" defTabSz="457200" rtl="0" eaLnBrk="1" latinLnBrk="0" hangingPunct="1">
-              <a:spcBef>
-                <a:spcPct val="20000"/>
-              </a:spcBef>
-              <a:spcAft>
-                <a:spcPts val="600"/>
-              </a:spcAft>
-              <a:buClr>
-                <a:schemeClr val="accent1">
-                  <a:lumMod val="75000"/>
-                </a:schemeClr>
-              </a:buClr>
-              <a:buSzPct val="145000"/>
-              <a:buFont typeface="Arial"/>
-              <a:buChar char="•"/>
-              <a:defRPr sz="1800" kern="1200" cap="none">
-                <a:solidFill>
-                  <a:schemeClr val="tx1"/>
-                </a:solidFill>
-                <a:effectLst/>
-                <a:latin typeface="+mn-lt"/>
-                <a:ea typeface="+mn-ea"/>
-                <a:cs typeface="+mn-cs"/>
-              </a:defRPr>
-            </a:lvl3pPr>
-            <a:lvl4pPr marL="1543050" indent="-171450" algn="l" defTabSz="457200" rtl="0" eaLnBrk="1" latinLnBrk="0" hangingPunct="1">
-              <a:spcBef>
-                <a:spcPct val="20000"/>
-              </a:spcBef>
-              <a:spcAft>
-                <a:spcPts val="600"/>
-              </a:spcAft>
-              <a:buClr>
-                <a:schemeClr val="accent1">
-                  <a:lumMod val="75000"/>
-                </a:schemeClr>
-              </a:buClr>
-              <a:buSzPct val="145000"/>
-              <a:buFont typeface="Arial"/>
-              <a:buChar char="•"/>
-              <a:defRPr sz="1600" kern="1200" cap="none">
-                <a:solidFill>
-                  <a:schemeClr val="tx1"/>
-                </a:solidFill>
-                <a:effectLst/>
-                <a:latin typeface="+mn-lt"/>
-                <a:ea typeface="+mn-ea"/>
-                <a:cs typeface="+mn-cs"/>
-              </a:defRPr>
-            </a:lvl4pPr>
-            <a:lvl5pPr marL="2000250" indent="-171450" algn="l" defTabSz="457200" rtl="0" eaLnBrk="1" latinLnBrk="0" hangingPunct="1">
-              <a:spcBef>
-                <a:spcPct val="20000"/>
-              </a:spcBef>
-              <a:spcAft>
-                <a:spcPts val="600"/>
-              </a:spcAft>
-              <a:buClr>
-                <a:schemeClr val="accent1">
-                  <a:lumMod val="75000"/>
-                </a:schemeClr>
-              </a:buClr>
-              <a:buSzPct val="145000"/>
-              <a:buFont typeface="Arial"/>
-              <a:buChar char="•"/>
-              <a:defRPr sz="1400" kern="1200" cap="none">
-                <a:solidFill>
-                  <a:schemeClr val="tx1"/>
-                </a:solidFill>
-                <a:effectLst/>
-                <a:latin typeface="+mn-lt"/>
-                <a:ea typeface="+mn-ea"/>
-                <a:cs typeface="+mn-cs"/>
-              </a:defRPr>
-            </a:lvl5pPr>
-            <a:lvl6pPr marL="2514600" indent="-228600" algn="l" defTabSz="457200" rtl="0" eaLnBrk="1" latinLnBrk="0" hangingPunct="1">
-              <a:spcBef>
-                <a:spcPct val="20000"/>
-              </a:spcBef>
-              <a:spcAft>
-                <a:spcPts val="600"/>
-              </a:spcAft>
-              <a:buClr>
-                <a:schemeClr val="accent1">
-                  <a:lumMod val="75000"/>
-                </a:schemeClr>
-              </a:buClr>
-              <a:buSzPct val="145000"/>
-              <a:buFont typeface="Arial"/>
-              <a:buChar char="•"/>
-              <a:defRPr sz="1400" kern="1200" cap="none">
-                <a:solidFill>
-                  <a:schemeClr val="tx1"/>
-                </a:solidFill>
-                <a:effectLst/>
-                <a:latin typeface="+mn-lt"/>
-                <a:ea typeface="+mn-ea"/>
-                <a:cs typeface="+mn-cs"/>
-              </a:defRPr>
-            </a:lvl6pPr>
-            <a:lvl7pPr marL="2971800" indent="-228600" algn="l" defTabSz="457200" rtl="0" eaLnBrk="1" latinLnBrk="0" hangingPunct="1">
-              <a:spcBef>
-                <a:spcPct val="20000"/>
-              </a:spcBef>
-              <a:spcAft>
-                <a:spcPts val="600"/>
-              </a:spcAft>
-              <a:buClr>
-                <a:schemeClr val="accent1">
-                  <a:lumMod val="75000"/>
-                </a:schemeClr>
-              </a:buClr>
-              <a:buSzPct val="145000"/>
-              <a:buFont typeface="Arial"/>
-              <a:buChar char="•"/>
-              <a:defRPr sz="1400" kern="1200" cap="none">
-                <a:solidFill>
-                  <a:schemeClr val="tx1"/>
-                </a:solidFill>
-                <a:effectLst/>
-                <a:latin typeface="+mn-lt"/>
-                <a:ea typeface="+mn-ea"/>
-                <a:cs typeface="+mn-cs"/>
-              </a:defRPr>
-            </a:lvl7pPr>
-            <a:lvl8pPr marL="3429000" indent="-228600" algn="l" defTabSz="457200" rtl="0" eaLnBrk="1" latinLnBrk="0" hangingPunct="1">
-              <a:spcBef>
-                <a:spcPct val="20000"/>
-              </a:spcBef>
-              <a:spcAft>
-                <a:spcPts val="600"/>
-              </a:spcAft>
-              <a:buClr>
-                <a:schemeClr val="accent1">
-                  <a:lumMod val="75000"/>
-                </a:schemeClr>
-              </a:buClr>
-              <a:buSzPct val="145000"/>
-              <a:buFont typeface="Arial"/>
-              <a:buChar char="•"/>
-              <a:defRPr sz="1400" kern="1200" cap="none">
-                <a:solidFill>
-                  <a:schemeClr val="tx1"/>
-                </a:solidFill>
-                <a:effectLst/>
-                <a:latin typeface="+mn-lt"/>
-                <a:ea typeface="+mn-ea"/>
-                <a:cs typeface="+mn-cs"/>
-              </a:defRPr>
-            </a:lvl8pPr>
-            <a:lvl9pPr marL="3886200" indent="-228600" algn="l" defTabSz="457200" rtl="0" eaLnBrk="1" latinLnBrk="0" hangingPunct="1">
-              <a:spcBef>
-                <a:spcPct val="20000"/>
-              </a:spcBef>
-              <a:spcAft>
-                <a:spcPts val="600"/>
-              </a:spcAft>
-              <a:buClr>
-                <a:schemeClr val="accent1">
-                  <a:lumMod val="75000"/>
-                </a:schemeClr>
-              </a:buClr>
-              <a:buSzPct val="145000"/>
-              <a:buFont typeface="Arial"/>
-              <a:buChar char="•"/>
-              <a:defRPr sz="1400" kern="1200" cap="none">
-                <a:solidFill>
-                  <a:schemeClr val="tx1"/>
-                </a:solidFill>
-                <a:effectLst/>
-                <a:latin typeface="+mn-lt"/>
-                <a:ea typeface="+mn-ea"/>
-                <a:cs typeface="+mn-cs"/>
-              </a:defRPr>
-            </a:lvl9pPr>
-          </a:lstStyle>
-          <a:p>
-            <a:r>
-              <a:rPr lang="en-US" dirty="0" smtClean="0"/>
-              <a:t>To help improve accuracy for decision trees with regression and extra tree </a:t>
+              <a:t>Extra Trees are hard to </a:t>
             </a:r>
             <a:r>
               <a:rPr lang="en-US" dirty="0" err="1" smtClean="0"/>
-              <a:t>regressor</a:t>
-            </a:r>
-            <a:r>
-              <a:rPr lang="en-US" dirty="0" smtClean="0"/>
-              <a:t> can be used.</a:t>
-            </a:r>
-          </a:p>
-          <a:p>
-            <a:pPr algn="just"/>
-            <a:r>
-              <a:rPr lang="en-US" dirty="0"/>
-              <a:t>An extra tree </a:t>
-            </a:r>
-            <a:r>
-              <a:rPr lang="en-US" dirty="0" err="1"/>
-              <a:t>regressor</a:t>
-            </a:r>
-            <a:r>
-              <a:rPr lang="en-US" dirty="0"/>
-              <a:t> </a:t>
-            </a:r>
-            <a:r>
-              <a:rPr lang="en-US" dirty="0" smtClean="0"/>
-              <a:t>fits </a:t>
-            </a:r>
-            <a:r>
-              <a:rPr lang="en-US" dirty="0"/>
-              <a:t>a number of </a:t>
-            </a:r>
-            <a:r>
-              <a:rPr lang="en-US" dirty="0" err="1"/>
-              <a:t>randomised</a:t>
-            </a:r>
-            <a:r>
-              <a:rPr lang="en-US" dirty="0"/>
-              <a:t> trees on </a:t>
-            </a:r>
-            <a:r>
-              <a:rPr lang="en-US" dirty="0" smtClean="0"/>
-              <a:t>different subsamples </a:t>
-            </a:r>
-            <a:r>
-              <a:rPr lang="en-US" dirty="0"/>
-              <a:t>of the dataset and </a:t>
-            </a:r>
-            <a:r>
-              <a:rPr lang="en-US" dirty="0" smtClean="0"/>
-              <a:t>averages them </a:t>
-            </a:r>
-            <a:r>
-              <a:rPr lang="en-US" dirty="0"/>
-              <a:t>to improve the </a:t>
-            </a:r>
-            <a:r>
-              <a:rPr lang="en-US" dirty="0" smtClean="0"/>
-              <a:t>accuracy </a:t>
-            </a:r>
-            <a:r>
-              <a:rPr lang="en-US" dirty="0"/>
-              <a:t>and </a:t>
-            </a:r>
-            <a:r>
-              <a:rPr lang="en-US" dirty="0" smtClean="0"/>
-              <a:t>to control </a:t>
+              <a:t>visualise</a:t>
+            </a:r>
+            <a:r>
+              <a:rPr lang="en-US" dirty="0" smtClean="0"/>
+              <a:t> as there’s typically a large number of trees.</a:t>
+            </a:r>
+          </a:p>
+          <a:p>
+            <a:r>
+              <a:rPr lang="en-US" dirty="0" smtClean="0"/>
+              <a:t>Instead, useful information such as feature importance can be extracted.</a:t>
+            </a:r>
+          </a:p>
+          <a:p>
+            <a:r>
+              <a:rPr lang="en-US" dirty="0" smtClean="0"/>
+              <a:t>Feature importance gives a score to each feature that is a measure of how much they affect the target.</a:t>
+            </a:r>
+          </a:p>
+          <a:p>
+            <a:r>
+              <a:rPr lang="en-US" dirty="0" smtClean="0"/>
+              <a:t>To gauge the accuracy metrics such as the R-squared value can be used.</a:t>
+            </a:r>
+          </a:p>
+          <a:p>
+            <a:r>
+              <a:rPr lang="en-US" dirty="0" smtClean="0"/>
+              <a:t>Feature importance and the R-squared values are easy to extract in </a:t>
             </a:r>
             <a:r>
               <a:rPr lang="en-US" dirty="0" err="1" smtClean="0"/>
-              <a:t>overfitting</a:t>
-            </a:r>
-            <a:r>
-              <a:rPr lang="en-US" dirty="0" smtClean="0"/>
-              <a:t>.</a:t>
+              <a:t>scikit</a:t>
+            </a:r>
+            <a:r>
+              <a:rPr lang="en-US" dirty="0" smtClean="0"/>
+              <a:t>-learn.</a:t>
             </a:r>
             <a:endParaRPr lang="en-US" dirty="0"/>
           </a:p>
@@ -10152,7 +10195,7 @@
     </p:spTree>
     <p:extLst>
       <p:ext uri="{BB962C8B-B14F-4D97-AF65-F5344CB8AC3E}">
-        <p14:creationId xmlns:p14="http://schemas.microsoft.com/office/powerpoint/2010/main" val="833188867"/>
+        <p14:creationId xmlns:p14="http://schemas.microsoft.com/office/powerpoint/2010/main" val="262052534"/>
       </p:ext>
     </p:extLst>
   </p:cSld>
@@ -10203,7 +10246,11 @@
           <a:p>
             <a:r>
               <a:rPr lang="en-US" dirty="0" smtClean="0"/>
-              <a:t>Feature Importance and Metrics</a:t>
+              <a:t>Regression </a:t>
+            </a:r>
+            <a:r>
+              <a:rPr lang="en-US" dirty="0" smtClean="0"/>
+              <a:t>Practical</a:t>
             </a:r>
             <a:endParaRPr lang="en-US" dirty="0"/>
           </a:p>
@@ -10219,48 +10266,90 @@
             <p:ph idx="1"/>
           </p:nvPr>
         </p:nvSpPr>
-        <p:spPr/>
-        <p:txBody>
-          <a:bodyPr>
-            <a:normAutofit lnSpcReduction="10000"/>
-          </a:bodyPr>
+        <p:spPr>
+          <a:xfrm>
+            <a:off x="1484310" y="1969149"/>
+            <a:ext cx="10018713" cy="3124201"/>
+          </a:xfrm>
+        </p:spPr>
+        <p:txBody>
+          <a:bodyPr/>
           <a:lstStyle/>
           <a:p>
             <a:r>
               <a:rPr lang="en-US" dirty="0" smtClean="0"/>
-              <a:t>Extra Trees are hard to </a:t>
+              <a:t>An example of linear regression analysis </a:t>
+            </a:r>
+            <a:r>
+              <a:rPr lang="en-US" dirty="0" smtClean="0"/>
+              <a:t>using </a:t>
             </a:r>
             <a:r>
               <a:rPr lang="en-US" dirty="0" err="1" smtClean="0"/>
-              <a:t>visualise</a:t>
-            </a:r>
-            <a:r>
-              <a:rPr lang="en-US" dirty="0" smtClean="0"/>
-              <a:t> as there’s typically a large number of trees.</a:t>
-            </a:r>
-          </a:p>
-          <a:p>
-            <a:r>
-              <a:rPr lang="en-US" dirty="0" smtClean="0"/>
-              <a:t>Instead, useful information such as feature importance can be extracted.</a:t>
-            </a:r>
-          </a:p>
-          <a:p>
-            <a:r>
-              <a:rPr lang="en-US" dirty="0" smtClean="0"/>
-              <a:t>Feature importance gives a score to each feature that is a measure of how much they affect the target.</a:t>
-            </a:r>
-          </a:p>
-          <a:p>
-            <a:r>
-              <a:rPr lang="en-US" dirty="0" smtClean="0"/>
-              <a:t>To gauge the accuracy metrics such as the R-squared value can be used.</a:t>
-            </a:r>
-          </a:p>
-          <a:p>
-            <a:r>
-              <a:rPr lang="en-US" dirty="0" smtClean="0"/>
-              <a:t>Feature importance and the R-squared values are easy to extract in </a:t>
+              <a:t>scikit</a:t>
+            </a:r>
+            <a:r>
+              <a:rPr lang="en-US" dirty="0" smtClean="0"/>
+              <a:t>-learn and Python can be found in the ‘</a:t>
+            </a:r>
+            <a:r>
+              <a:rPr lang="en-US" dirty="0" err="1" smtClean="0"/>
+              <a:t>RegressionPractical</a:t>
+            </a:r>
+            <a:r>
+              <a:rPr lang="en-US" dirty="0" smtClean="0"/>
+              <a:t>’ </a:t>
+            </a:r>
+            <a:r>
+              <a:rPr lang="en-US" dirty="0" err="1" smtClean="0"/>
+              <a:t>Jupyter</a:t>
+            </a:r>
+            <a:r>
+              <a:rPr lang="en-US" dirty="0" smtClean="0"/>
+              <a:t> Notebook, located in the ‘Practical_2’ directory.</a:t>
+            </a:r>
+            <a:endParaRPr lang="en-US" dirty="0" smtClean="0"/>
+          </a:p>
+          <a:p>
+            <a:r>
+              <a:rPr lang="en-US" dirty="0" smtClean="0"/>
+              <a:t>Follow </a:t>
+            </a:r>
+            <a:r>
+              <a:rPr lang="en-US" dirty="0" smtClean="0"/>
+              <a:t>through </a:t>
+            </a:r>
+            <a:r>
+              <a:rPr lang="en-US" dirty="0" smtClean="0"/>
+              <a:t>the regression analysis in this Notebook </a:t>
+            </a:r>
+            <a:r>
+              <a:rPr lang="en-US" dirty="0" smtClean="0"/>
+              <a:t>and </a:t>
+            </a:r>
+            <a:r>
+              <a:rPr lang="en-US" dirty="0" smtClean="0"/>
+              <a:t>perform the same </a:t>
+            </a:r>
+            <a:r>
+              <a:rPr lang="en-US" dirty="0" smtClean="0"/>
+              <a:t>regression </a:t>
+            </a:r>
+            <a:r>
+              <a:rPr lang="en-US" dirty="0" smtClean="0"/>
+              <a:t>analysis </a:t>
+            </a:r>
+            <a:r>
+              <a:rPr lang="en-US" dirty="0" smtClean="0"/>
+              <a:t>for the </a:t>
+            </a:r>
+            <a:r>
+              <a:rPr lang="en-US" dirty="0" smtClean="0"/>
+              <a:t>Boston</a:t>
+            </a:r>
+            <a:r>
+              <a:rPr lang="en-US" dirty="0" smtClean="0"/>
+              <a:t> dataset found in </a:t>
             </a:r>
             <a:r>
               <a:rPr lang="en-US" dirty="0" err="1" smtClean="0"/>
@@ -10277,7 +10366,7 @@
     </p:spTree>
     <p:extLst>
       <p:ext uri="{BB962C8B-B14F-4D97-AF65-F5344CB8AC3E}">
-        <p14:creationId xmlns:p14="http://schemas.microsoft.com/office/powerpoint/2010/main" val="262052534"/>
+        <p14:creationId xmlns:p14="http://schemas.microsoft.com/office/powerpoint/2010/main" val="93979688"/>
       </p:ext>
     </p:extLst>
   </p:cSld>
@@ -10328,287 +10417,6 @@
           <a:p>
             <a:r>
               <a:rPr lang="en-US" dirty="0" smtClean="0"/>
-              <a:t>Regression </a:t>
-            </a:r>
-            <a:r>
-              <a:rPr lang="en-US" dirty="0" smtClean="0"/>
-              <a:t>Practical</a:t>
-            </a:r>
-            <a:endParaRPr lang="en-US" dirty="0"/>
-          </a:p>
-        </p:txBody>
-      </p:sp>
-      <p:sp>
-        <p:nvSpPr>
-          <p:cNvPr id="3" name="Content Placeholder 2"/>
-          <p:cNvSpPr>
-            <a:spLocks noGrp="1"/>
-          </p:cNvSpPr>
-          <p:nvPr>
-            <p:ph idx="1"/>
-          </p:nvPr>
-        </p:nvSpPr>
-        <p:spPr>
-          <a:xfrm>
-            <a:off x="1484310" y="1969149"/>
-            <a:ext cx="10018713" cy="3124201"/>
-          </a:xfrm>
-        </p:spPr>
-        <p:txBody>
-          <a:bodyPr/>
-          <a:lstStyle/>
-          <a:p>
-            <a:r>
-              <a:rPr lang="en-US" dirty="0" smtClean="0"/>
-              <a:t>An example of linear regression analysis </a:t>
-            </a:r>
-            <a:r>
-              <a:rPr lang="en-US" dirty="0" smtClean="0"/>
-              <a:t>using </a:t>
-            </a:r>
-            <a:r>
-              <a:rPr lang="en-US" dirty="0" err="1" smtClean="0"/>
-              <a:t>scikit</a:t>
-            </a:r>
-            <a:r>
-              <a:rPr lang="en-US" dirty="0" smtClean="0"/>
-              <a:t>-learn and Python can be found in the “</a:t>
-            </a:r>
-            <a:r>
-              <a:rPr lang="en-US" dirty="0" err="1" smtClean="0"/>
-              <a:t>RegressionPractical</a:t>
-            </a:r>
-            <a:r>
-              <a:rPr lang="en-US" dirty="0" smtClean="0"/>
-              <a:t>” </a:t>
-            </a:r>
-            <a:r>
-              <a:rPr lang="en-US" dirty="0" err="1" smtClean="0"/>
-              <a:t>Jupyter</a:t>
-            </a:r>
-            <a:r>
-              <a:rPr lang="en-US" dirty="0" smtClean="0"/>
-              <a:t> Notebook, located in the “Practical_2” directory.</a:t>
-            </a:r>
-            <a:endParaRPr lang="en-US" dirty="0" smtClean="0"/>
-          </a:p>
-          <a:p>
-            <a:r>
-              <a:rPr lang="en-US" dirty="0" smtClean="0"/>
-              <a:t>Follow </a:t>
-            </a:r>
-            <a:r>
-              <a:rPr lang="en-US" dirty="0" smtClean="0"/>
-              <a:t>through </a:t>
-            </a:r>
-            <a:r>
-              <a:rPr lang="en-US" dirty="0" smtClean="0"/>
-              <a:t>the regression analysis in this Notebook </a:t>
-            </a:r>
-            <a:r>
-              <a:rPr lang="en-US" dirty="0" smtClean="0"/>
-              <a:t>and </a:t>
-            </a:r>
-            <a:r>
-              <a:rPr lang="en-US" dirty="0" smtClean="0"/>
-              <a:t>perform the same </a:t>
-            </a:r>
-            <a:r>
-              <a:rPr lang="en-US" dirty="0" smtClean="0"/>
-              <a:t>regression </a:t>
-            </a:r>
-            <a:r>
-              <a:rPr lang="en-US" dirty="0" smtClean="0"/>
-              <a:t>analysis </a:t>
-            </a:r>
-            <a:r>
-              <a:rPr lang="en-US" dirty="0" smtClean="0"/>
-              <a:t>for the </a:t>
-            </a:r>
-            <a:r>
-              <a:rPr lang="en-US" dirty="0" smtClean="0"/>
-              <a:t>Boston</a:t>
-            </a:r>
-            <a:r>
-              <a:rPr lang="en-US" dirty="0" smtClean="0"/>
-              <a:t> dataset found in </a:t>
-            </a:r>
-            <a:r>
-              <a:rPr lang="en-US" dirty="0" err="1" smtClean="0"/>
-              <a:t>scikit</a:t>
-            </a:r>
-            <a:r>
-              <a:rPr lang="en-US" dirty="0" smtClean="0"/>
-              <a:t>-learn.</a:t>
-            </a:r>
-            <a:endParaRPr lang="en-US" dirty="0"/>
-          </a:p>
-        </p:txBody>
-      </p:sp>
-    </p:spTree>
-    <p:extLst>
-      <p:ext uri="{BB962C8B-B14F-4D97-AF65-F5344CB8AC3E}">
-        <p14:creationId xmlns:p14="http://schemas.microsoft.com/office/powerpoint/2010/main" val="93979688"/>
-      </p:ext>
-    </p:extLst>
-  </p:cSld>
-  <p:clrMapOvr>
-    <a:masterClrMapping/>
-  </p:clrMapOvr>
-  <p:timing>
-    <p:tnLst>
-      <p:par>
-        <p:cTn xmlns:p14="http://schemas.microsoft.com/office/powerpoint/2010/main" id="1" dur="indefinite" restart="never" nodeType="tmRoot"/>
-      </p:par>
-    </p:tnLst>
-  </p:timing>
-</p:sld>
-</file>
-
-<file path=ppt/slides/slide23.xml><?xml version="1.0" encoding="utf-8"?>
-<p:sld xmlns:a="http://schemas.openxmlformats.org/drawingml/2006/main" xmlns:r="http://schemas.openxmlformats.org/officeDocument/2006/relationships" xmlns:p="http://schemas.openxmlformats.org/presentationml/2006/main">
-  <p:cSld>
-    <p:spTree>
-      <p:nvGrpSpPr>
-        <p:cNvPr id="1" name=""/>
-        <p:cNvGrpSpPr/>
-        <p:nvPr/>
-      </p:nvGrpSpPr>
-      <p:grpSpPr>
-        <a:xfrm>
-          <a:off x="0" y="0"/>
-          <a:ext cx="0" cy="0"/>
-          <a:chOff x="0" y="0"/>
-          <a:chExt cx="0" cy="0"/>
-        </a:xfrm>
-      </p:grpSpPr>
-      <p:sp>
-        <p:nvSpPr>
-          <p:cNvPr id="2" name="Title 1"/>
-          <p:cNvSpPr>
-            <a:spLocks noGrp="1"/>
-          </p:cNvSpPr>
-          <p:nvPr>
-            <p:ph type="title"/>
-          </p:nvPr>
-        </p:nvSpPr>
-        <p:spPr/>
-        <p:txBody>
-          <a:bodyPr/>
-          <a:lstStyle/>
-          <a:p>
-            <a:r>
-              <a:rPr lang="en-US" dirty="0" smtClean="0"/>
-              <a:t>Regression Summary</a:t>
-            </a:r>
-            <a:endParaRPr lang="en-US" dirty="0"/>
-          </a:p>
-        </p:txBody>
-      </p:sp>
-      <p:sp>
-        <p:nvSpPr>
-          <p:cNvPr id="3" name="Content Placeholder 2"/>
-          <p:cNvSpPr>
-            <a:spLocks noGrp="1"/>
-          </p:cNvSpPr>
-          <p:nvPr>
-            <p:ph idx="1"/>
-          </p:nvPr>
-        </p:nvSpPr>
-        <p:spPr/>
-        <p:txBody>
-          <a:bodyPr/>
-          <a:lstStyle/>
-          <a:p>
-            <a:r>
-              <a:rPr lang="en-US" dirty="0" smtClean="0"/>
-              <a:t>Regression can be used to find the relationship between </a:t>
-            </a:r>
-            <a:r>
-              <a:rPr lang="en-US" dirty="0" smtClean="0"/>
-              <a:t>a target variable </a:t>
-            </a:r>
-            <a:r>
-              <a:rPr lang="en-US" dirty="0" smtClean="0"/>
-              <a:t>and feature variables.</a:t>
-            </a:r>
-          </a:p>
-          <a:p>
-            <a:r>
-              <a:rPr lang="en-US" dirty="0" smtClean="0"/>
-              <a:t>It can also be used to predict values of the target variable for given feature values.</a:t>
-            </a:r>
-          </a:p>
-          <a:p>
-            <a:r>
-              <a:rPr lang="en-US" dirty="0" smtClean="0"/>
-              <a:t>Decision trees can be used to make a regression model.</a:t>
-            </a:r>
-          </a:p>
-          <a:p>
-            <a:r>
-              <a:rPr lang="en-US" dirty="0" smtClean="0"/>
-              <a:t>Feature </a:t>
-            </a:r>
-            <a:r>
-              <a:rPr lang="en-US" dirty="0" err="1" smtClean="0"/>
-              <a:t>importances</a:t>
-            </a:r>
-            <a:r>
-              <a:rPr lang="en-US" dirty="0" smtClean="0"/>
-              <a:t> can be found for a given model.</a:t>
-            </a:r>
-            <a:endParaRPr lang="en-US" dirty="0"/>
-          </a:p>
-        </p:txBody>
-      </p:sp>
-    </p:spTree>
-    <p:extLst>
-      <p:ext uri="{BB962C8B-B14F-4D97-AF65-F5344CB8AC3E}">
-        <p14:creationId xmlns:p14="http://schemas.microsoft.com/office/powerpoint/2010/main" val="758272803"/>
-      </p:ext>
-    </p:extLst>
-  </p:cSld>
-  <p:clrMapOvr>
-    <a:masterClrMapping/>
-  </p:clrMapOvr>
-</p:sld>
-</file>
-
-<file path=ppt/slides/slide24.xml><?xml version="1.0" encoding="utf-8"?>
-<p:sld xmlns:a="http://schemas.openxmlformats.org/drawingml/2006/main" xmlns:r="http://schemas.openxmlformats.org/officeDocument/2006/relationships" xmlns:p="http://schemas.openxmlformats.org/presentationml/2006/main">
-  <p:cSld>
-    <p:spTree>
-      <p:nvGrpSpPr>
-        <p:cNvPr id="1" name=""/>
-        <p:cNvGrpSpPr/>
-        <p:nvPr/>
-      </p:nvGrpSpPr>
-      <p:grpSpPr>
-        <a:xfrm>
-          <a:off x="0" y="0"/>
-          <a:ext cx="0" cy="0"/>
-          <a:chOff x="0" y="0"/>
-          <a:chExt cx="0" cy="0"/>
-        </a:xfrm>
-      </p:grpSpPr>
-      <p:sp>
-        <p:nvSpPr>
-          <p:cNvPr id="2" name="Title 1"/>
-          <p:cNvSpPr>
-            <a:spLocks noGrp="1"/>
-          </p:cNvSpPr>
-          <p:nvPr>
-            <p:ph type="title"/>
-          </p:nvPr>
-        </p:nvSpPr>
-        <p:spPr/>
-        <p:txBody>
-          <a:bodyPr/>
-          <a:lstStyle/>
-          <a:p>
-            <a:r>
-              <a:rPr lang="en-US" dirty="0" smtClean="0"/>
               <a:t>Image Classifier With </a:t>
             </a:r>
             <a:r>
@@ -10710,7 +10518,7 @@
 </p:sld>
 </file>
 
-<file path=ppt/slides/slide25.xml><?xml version="1.0" encoding="utf-8"?>
+<file path=ppt/slides/slide23.xml><?xml version="1.0" encoding="utf-8"?>
 <p:sld xmlns:a="http://schemas.openxmlformats.org/drawingml/2006/main" xmlns:r="http://schemas.openxmlformats.org/officeDocument/2006/relationships" xmlns:p="http://schemas.openxmlformats.org/presentationml/2006/main">
   <p:cSld>
     <p:spTree>
@@ -11451,7 +11259,7 @@
 </p:sld>
 </file>
 
-<file path=ppt/slides/slide26.xml><?xml version="1.0" encoding="utf-8"?>
+<file path=ppt/slides/slide24.xml><?xml version="1.0" encoding="utf-8"?>
 <p:sld xmlns:a="http://schemas.openxmlformats.org/drawingml/2006/main" xmlns:r="http://schemas.openxmlformats.org/officeDocument/2006/relationships" xmlns:p="http://schemas.openxmlformats.org/presentationml/2006/main">
   <p:cSld>
     <p:spTree>
@@ -12529,7 +12337,7 @@
 </p:sld>
 </file>
 
-<file path=ppt/slides/slide27.xml><?xml version="1.0" encoding="utf-8"?>
+<file path=ppt/slides/slide25.xml><?xml version="1.0" encoding="utf-8"?>
 <p:sld xmlns:a="http://schemas.openxmlformats.org/drawingml/2006/main" xmlns:r="http://schemas.openxmlformats.org/officeDocument/2006/relationships" xmlns:p="http://schemas.openxmlformats.org/presentationml/2006/main">
   <p:cSld>
     <p:spTree>
@@ -12645,7 +12453,7 @@
 </p:sld>
 </file>
 
-<file path=ppt/slides/slide28.xml><?xml version="1.0" encoding="utf-8"?>
+<file path=ppt/slides/slide26.xml><?xml version="1.0" encoding="utf-8"?>
 <p:sld xmlns:a="http://schemas.openxmlformats.org/drawingml/2006/main" xmlns:r="http://schemas.openxmlformats.org/officeDocument/2006/relationships" xmlns:p="http://schemas.openxmlformats.org/presentationml/2006/main">
   <p:cSld>
     <p:spTree>
@@ -12834,7 +12642,7 @@
 </p:sld>
 </file>
 
-<file path=ppt/slides/slide29.xml><?xml version="1.0" encoding="utf-8"?>
+<file path=ppt/slides/slide27.xml><?xml version="1.0" encoding="utf-8"?>
 <p:sld xmlns:a="http://schemas.openxmlformats.org/drawingml/2006/main" xmlns:r="http://schemas.openxmlformats.org/officeDocument/2006/relationships" xmlns:p="http://schemas.openxmlformats.org/presentationml/2006/main">
   <p:cSld>
     <p:spTree>
@@ -13196,144 +13004,7 @@
 </p:sld>
 </file>
 
-<file path=ppt/slides/slide3.xml><?xml version="1.0" encoding="utf-8"?>
-<p:sld xmlns:a="http://schemas.openxmlformats.org/drawingml/2006/main" xmlns:r="http://schemas.openxmlformats.org/officeDocument/2006/relationships" xmlns:p="http://schemas.openxmlformats.org/presentationml/2006/main">
-  <p:cSld>
-    <p:spTree>
-      <p:nvGrpSpPr>
-        <p:cNvPr id="1" name=""/>
-        <p:cNvGrpSpPr/>
-        <p:nvPr/>
-      </p:nvGrpSpPr>
-      <p:grpSpPr>
-        <a:xfrm>
-          <a:off x="0" y="0"/>
-          <a:ext cx="0" cy="0"/>
-          <a:chOff x="0" y="0"/>
-          <a:chExt cx="0" cy="0"/>
-        </a:xfrm>
-      </p:grpSpPr>
-      <p:sp>
-        <p:nvSpPr>
-          <p:cNvPr id="2" name="Title 1"/>
-          <p:cNvSpPr>
-            <a:spLocks noGrp="1"/>
-          </p:cNvSpPr>
-          <p:nvPr>
-            <p:ph type="title"/>
-          </p:nvPr>
-        </p:nvSpPr>
-        <p:spPr/>
-        <p:txBody>
-          <a:bodyPr/>
-          <a:lstStyle/>
-          <a:p>
-            <a:r>
-              <a:rPr lang="en-US" dirty="0" smtClean="0"/>
-              <a:t>Assumptions</a:t>
-            </a:r>
-            <a:endParaRPr lang="en-US" dirty="0"/>
-          </a:p>
-        </p:txBody>
-      </p:sp>
-      <p:sp>
-        <p:nvSpPr>
-          <p:cNvPr id="3" name="Content Placeholder 2"/>
-          <p:cNvSpPr>
-            <a:spLocks noGrp="1"/>
-          </p:cNvSpPr>
-          <p:nvPr>
-            <p:ph idx="1"/>
-          </p:nvPr>
-        </p:nvSpPr>
-        <p:spPr/>
-        <p:txBody>
-          <a:bodyPr/>
-          <a:lstStyle/>
-          <a:p>
-            <a:r>
-              <a:rPr lang="en-US" dirty="0" smtClean="0"/>
-              <a:t>Solid understanding of Python.</a:t>
-            </a:r>
-          </a:p>
-          <a:p>
-            <a:r>
-              <a:rPr lang="en-US" dirty="0"/>
-              <a:t>No/Little understanding of Machine Learning</a:t>
-            </a:r>
-            <a:r>
-              <a:rPr lang="en-US" dirty="0" smtClean="0"/>
-              <a:t>.</a:t>
-            </a:r>
-          </a:p>
-          <a:p>
-            <a:r>
-              <a:rPr lang="en-US" dirty="0" smtClean="0"/>
-              <a:t>Exposure to Pandas and </a:t>
-            </a:r>
-            <a:r>
-              <a:rPr lang="en-US" dirty="0" err="1" smtClean="0"/>
-              <a:t>NumPy</a:t>
-            </a:r>
-            <a:r>
-              <a:rPr lang="en-US" dirty="0" smtClean="0"/>
-              <a:t> beneficial.</a:t>
-            </a:r>
-          </a:p>
-          <a:p>
-            <a:r>
-              <a:rPr lang="en-US" dirty="0" smtClean="0"/>
-              <a:t>Knowledge of the </a:t>
-            </a:r>
-            <a:r>
-              <a:rPr lang="en-US" dirty="0" err="1" smtClean="0"/>
-              <a:t>Jupyter</a:t>
-            </a:r>
-            <a:r>
-              <a:rPr lang="en-US" dirty="0" smtClean="0"/>
-              <a:t> Notebook and a Python IDE like </a:t>
-            </a:r>
-            <a:r>
-              <a:rPr lang="en-US" dirty="0" err="1"/>
-              <a:t>S</a:t>
-            </a:r>
-            <a:r>
-              <a:rPr lang="en-US" dirty="0" err="1" smtClean="0"/>
-              <a:t>pyder</a:t>
-            </a:r>
-            <a:r>
-              <a:rPr lang="en-US" i="1" dirty="0" smtClean="0"/>
-              <a:t> </a:t>
-            </a:r>
-            <a:r>
-              <a:rPr lang="en-US" dirty="0" smtClean="0"/>
-              <a:t>will be beneficial.</a:t>
-            </a:r>
-            <a:endParaRPr lang="en-US" i="1" dirty="0" smtClean="0"/>
-          </a:p>
-        </p:txBody>
-      </p:sp>
-    </p:spTree>
-    <p:extLst>
-      <p:ext uri="{BB962C8B-B14F-4D97-AF65-F5344CB8AC3E}">
-        <p14:creationId xmlns:p14="http://schemas.microsoft.com/office/powerpoint/2010/main" val="4168538"/>
-      </p:ext>
-    </p:extLst>
-  </p:cSld>
-  <p:clrMapOvr>
-    <a:masterClrMapping/>
-  </p:clrMapOvr>
-  <p:timing>
-    <p:tnLst>
-      <p:par>
-        <p:cTn xmlns:p14="http://schemas.microsoft.com/office/powerpoint/2010/main" id="1" dur="indefinite" restart="never" nodeType="tmRoot"/>
-      </p:par>
-    </p:tnLst>
-  </p:timing>
-</p:sld>
-</file>
-
-<file path=ppt/slides/slide30.xml><?xml version="1.0" encoding="utf-8"?>
+<file path=ppt/slides/slide28.xml><?xml version="1.0" encoding="utf-8"?>
 <p:sld xmlns:a="http://schemas.openxmlformats.org/drawingml/2006/main" xmlns:r="http://schemas.openxmlformats.org/officeDocument/2006/relationships" xmlns:p="http://schemas.openxmlformats.org/presentationml/2006/main">
   <p:cSld>
     <p:spTree>
@@ -14326,79 +13997,7 @@
 </p:sld>
 </file>
 
-<file path=ppt/slides/slide31.xml><?xml version="1.0" encoding="utf-8"?>
-<p:sld xmlns:a="http://schemas.openxmlformats.org/drawingml/2006/main" xmlns:r="http://schemas.openxmlformats.org/officeDocument/2006/relationships" xmlns:p="http://schemas.openxmlformats.org/presentationml/2006/main">
-  <p:cSld>
-    <p:spTree>
-      <p:nvGrpSpPr>
-        <p:cNvPr id="1" name=""/>
-        <p:cNvGrpSpPr/>
-        <p:nvPr/>
-      </p:nvGrpSpPr>
-      <p:grpSpPr>
-        <a:xfrm>
-          <a:off x="0" y="0"/>
-          <a:ext cx="0" cy="0"/>
-          <a:chOff x="0" y="0"/>
-          <a:chExt cx="0" cy="0"/>
-        </a:xfrm>
-      </p:grpSpPr>
-      <p:sp>
-        <p:nvSpPr>
-          <p:cNvPr id="2" name="Title 1"/>
-          <p:cNvSpPr>
-            <a:spLocks noGrp="1"/>
-          </p:cNvSpPr>
-          <p:nvPr>
-            <p:ph type="title"/>
-          </p:nvPr>
-        </p:nvSpPr>
-        <p:spPr/>
-        <p:txBody>
-          <a:bodyPr/>
-          <a:lstStyle/>
-          <a:p>
-            <a:r>
-              <a:rPr lang="en-US" dirty="0" smtClean="0"/>
-              <a:t>Deep-Learning Summary</a:t>
-            </a:r>
-            <a:endParaRPr lang="en-US" dirty="0"/>
-          </a:p>
-        </p:txBody>
-      </p:sp>
-      <p:sp>
-        <p:nvSpPr>
-          <p:cNvPr id="3" name="Content Placeholder 2"/>
-          <p:cNvSpPr>
-            <a:spLocks noGrp="1"/>
-          </p:cNvSpPr>
-          <p:nvPr>
-            <p:ph idx="1"/>
-          </p:nvPr>
-        </p:nvSpPr>
-        <p:spPr/>
-        <p:txBody>
-          <a:bodyPr/>
-          <a:lstStyle/>
-          <a:p>
-            <a:endParaRPr lang="en-US"/>
-          </a:p>
-        </p:txBody>
-      </p:sp>
-    </p:spTree>
-    <p:extLst>
-      <p:ext uri="{BB962C8B-B14F-4D97-AF65-F5344CB8AC3E}">
-        <p14:creationId xmlns:p14="http://schemas.microsoft.com/office/powerpoint/2010/main" val="296631192"/>
-      </p:ext>
-    </p:extLst>
-  </p:cSld>
-  <p:clrMapOvr>
-    <a:masterClrMapping/>
-  </p:clrMapOvr>
-</p:sld>
-</file>
-
-<file path=ppt/slides/slide32.xml><?xml version="1.0" encoding="utf-8"?>
+<file path=ppt/slides/slide29.xml><?xml version="1.0" encoding="utf-8"?>
 <p:sld xmlns:a="http://schemas.openxmlformats.org/drawingml/2006/main" xmlns:r="http://schemas.openxmlformats.org/officeDocument/2006/relationships" xmlns:p="http://schemas.openxmlformats.org/presentationml/2006/main">
   <p:cSld>
     <p:spTree>
@@ -14561,7 +14160,7 @@
 </p:sld>
 </file>
 
-<file path=ppt/slides/slide33.xml><?xml version="1.0" encoding="utf-8"?>
+<file path=ppt/slides/slide3.xml><?xml version="1.0" encoding="utf-8"?>
 <p:sld xmlns:a="http://schemas.openxmlformats.org/drawingml/2006/main" xmlns:r="http://schemas.openxmlformats.org/officeDocument/2006/relationships" xmlns:p="http://schemas.openxmlformats.org/presentationml/2006/main">
   <p:cSld>
     <p:spTree>
@@ -14595,7 +14194,7 @@
           <a:p>
             <a:r>
               <a:rPr lang="en-US" dirty="0" smtClean="0"/>
-              <a:t>Further Resources</a:t>
+              <a:t>Assumptions</a:t>
             </a:r>
             <a:endParaRPr lang="en-US" dirty="0"/>
           </a:p>
@@ -14611,6 +14210,143 @@
             <p:ph idx="1"/>
           </p:nvPr>
         </p:nvSpPr>
+        <p:spPr/>
+        <p:txBody>
+          <a:bodyPr/>
+          <a:lstStyle/>
+          <a:p>
+            <a:r>
+              <a:rPr lang="en-US" dirty="0" smtClean="0"/>
+              <a:t>Solid understanding of Python.</a:t>
+            </a:r>
+          </a:p>
+          <a:p>
+            <a:r>
+              <a:rPr lang="en-US" dirty="0"/>
+              <a:t>No/Little understanding of Machine Learning</a:t>
+            </a:r>
+            <a:r>
+              <a:rPr lang="en-US" dirty="0" smtClean="0"/>
+              <a:t>.</a:t>
+            </a:r>
+          </a:p>
+          <a:p>
+            <a:r>
+              <a:rPr lang="en-US" dirty="0" smtClean="0"/>
+              <a:t>Exposure to Pandas and </a:t>
+            </a:r>
+            <a:r>
+              <a:rPr lang="en-US" dirty="0" err="1" smtClean="0"/>
+              <a:t>NumPy</a:t>
+            </a:r>
+            <a:r>
+              <a:rPr lang="en-US" dirty="0" smtClean="0"/>
+              <a:t> beneficial.</a:t>
+            </a:r>
+          </a:p>
+          <a:p>
+            <a:r>
+              <a:rPr lang="en-US" dirty="0" smtClean="0"/>
+              <a:t>Knowledge of the </a:t>
+            </a:r>
+            <a:r>
+              <a:rPr lang="en-US" dirty="0" err="1" smtClean="0"/>
+              <a:t>Jupyter</a:t>
+            </a:r>
+            <a:r>
+              <a:rPr lang="en-US" dirty="0" smtClean="0"/>
+              <a:t> Notebook and a Python IDE like </a:t>
+            </a:r>
+            <a:r>
+              <a:rPr lang="en-US" dirty="0" err="1"/>
+              <a:t>S</a:t>
+            </a:r>
+            <a:r>
+              <a:rPr lang="en-US" dirty="0" err="1" smtClean="0"/>
+              <a:t>pyder</a:t>
+            </a:r>
+            <a:r>
+              <a:rPr lang="en-US" i="1" dirty="0" smtClean="0"/>
+              <a:t> </a:t>
+            </a:r>
+            <a:r>
+              <a:rPr lang="en-US" dirty="0" smtClean="0"/>
+              <a:t>will be beneficial.</a:t>
+            </a:r>
+            <a:endParaRPr lang="en-US" i="1" dirty="0" smtClean="0"/>
+          </a:p>
+        </p:txBody>
+      </p:sp>
+    </p:spTree>
+    <p:extLst>
+      <p:ext uri="{BB962C8B-B14F-4D97-AF65-F5344CB8AC3E}">
+        <p14:creationId xmlns:p14="http://schemas.microsoft.com/office/powerpoint/2010/main" val="4168538"/>
+      </p:ext>
+    </p:extLst>
+  </p:cSld>
+  <p:clrMapOvr>
+    <a:masterClrMapping/>
+  </p:clrMapOvr>
+  <p:timing>
+    <p:tnLst>
+      <p:par>
+        <p:cTn xmlns:p14="http://schemas.microsoft.com/office/powerpoint/2010/main" id="1" dur="indefinite" restart="never" nodeType="tmRoot"/>
+      </p:par>
+    </p:tnLst>
+  </p:timing>
+</p:sld>
+</file>
+
+<file path=ppt/slides/slide30.xml><?xml version="1.0" encoding="utf-8"?>
+<p:sld xmlns:a="http://schemas.openxmlformats.org/drawingml/2006/main" xmlns:r="http://schemas.openxmlformats.org/officeDocument/2006/relationships" xmlns:p="http://schemas.openxmlformats.org/presentationml/2006/main">
+  <p:cSld>
+    <p:spTree>
+      <p:nvGrpSpPr>
+        <p:cNvPr id="1" name=""/>
+        <p:cNvGrpSpPr/>
+        <p:nvPr/>
+      </p:nvGrpSpPr>
+      <p:grpSpPr>
+        <a:xfrm>
+          <a:off x="0" y="0"/>
+          <a:ext cx="0" cy="0"/>
+          <a:chOff x="0" y="0"/>
+          <a:chExt cx="0" cy="0"/>
+        </a:xfrm>
+      </p:grpSpPr>
+      <p:sp>
+        <p:nvSpPr>
+          <p:cNvPr id="2" name="Title 1"/>
+          <p:cNvSpPr>
+            <a:spLocks noGrp="1"/>
+          </p:cNvSpPr>
+          <p:nvPr>
+            <p:ph type="title"/>
+          </p:nvPr>
+        </p:nvSpPr>
+        <p:spPr/>
+        <p:txBody>
+          <a:bodyPr/>
+          <a:lstStyle/>
+          <a:p>
+            <a:r>
+              <a:rPr lang="en-US" dirty="0" smtClean="0"/>
+              <a:t>Further Resources</a:t>
+            </a:r>
+            <a:endParaRPr lang="en-US" dirty="0"/>
+          </a:p>
+        </p:txBody>
+      </p:sp>
+      <p:sp>
+        <p:nvSpPr>
+          <p:cNvPr id="3" name="Content Placeholder 2"/>
+          <p:cNvSpPr>
+            <a:spLocks noGrp="1"/>
+          </p:cNvSpPr>
+          <p:nvPr>
+            <p:ph idx="1"/>
+          </p:nvPr>
+        </p:nvSpPr>
         <p:spPr>
           <a:xfrm>
             <a:off x="1484310" y="2038934"/>
@@ -14706,15 +14442,12 @@
               <a:t>//goo.gl/</a:t>
             </a:r>
             <a:r>
-              <a:rPr lang="en-US" dirty="0" smtClean="0">
+              <a:rPr lang="en-US" smtClean="0">
                 <a:hlinkClick r:id="rId4"/>
               </a:rPr>
               <a:t>uvhELR</a:t>
             </a:r>
-            <a:r>
-              <a:rPr lang="en-US" dirty="0" smtClean="0"/>
-              <a:t> </a:t>
-            </a:r>
+            <a:endParaRPr lang="en-US" dirty="0" smtClean="0"/>
           </a:p>
         </p:txBody>
       </p:sp>

</xml_diff>